<commit_message>
J'ai mis nos deux noms sur la page principale
</commit_message>
<xml_diff>
--- a/GitPresentation.pptx
+++ b/GitPresentation.pptx
@@ -201,7 +201,7 @@
           <a:p>
             <a:fld id="{94BE676F-555C-AE4D-B3E0-F8BCFFB2C399}" type="datetimeFigureOut">
               <a:rPr lang="en-US" smtClean="0"/>
-              <a:t>10/16/2017</a:t>
+              <a:t>10/16/17</a:t>
             </a:fld>
             <a:endParaRPr lang="en-US"/>
           </a:p>
@@ -359,7 +359,7 @@
           <a:p>
             <a:fld id="{62DC9C40-1CE6-A340-B000-CBE4CF18F9C7}" type="slidenum">
               <a:rPr lang="en-US" smtClean="0"/>
-              <a:t>‹N°›</a:t>
+              <a:t>‹#›</a:t>
             </a:fld>
             <a:endParaRPr lang="en-US"/>
           </a:p>
@@ -970,7 +970,7 @@
           <a:p>
             <a:fld id="{8AEB1F6E-BE39-9349-BC16-46503606C6CE}" type="datetimeFigureOut">
               <a:rPr lang="en-US" smtClean="0"/>
-              <a:t>10/16/2017</a:t>
+              <a:t>10/16/17</a:t>
             </a:fld>
             <a:endParaRPr lang="en-US"/>
           </a:p>
@@ -1017,7 +1017,7 @@
           <a:p>
             <a:fld id="{8F1441E5-2681-D342-A4D7-CDD8BDD1E122}" type="slidenum">
               <a:rPr lang="en-US" smtClean="0"/>
-              <a:t>‹N°›</a:t>
+              <a:t>‹#›</a:t>
             </a:fld>
             <a:endParaRPr lang="en-US"/>
           </a:p>
@@ -1261,7 +1261,7 @@
           <a:p>
             <a:fld id="{8AEB1F6E-BE39-9349-BC16-46503606C6CE}" type="datetimeFigureOut">
               <a:rPr lang="en-US" smtClean="0"/>
-              <a:t>10/16/2017</a:t>
+              <a:t>10/16/17</a:t>
             </a:fld>
             <a:endParaRPr lang="en-US"/>
           </a:p>
@@ -1303,7 +1303,7 @@
           <a:p>
             <a:fld id="{8F1441E5-2681-D342-A4D7-CDD8BDD1E122}" type="slidenum">
               <a:rPr lang="en-US" smtClean="0"/>
-              <a:t>‹N°›</a:t>
+              <a:t>‹#›</a:t>
             </a:fld>
             <a:endParaRPr lang="en-US"/>
           </a:p>
@@ -1504,7 +1504,7 @@
           <a:p>
             <a:fld id="{8AEB1F6E-BE39-9349-BC16-46503606C6CE}" type="datetimeFigureOut">
               <a:rPr lang="en-US" smtClean="0"/>
-              <a:t>10/16/2017</a:t>
+              <a:t>10/16/17</a:t>
             </a:fld>
             <a:endParaRPr lang="en-US"/>
           </a:p>
@@ -1546,7 +1546,7 @@
           <a:p>
             <a:fld id="{8F1441E5-2681-D342-A4D7-CDD8BDD1E122}" type="slidenum">
               <a:rPr lang="en-US" smtClean="0"/>
-              <a:t>‹N°›</a:t>
+              <a:t>‹#›</a:t>
             </a:fld>
             <a:endParaRPr lang="en-US"/>
           </a:p>
@@ -2039,7 +2039,7 @@
           <a:p>
             <a:fld id="{8AEB1F6E-BE39-9349-BC16-46503606C6CE}" type="datetimeFigureOut">
               <a:rPr lang="en-US" smtClean="0"/>
-              <a:t>10/16/2017</a:t>
+              <a:t>10/16/17</a:t>
             </a:fld>
             <a:endParaRPr lang="en-US"/>
           </a:p>
@@ -2081,7 +2081,7 @@
           <a:p>
             <a:fld id="{8F1441E5-2681-D342-A4D7-CDD8BDD1E122}" type="slidenum">
               <a:rPr lang="en-US" smtClean="0"/>
-              <a:t>‹N°›</a:t>
+              <a:t>‹#›</a:t>
             </a:fld>
             <a:endParaRPr lang="en-US"/>
           </a:p>
@@ -2282,7 +2282,7 @@
           <a:p>
             <a:fld id="{8AEB1F6E-BE39-9349-BC16-46503606C6CE}" type="datetimeFigureOut">
               <a:rPr lang="en-US" smtClean="0"/>
-              <a:t>10/16/2017</a:t>
+              <a:t>10/16/17</a:t>
             </a:fld>
             <a:endParaRPr lang="en-US"/>
           </a:p>
@@ -2324,7 +2324,7 @@
           <a:p>
             <a:fld id="{8F1441E5-2681-D342-A4D7-CDD8BDD1E122}" type="slidenum">
               <a:rPr lang="en-US" smtClean="0"/>
-              <a:t>‹N°›</a:t>
+              <a:t>‹#›</a:t>
             </a:fld>
             <a:endParaRPr lang="en-US"/>
           </a:p>
@@ -2809,7 +2809,7 @@
           <a:p>
             <a:fld id="{8AEB1F6E-BE39-9349-BC16-46503606C6CE}" type="datetimeFigureOut">
               <a:rPr lang="en-US" smtClean="0"/>
-              <a:t>10/16/2017</a:t>
+              <a:t>10/16/17</a:t>
             </a:fld>
             <a:endParaRPr lang="en-US"/>
           </a:p>
@@ -2851,7 +2851,7 @@
           <a:p>
             <a:fld id="{8F1441E5-2681-D342-A4D7-CDD8BDD1E122}" type="slidenum">
               <a:rPr lang="en-US" smtClean="0"/>
-              <a:t>‹N°›</a:t>
+              <a:t>‹#›</a:t>
             </a:fld>
             <a:endParaRPr lang="en-US"/>
           </a:p>
@@ -3101,7 +3101,7 @@
           <a:p>
             <a:fld id="{8AEB1F6E-BE39-9349-BC16-46503606C6CE}" type="datetimeFigureOut">
               <a:rPr lang="en-US" smtClean="0"/>
-              <a:t>10/16/2017</a:t>
+              <a:t>10/16/17</a:t>
             </a:fld>
             <a:endParaRPr lang="en-US"/>
           </a:p>
@@ -3143,7 +3143,7 @@
           <a:p>
             <a:fld id="{8F1441E5-2681-D342-A4D7-CDD8BDD1E122}" type="slidenum">
               <a:rPr lang="en-US" smtClean="0"/>
-              <a:t>‹N°›</a:t>
+              <a:t>‹#›</a:t>
             </a:fld>
             <a:endParaRPr lang="en-US"/>
           </a:p>
@@ -3270,7 +3270,7 @@
           <a:p>
             <a:fld id="{8AEB1F6E-BE39-9349-BC16-46503606C6CE}" type="datetimeFigureOut">
               <a:rPr lang="en-US" smtClean="0"/>
-              <a:t>10/16/2017</a:t>
+              <a:t>10/16/17</a:t>
             </a:fld>
             <a:endParaRPr lang="en-US"/>
           </a:p>
@@ -3312,7 +3312,7 @@
           <a:p>
             <a:fld id="{8F1441E5-2681-D342-A4D7-CDD8BDD1E122}" type="slidenum">
               <a:rPr lang="en-US" smtClean="0"/>
-              <a:t>‹N°›</a:t>
+              <a:t>‹#›</a:t>
             </a:fld>
             <a:endParaRPr lang="en-US"/>
           </a:p>
@@ -3445,7 +3445,7 @@
           <a:p>
             <a:fld id="{8AEB1F6E-BE39-9349-BC16-46503606C6CE}" type="datetimeFigureOut">
               <a:rPr lang="en-US" smtClean="0"/>
-              <a:t>10/16/2017</a:t>
+              <a:t>10/16/17</a:t>
             </a:fld>
             <a:endParaRPr lang="en-US"/>
           </a:p>
@@ -3487,7 +3487,7 @@
           <a:p>
             <a:fld id="{8F1441E5-2681-D342-A4D7-CDD8BDD1E122}" type="slidenum">
               <a:rPr lang="en-US" smtClean="0"/>
-              <a:t>‹N°›</a:t>
+              <a:t>‹#›</a:t>
             </a:fld>
             <a:endParaRPr lang="en-US"/>
           </a:p>
@@ -3651,7 +3651,7 @@
           <a:p>
             <a:fld id="{8AEB1F6E-BE39-9349-BC16-46503606C6CE}" type="datetimeFigureOut">
               <a:rPr lang="en-US" smtClean="0"/>
-              <a:t>10/16/2017</a:t>
+              <a:t>10/16/17</a:t>
             </a:fld>
             <a:endParaRPr lang="en-US"/>
           </a:p>
@@ -3698,7 +3698,7 @@
           <a:p>
             <a:fld id="{8F1441E5-2681-D342-A4D7-CDD8BDD1E122}" type="slidenum">
               <a:rPr lang="en-US" smtClean="0"/>
-              <a:t>‹N°›</a:t>
+              <a:t>‹#›</a:t>
             </a:fld>
             <a:endParaRPr lang="en-US"/>
           </a:p>
@@ -3897,7 +3897,7 @@
           <a:p>
             <a:fld id="{8AEB1F6E-BE39-9349-BC16-46503606C6CE}" type="datetimeFigureOut">
               <a:rPr lang="en-US" smtClean="0"/>
-              <a:t>10/16/2017</a:t>
+              <a:t>10/16/17</a:t>
             </a:fld>
             <a:endParaRPr lang="en-US"/>
           </a:p>
@@ -3939,7 +3939,7 @@
           <a:p>
             <a:fld id="{8F1441E5-2681-D342-A4D7-CDD8BDD1E122}" type="slidenum">
               <a:rPr lang="en-US" smtClean="0"/>
-              <a:t>‹N°›</a:t>
+              <a:t>‹#›</a:t>
             </a:fld>
             <a:endParaRPr lang="en-US"/>
           </a:p>
@@ -4239,7 +4239,7 @@
           <a:p>
             <a:fld id="{8AEB1F6E-BE39-9349-BC16-46503606C6CE}" type="datetimeFigureOut">
               <a:rPr lang="en-US" smtClean="0"/>
-              <a:t>10/16/2017</a:t>
+              <a:t>10/16/17</a:t>
             </a:fld>
             <a:endParaRPr lang="en-US"/>
           </a:p>
@@ -4281,7 +4281,7 @@
           <a:p>
             <a:fld id="{8F1441E5-2681-D342-A4D7-CDD8BDD1E122}" type="slidenum">
               <a:rPr lang="en-US" smtClean="0"/>
-              <a:t>‹N°›</a:t>
+              <a:t>‹#›</a:t>
             </a:fld>
             <a:endParaRPr lang="en-US"/>
           </a:p>
@@ -4726,7 +4726,7 @@
           <a:p>
             <a:fld id="{8AEB1F6E-BE39-9349-BC16-46503606C6CE}" type="datetimeFigureOut">
               <a:rPr lang="en-US" smtClean="0"/>
-              <a:t>10/16/2017</a:t>
+              <a:t>10/16/17</a:t>
             </a:fld>
             <a:endParaRPr lang="en-US"/>
           </a:p>
@@ -4768,7 +4768,7 @@
           <a:p>
             <a:fld id="{8F1441E5-2681-D342-A4D7-CDD8BDD1E122}" type="slidenum">
               <a:rPr lang="en-US" smtClean="0"/>
-              <a:t>‹N°›</a:t>
+              <a:t>‹#›</a:t>
             </a:fld>
             <a:endParaRPr lang="en-US"/>
           </a:p>
@@ -4839,7 +4839,7 @@
           <a:p>
             <a:fld id="{8AEB1F6E-BE39-9349-BC16-46503606C6CE}" type="datetimeFigureOut">
               <a:rPr lang="en-US" smtClean="0"/>
-              <a:t>10/16/2017</a:t>
+              <a:t>10/16/17</a:t>
             </a:fld>
             <a:endParaRPr lang="en-US"/>
           </a:p>
@@ -4881,7 +4881,7 @@
           <a:p>
             <a:fld id="{8F1441E5-2681-D342-A4D7-CDD8BDD1E122}" type="slidenum">
               <a:rPr lang="en-US" smtClean="0"/>
-              <a:t>‹N°›</a:t>
+              <a:t>‹#›</a:t>
             </a:fld>
             <a:endParaRPr lang="en-US"/>
           </a:p>
@@ -4929,7 +4929,7 @@
           <a:p>
             <a:fld id="{8AEB1F6E-BE39-9349-BC16-46503606C6CE}" type="datetimeFigureOut">
               <a:rPr lang="en-US" smtClean="0"/>
-              <a:t>10/16/2017</a:t>
+              <a:t>10/16/17</a:t>
             </a:fld>
             <a:endParaRPr lang="en-US"/>
           </a:p>
@@ -4971,7 +4971,7 @@
           <a:p>
             <a:fld id="{8F1441E5-2681-D342-A4D7-CDD8BDD1E122}" type="slidenum">
               <a:rPr lang="en-US" smtClean="0"/>
-              <a:t>‹N°›</a:t>
+              <a:t>‹#›</a:t>
             </a:fld>
             <a:endParaRPr lang="en-US"/>
           </a:p>
@@ -5207,7 +5207,7 @@
           <a:p>
             <a:fld id="{8AEB1F6E-BE39-9349-BC16-46503606C6CE}" type="datetimeFigureOut">
               <a:rPr lang="en-US" smtClean="0"/>
-              <a:t>10/16/2017</a:t>
+              <a:t>10/16/17</a:t>
             </a:fld>
             <a:endParaRPr lang="en-US"/>
           </a:p>
@@ -5249,7 +5249,7 @@
           <a:p>
             <a:fld id="{8F1441E5-2681-D342-A4D7-CDD8BDD1E122}" type="slidenum">
               <a:rPr lang="en-US" smtClean="0"/>
-              <a:t>‹N°›</a:t>
+              <a:t>‹#›</a:t>
             </a:fld>
             <a:endParaRPr lang="en-US"/>
           </a:p>
@@ -5493,7 +5493,7 @@
           <a:p>
             <a:fld id="{8AEB1F6E-BE39-9349-BC16-46503606C6CE}" type="datetimeFigureOut">
               <a:rPr lang="en-US" smtClean="0"/>
-              <a:t>10/16/2017</a:t>
+              <a:t>10/16/17</a:t>
             </a:fld>
             <a:endParaRPr lang="en-US"/>
           </a:p>
@@ -5535,7 +5535,7 @@
           <a:p>
             <a:fld id="{8F1441E5-2681-D342-A4D7-CDD8BDD1E122}" type="slidenum">
               <a:rPr lang="en-US" smtClean="0"/>
-              <a:t>‹N°›</a:t>
+              <a:t>‹#›</a:t>
             </a:fld>
             <a:endParaRPr lang="en-US"/>
           </a:p>
@@ -6018,7 +6018,7 @@
           <a:p>
             <a:fld id="{8AEB1F6E-BE39-9349-BC16-46503606C6CE}" type="datetimeFigureOut">
               <a:rPr lang="en-US" smtClean="0"/>
-              <a:t>10/16/2017</a:t>
+              <a:t>10/16/17</a:t>
             </a:fld>
             <a:endParaRPr lang="en-US"/>
           </a:p>
@@ -6096,7 +6096,7 @@
           <a:p>
             <a:fld id="{8F1441E5-2681-D342-A4D7-CDD8BDD1E122}" type="slidenum">
               <a:rPr lang="en-US" smtClean="0"/>
-              <a:t>‹N°›</a:t>
+              <a:t>‹#›</a:t>
             </a:fld>
             <a:endParaRPr lang="en-US"/>
           </a:p>
@@ -6559,12 +6559,36 @@
             <p:ph type="subTitle" idx="1"/>
           </p:nvPr>
         </p:nvSpPr>
-        <p:spPr/>
+        <p:spPr>
+          <a:xfrm>
+            <a:off x="4515377" y="4910667"/>
+            <a:ext cx="6987645" cy="1388534"/>
+          </a:xfrm>
+        </p:spPr>
         <p:txBody>
           <a:bodyPr/>
           <a:lstStyle/>
           <a:p>
-            <a:endParaRPr lang="en-US" dirty="0"/>
+            <a:r>
+              <a:rPr lang="en-US" dirty="0" err="1" smtClean="0"/>
+              <a:t>Maxime</a:t>
+            </a:r>
+            <a:r>
+              <a:rPr lang="en-US" dirty="0" smtClean="0"/>
+              <a:t> Blanchard</a:t>
+            </a:r>
+            <a:r>
+              <a:rPr lang="en-US" dirty="0"/>
+              <a:t/>
+            </a:r>
+            <a:br>
+              <a:rPr lang="en-US" dirty="0"/>
+            </a:br>
+            <a:r>
+              <a:rPr lang="en-US" dirty="0" smtClean="0"/>
+              <a:t>Mathieu Renaud</a:t>
+            </a:r>
+            <a:endParaRPr lang="en-US" dirty="0" smtClean="0"/>
           </a:p>
         </p:txBody>
       </p:sp>

</xml_diff>

<commit_message>
J'ai add images et Document Word
</commit_message>
<xml_diff>
--- a/GitPresentation.pptx
+++ b/GitPresentation.pptx
@@ -5,10 +5,12 @@
     <p:sldMasterId id="2147483876" r:id="rId1"/>
   </p:sldMasterIdLst>
   <p:notesMasterIdLst>
-    <p:notesMasterId r:id="rId3"/>
+    <p:notesMasterId r:id="rId5"/>
   </p:notesMasterIdLst>
   <p:sldIdLst>
     <p:sldId id="256" r:id="rId2"/>
+    <p:sldId id="257" r:id="rId3"/>
+    <p:sldId id="258" r:id="rId4"/>
   </p:sldIdLst>
   <p:sldSz cx="12192000" cy="6858000"/>
   <p:notesSz cx="6858000" cy="9144000"/>
@@ -119,6 +121,1014 @@
 <p1510:revInfo xmlns:a="http://schemas.openxmlformats.org/drawingml/2006/main" xmlns:r="http://schemas.openxmlformats.org/officeDocument/2006/relationships" xmlns:p1510="http://schemas.microsoft.com/office/powerpoint/2015/10/main"/>
 </file>
 
+<file path=ppt/charts/chart1.xml><?xml version="1.0" encoding="utf-8"?>
+<c:chartSpace xmlns:c="http://schemas.openxmlformats.org/drawingml/2006/chart" xmlns:a="http://schemas.openxmlformats.org/drawingml/2006/main" xmlns:r="http://schemas.openxmlformats.org/officeDocument/2006/relationships">
+  <c:date1904 val="0"/>
+  <c:lang val="en-US"/>
+  <c:roundedCorners val="0"/>
+  <mc:AlternateContent xmlns:mc="http://schemas.openxmlformats.org/markup-compatibility/2006">
+    <mc:Choice xmlns:c14="http://schemas.microsoft.com/office/drawing/2007/8/2/chart" Requires="c14">
+      <c14:style val="102"/>
+    </mc:Choice>
+    <mc:Fallback>
+      <c:style val="2"/>
+    </mc:Fallback>
+  </mc:AlternateContent>
+  <c:chart>
+    <c:title>
+      <c:layout/>
+      <c:overlay val="0"/>
+      <c:spPr>
+        <a:noFill/>
+        <a:ln>
+          <a:noFill/>
+        </a:ln>
+        <a:effectLst/>
+      </c:spPr>
+      <c:txPr>
+        <a:bodyPr rot="0" spcFirstLastPara="1" vertOverflow="ellipsis" vert="horz" wrap="square" anchor="ctr" anchorCtr="1"/>
+        <a:lstStyle/>
+        <a:p>
+          <a:pPr>
+            <a:defRPr sz="2128" b="1" i="0" u="none" strike="noStrike" kern="1200" baseline="0">
+              <a:solidFill>
+                <a:schemeClr val="tx1">
+                  <a:lumMod val="65000"/>
+                  <a:lumOff val="35000"/>
+                </a:schemeClr>
+              </a:solidFill>
+              <a:latin typeface="+mn-lt"/>
+              <a:ea typeface="+mn-ea"/>
+              <a:cs typeface="+mn-cs"/>
+            </a:defRPr>
+          </a:pPr>
+          <a:endParaRPr lang="en-US"/>
+        </a:p>
+      </c:txPr>
+    </c:title>
+    <c:autoTitleDeleted val="0"/>
+    <c:plotArea>
+      <c:layout/>
+      <c:pieChart>
+        <c:varyColors val="1"/>
+        <c:ser>
+          <c:idx val="0"/>
+          <c:order val="0"/>
+          <c:tx>
+            <c:strRef>
+              <c:f>Sheet1!$B$1</c:f>
+              <c:strCache>
+                <c:ptCount val="1"/>
+                <c:pt idx="0">
+                  <c:v>VCS</c:v>
+                </c:pt>
+              </c:strCache>
+            </c:strRef>
+          </c:tx>
+          <c:dPt>
+            <c:idx val="0"/>
+            <c:bubble3D val="0"/>
+            <c:spPr>
+              <a:gradFill rotWithShape="1">
+                <a:gsLst>
+                  <a:gs pos="0">
+                    <a:schemeClr val="accent1">
+                      <a:tint val="96000"/>
+                      <a:lumMod val="102000"/>
+                    </a:schemeClr>
+                  </a:gs>
+                  <a:gs pos="100000">
+                    <a:schemeClr val="accent1">
+                      <a:shade val="88000"/>
+                      <a:lumMod val="94000"/>
+                    </a:schemeClr>
+                  </a:gs>
+                </a:gsLst>
+                <a:path path="circle">
+                  <a:fillToRect l="50000" t="100000" r="100000" b="50000"/>
+                </a:path>
+              </a:gradFill>
+              <a:ln>
+                <a:noFill/>
+              </a:ln>
+              <a:effectLst>
+                <a:outerShdw blurRad="38100" dist="25400" dir="5400000" rotWithShape="0">
+                  <a:srgbClr val="000000">
+                    <a:alpha val="64000"/>
+                  </a:srgbClr>
+                </a:outerShdw>
+              </a:effectLst>
+              <a:scene3d>
+                <a:camera prst="orthographicFront">
+                  <a:rot lat="0" lon="0" rev="0"/>
+                </a:camera>
+                <a:lightRig rig="threePt" dir="tl">
+                  <a:rot lat="0" lon="0" rev="1200000"/>
+                </a:lightRig>
+              </a:scene3d>
+              <a:sp3d>
+                <a:bevelT w="25400" h="12700"/>
+              </a:sp3d>
+            </c:spPr>
+          </c:dPt>
+          <c:dPt>
+            <c:idx val="1"/>
+            <c:bubble3D val="0"/>
+            <c:spPr>
+              <a:gradFill rotWithShape="1">
+                <a:gsLst>
+                  <a:gs pos="0">
+                    <a:schemeClr val="accent2">
+                      <a:tint val="96000"/>
+                      <a:lumMod val="102000"/>
+                    </a:schemeClr>
+                  </a:gs>
+                  <a:gs pos="100000">
+                    <a:schemeClr val="accent2">
+                      <a:shade val="88000"/>
+                      <a:lumMod val="94000"/>
+                    </a:schemeClr>
+                  </a:gs>
+                </a:gsLst>
+                <a:path path="circle">
+                  <a:fillToRect l="50000" t="100000" r="100000" b="50000"/>
+                </a:path>
+              </a:gradFill>
+              <a:ln>
+                <a:noFill/>
+              </a:ln>
+              <a:effectLst>
+                <a:outerShdw blurRad="38100" dist="25400" dir="5400000" rotWithShape="0">
+                  <a:srgbClr val="000000">
+                    <a:alpha val="64000"/>
+                  </a:srgbClr>
+                </a:outerShdw>
+              </a:effectLst>
+              <a:scene3d>
+                <a:camera prst="orthographicFront">
+                  <a:rot lat="0" lon="0" rev="0"/>
+                </a:camera>
+                <a:lightRig rig="threePt" dir="tl">
+                  <a:rot lat="0" lon="0" rev="1200000"/>
+                </a:lightRig>
+              </a:scene3d>
+              <a:sp3d>
+                <a:bevelT w="25400" h="12700"/>
+              </a:sp3d>
+            </c:spPr>
+          </c:dPt>
+          <c:dPt>
+            <c:idx val="2"/>
+            <c:bubble3D val="0"/>
+            <c:spPr>
+              <a:gradFill rotWithShape="1">
+                <a:gsLst>
+                  <a:gs pos="0">
+                    <a:schemeClr val="accent3">
+                      <a:tint val="96000"/>
+                      <a:lumMod val="102000"/>
+                    </a:schemeClr>
+                  </a:gs>
+                  <a:gs pos="100000">
+                    <a:schemeClr val="accent3">
+                      <a:shade val="88000"/>
+                      <a:lumMod val="94000"/>
+                    </a:schemeClr>
+                  </a:gs>
+                </a:gsLst>
+                <a:path path="circle">
+                  <a:fillToRect l="50000" t="100000" r="100000" b="50000"/>
+                </a:path>
+              </a:gradFill>
+              <a:ln>
+                <a:noFill/>
+              </a:ln>
+              <a:effectLst>
+                <a:outerShdw blurRad="38100" dist="25400" dir="5400000" rotWithShape="0">
+                  <a:srgbClr val="000000">
+                    <a:alpha val="64000"/>
+                  </a:srgbClr>
+                </a:outerShdw>
+              </a:effectLst>
+              <a:scene3d>
+                <a:camera prst="orthographicFront">
+                  <a:rot lat="0" lon="0" rev="0"/>
+                </a:camera>
+                <a:lightRig rig="threePt" dir="tl">
+                  <a:rot lat="0" lon="0" rev="1200000"/>
+                </a:lightRig>
+              </a:scene3d>
+              <a:sp3d>
+                <a:bevelT w="25400" h="12700"/>
+              </a:sp3d>
+            </c:spPr>
+          </c:dPt>
+          <c:dPt>
+            <c:idx val="3"/>
+            <c:bubble3D val="0"/>
+            <c:spPr>
+              <a:gradFill rotWithShape="1">
+                <a:gsLst>
+                  <a:gs pos="0">
+                    <a:schemeClr val="accent4">
+                      <a:tint val="96000"/>
+                      <a:lumMod val="102000"/>
+                    </a:schemeClr>
+                  </a:gs>
+                  <a:gs pos="100000">
+                    <a:schemeClr val="accent4">
+                      <a:shade val="88000"/>
+                      <a:lumMod val="94000"/>
+                    </a:schemeClr>
+                  </a:gs>
+                </a:gsLst>
+                <a:path path="circle">
+                  <a:fillToRect l="50000" t="100000" r="100000" b="50000"/>
+                </a:path>
+              </a:gradFill>
+              <a:ln>
+                <a:noFill/>
+              </a:ln>
+              <a:effectLst>
+                <a:outerShdw blurRad="38100" dist="25400" dir="5400000" rotWithShape="0">
+                  <a:srgbClr val="000000">
+                    <a:alpha val="64000"/>
+                  </a:srgbClr>
+                </a:outerShdw>
+              </a:effectLst>
+              <a:scene3d>
+                <a:camera prst="orthographicFront">
+                  <a:rot lat="0" lon="0" rev="0"/>
+                </a:camera>
+                <a:lightRig rig="threePt" dir="tl">
+                  <a:rot lat="0" lon="0" rev="1200000"/>
+                </a:lightRig>
+              </a:scene3d>
+              <a:sp3d>
+                <a:bevelT w="25400" h="12700"/>
+              </a:sp3d>
+            </c:spPr>
+          </c:dPt>
+          <c:dPt>
+            <c:idx val="4"/>
+            <c:bubble3D val="0"/>
+            <c:spPr>
+              <a:gradFill rotWithShape="1">
+                <a:gsLst>
+                  <a:gs pos="0">
+                    <a:schemeClr val="accent5">
+                      <a:tint val="96000"/>
+                      <a:lumMod val="102000"/>
+                    </a:schemeClr>
+                  </a:gs>
+                  <a:gs pos="100000">
+                    <a:schemeClr val="accent5">
+                      <a:shade val="88000"/>
+                      <a:lumMod val="94000"/>
+                    </a:schemeClr>
+                  </a:gs>
+                </a:gsLst>
+                <a:path path="circle">
+                  <a:fillToRect l="50000" t="100000" r="100000" b="50000"/>
+                </a:path>
+              </a:gradFill>
+              <a:ln>
+                <a:noFill/>
+              </a:ln>
+              <a:effectLst>
+                <a:outerShdw blurRad="38100" dist="25400" dir="5400000" rotWithShape="0">
+                  <a:srgbClr val="000000">
+                    <a:alpha val="64000"/>
+                  </a:srgbClr>
+                </a:outerShdw>
+              </a:effectLst>
+              <a:scene3d>
+                <a:camera prst="orthographicFront">
+                  <a:rot lat="0" lon="0" rev="0"/>
+                </a:camera>
+                <a:lightRig rig="threePt" dir="tl">
+                  <a:rot lat="0" lon="0" rev="1200000"/>
+                </a:lightRig>
+              </a:scene3d>
+              <a:sp3d>
+                <a:bevelT w="25400" h="12700"/>
+              </a:sp3d>
+            </c:spPr>
+          </c:dPt>
+          <c:dPt>
+            <c:idx val="5"/>
+            <c:bubble3D val="0"/>
+            <c:spPr>
+              <a:gradFill rotWithShape="1">
+                <a:gsLst>
+                  <a:gs pos="0">
+                    <a:schemeClr val="accent6">
+                      <a:tint val="96000"/>
+                      <a:lumMod val="102000"/>
+                    </a:schemeClr>
+                  </a:gs>
+                  <a:gs pos="100000">
+                    <a:schemeClr val="accent6">
+                      <a:shade val="88000"/>
+                      <a:lumMod val="94000"/>
+                    </a:schemeClr>
+                  </a:gs>
+                </a:gsLst>
+                <a:path path="circle">
+                  <a:fillToRect l="50000" t="100000" r="100000" b="50000"/>
+                </a:path>
+              </a:gradFill>
+              <a:ln>
+                <a:noFill/>
+              </a:ln>
+              <a:effectLst>
+                <a:outerShdw blurRad="38100" dist="25400" dir="5400000" rotWithShape="0">
+                  <a:srgbClr val="000000">
+                    <a:alpha val="64000"/>
+                  </a:srgbClr>
+                </a:outerShdw>
+              </a:effectLst>
+              <a:scene3d>
+                <a:camera prst="orthographicFront">
+                  <a:rot lat="0" lon="0" rev="0"/>
+                </a:camera>
+                <a:lightRig rig="threePt" dir="tl">
+                  <a:rot lat="0" lon="0" rev="1200000"/>
+                </a:lightRig>
+              </a:scene3d>
+              <a:sp3d>
+                <a:bevelT w="25400" h="12700"/>
+              </a:sp3d>
+            </c:spPr>
+          </c:dPt>
+          <c:cat>
+            <c:strRef>
+              <c:f>Sheet1!$A$2:$A$7</c:f>
+              <c:strCache>
+                <c:ptCount val="5"/>
+                <c:pt idx="0">
+                  <c:v>Git</c:v>
+                </c:pt>
+                <c:pt idx="1">
+                  <c:v>Mercurial</c:v>
+                </c:pt>
+                <c:pt idx="2">
+                  <c:v>SVN</c:v>
+                </c:pt>
+                <c:pt idx="3">
+                  <c:v>Perforce</c:v>
+                </c:pt>
+                <c:pt idx="4">
+                  <c:v>CVS</c:v>
+                </c:pt>
+              </c:strCache>
+            </c:strRef>
+          </c:cat>
+          <c:val>
+            <c:numRef>
+              <c:f>Sheet1!$B$2:$B$7</c:f>
+              <c:numCache>
+                <c:formatCode>General</c:formatCode>
+                <c:ptCount val="6"/>
+                <c:pt idx="0">
+                  <c:v>70.7</c:v>
+                </c:pt>
+                <c:pt idx="1">
+                  <c:v>13.5</c:v>
+                </c:pt>
+                <c:pt idx="2">
+                  <c:v>13.5</c:v>
+                </c:pt>
+                <c:pt idx="3">
+                  <c:v>1.5</c:v>
+                </c:pt>
+                <c:pt idx="4">
+                  <c:v>0.8</c:v>
+                </c:pt>
+              </c:numCache>
+            </c:numRef>
+          </c:val>
+        </c:ser>
+        <c:dLbls>
+          <c:showLegendKey val="0"/>
+          <c:showVal val="0"/>
+          <c:showCatName val="0"/>
+          <c:showSerName val="0"/>
+          <c:showPercent val="0"/>
+          <c:showBubbleSize val="0"/>
+          <c:showLeaderLines val="1"/>
+        </c:dLbls>
+        <c:firstSliceAng val="0"/>
+      </c:pieChart>
+      <c:spPr>
+        <a:noFill/>
+        <a:ln>
+          <a:noFill/>
+        </a:ln>
+        <a:effectLst/>
+      </c:spPr>
+    </c:plotArea>
+    <c:legend>
+      <c:legendPos val="b"/>
+      <c:layout/>
+      <c:overlay val="0"/>
+      <c:spPr>
+        <a:noFill/>
+        <a:ln>
+          <a:noFill/>
+        </a:ln>
+        <a:effectLst/>
+      </c:spPr>
+      <c:txPr>
+        <a:bodyPr rot="0" spcFirstLastPara="1" vertOverflow="ellipsis" vert="horz" wrap="square" anchor="ctr" anchorCtr="1"/>
+        <a:lstStyle/>
+        <a:p>
+          <a:pPr>
+            <a:defRPr sz="1197" b="0" i="0" u="none" strike="noStrike" kern="1200" baseline="0">
+              <a:solidFill>
+                <a:schemeClr val="tx1">
+                  <a:lumMod val="65000"/>
+                  <a:lumOff val="35000"/>
+                </a:schemeClr>
+              </a:solidFill>
+              <a:latin typeface="+mn-lt"/>
+              <a:ea typeface="+mn-ea"/>
+              <a:cs typeface="+mn-cs"/>
+            </a:defRPr>
+          </a:pPr>
+          <a:endParaRPr lang="en-US"/>
+        </a:p>
+      </c:txPr>
+    </c:legend>
+    <c:plotVisOnly val="1"/>
+    <c:dispBlanksAs val="gap"/>
+    <c:showDLblsOverMax val="0"/>
+  </c:chart>
+  <c:spPr>
+    <a:noFill/>
+    <a:ln>
+      <a:noFill/>
+    </a:ln>
+    <a:effectLst/>
+  </c:spPr>
+  <c:txPr>
+    <a:bodyPr/>
+    <a:lstStyle/>
+    <a:p>
+      <a:pPr>
+        <a:defRPr/>
+      </a:pPr>
+      <a:endParaRPr lang="en-US"/>
+    </a:p>
+  </c:txPr>
+  <c:externalData r:id="rId3">
+    <c:autoUpdate val="0"/>
+  </c:externalData>
+</c:chartSpace>
+</file>
+
+<file path=ppt/charts/colors1.xml><?xml version="1.0" encoding="utf-8"?>
+<cs:colorStyle xmlns:cs="http://schemas.microsoft.com/office/drawing/2012/chartStyle" xmlns:a="http://schemas.openxmlformats.org/drawingml/2006/main" meth="cycle" id="10">
+  <a:schemeClr val="accent1"/>
+  <a:schemeClr val="accent2"/>
+  <a:schemeClr val="accent3"/>
+  <a:schemeClr val="accent4"/>
+  <a:schemeClr val="accent5"/>
+  <a:schemeClr val="accent6"/>
+  <cs:variation/>
+  <cs:variation>
+    <a:lumMod val="60000"/>
+  </cs:variation>
+  <cs:variation>
+    <a:lumMod val="80000"/>
+    <a:lumOff val="20000"/>
+  </cs:variation>
+  <cs:variation>
+    <a:lumMod val="80000"/>
+  </cs:variation>
+  <cs:variation>
+    <a:lumMod val="60000"/>
+    <a:lumOff val="40000"/>
+  </cs:variation>
+  <cs:variation>
+    <a:lumMod val="50000"/>
+  </cs:variation>
+  <cs:variation>
+    <a:lumMod val="70000"/>
+    <a:lumOff val="30000"/>
+  </cs:variation>
+  <cs:variation>
+    <a:lumMod val="70000"/>
+  </cs:variation>
+  <cs:variation>
+    <a:lumMod val="50000"/>
+    <a:lumOff val="50000"/>
+  </cs:variation>
+</cs:colorStyle>
+</file>
+
+<file path=ppt/charts/style1.xml><?xml version="1.0" encoding="utf-8"?>
+<cs:chartStyle xmlns:cs="http://schemas.microsoft.com/office/drawing/2012/chartStyle" xmlns:a="http://schemas.openxmlformats.org/drawingml/2006/main" id="344">
+  <cs:axisTitle>
+    <cs:lnRef idx="0"/>
+    <cs:fillRef idx="0"/>
+    <cs:effectRef idx="0"/>
+    <cs:fontRef idx="minor">
+      <a:schemeClr val="tx1">
+        <a:lumMod val="65000"/>
+        <a:lumOff val="35000"/>
+      </a:schemeClr>
+    </cs:fontRef>
+    <cs:defRPr sz="1197" kern="1200"/>
+  </cs:axisTitle>
+  <cs:categoryAxis>
+    <cs:lnRef idx="0"/>
+    <cs:fillRef idx="0"/>
+    <cs:effectRef idx="0"/>
+    <cs:fontRef idx="minor">
+      <a:schemeClr val="tx1">
+        <a:lumMod val="65000"/>
+        <a:lumOff val="35000"/>
+      </a:schemeClr>
+    </cs:fontRef>
+    <cs:spPr>
+      <a:ln w="12700" cap="flat" cmpd="sng" algn="ctr">
+        <a:solidFill>
+          <a:schemeClr val="tx1">
+            <a:lumMod val="15000"/>
+            <a:lumOff val="85000"/>
+          </a:schemeClr>
+        </a:solidFill>
+        <a:round/>
+      </a:ln>
+    </cs:spPr>
+    <cs:defRPr sz="1197" kern="1200"/>
+  </cs:categoryAxis>
+  <cs:chartArea mods="allowNoFillOverride allowNoLineOverride">
+    <cs:lnRef idx="0"/>
+    <cs:fillRef idx="0"/>
+    <cs:effectRef idx="0"/>
+    <cs:fontRef idx="minor">
+      <a:schemeClr val="tx2"/>
+    </cs:fontRef>
+    <cs:spPr>
+      <a:solidFill>
+        <a:schemeClr val="bg1"/>
+      </a:solidFill>
+      <a:ln w="9525" cap="flat" cmpd="sng" algn="ctr">
+        <a:solidFill>
+          <a:schemeClr val="tx1">
+            <a:lumMod val="15000"/>
+            <a:lumOff val="85000"/>
+          </a:schemeClr>
+        </a:solidFill>
+        <a:round/>
+      </a:ln>
+    </cs:spPr>
+    <cs:defRPr sz="1197" kern="1200"/>
+  </cs:chartArea>
+  <cs:dataLabel>
+    <cs:lnRef idx="0"/>
+    <cs:fillRef idx="0"/>
+    <cs:effectRef idx="0"/>
+    <cs:fontRef idx="minor">
+      <a:schemeClr val="tx1">
+        <a:lumMod val="75000"/>
+        <a:lumOff val="25000"/>
+      </a:schemeClr>
+    </cs:fontRef>
+    <cs:defRPr sz="1197" kern="1200"/>
+  </cs:dataLabel>
+  <cs:dataLabelCallout>
+    <cs:lnRef idx="0"/>
+    <cs:fillRef idx="0"/>
+    <cs:effectRef idx="0"/>
+    <cs:fontRef idx="minor">
+      <a:schemeClr val="dk1">
+        <a:lumMod val="65000"/>
+        <a:lumOff val="35000"/>
+      </a:schemeClr>
+    </cs:fontRef>
+    <cs:spPr>
+      <a:solidFill>
+        <a:schemeClr val="lt1"/>
+      </a:solidFill>
+      <a:ln>
+        <a:solidFill>
+          <a:schemeClr val="dk1">
+            <a:lumMod val="25000"/>
+            <a:lumOff val="75000"/>
+          </a:schemeClr>
+        </a:solidFill>
+      </a:ln>
+    </cs:spPr>
+    <cs:defRPr sz="1197" kern="1200"/>
+    <cs:bodyPr rot="0" spcFirstLastPara="1" vertOverflow="clip" horzOverflow="clip" vert="horz" wrap="square" lIns="36576" tIns="18288" rIns="36576" bIns="18288" anchor="ctr" anchorCtr="1">
+      <a:spAutoFit/>
+    </cs:bodyPr>
+  </cs:dataLabelCallout>
+  <cs:dataPoint>
+    <cs:lnRef idx="0"/>
+    <cs:fillRef idx="3">
+      <cs:styleClr val="auto"/>
+    </cs:fillRef>
+    <cs:effectRef idx="3"/>
+    <cs:fontRef idx="minor">
+      <a:schemeClr val="tx1"/>
+    </cs:fontRef>
+  </cs:dataPoint>
+  <cs:dataPoint3D>
+    <cs:lnRef idx="0"/>
+    <cs:fillRef idx="3">
+      <cs:styleClr val="auto"/>
+    </cs:fillRef>
+    <cs:effectRef idx="3"/>
+    <cs:fontRef idx="minor">
+      <a:schemeClr val="tx1"/>
+    </cs:fontRef>
+  </cs:dataPoint3D>
+  <cs:dataPointLine>
+    <cs:lnRef idx="0">
+      <cs:styleClr val="auto"/>
+    </cs:lnRef>
+    <cs:fillRef idx="3"/>
+    <cs:effectRef idx="3"/>
+    <cs:fontRef idx="minor">
+      <a:schemeClr val="tx1"/>
+    </cs:fontRef>
+    <cs:spPr>
+      <a:ln w="34925" cap="rnd">
+        <a:solidFill>
+          <a:schemeClr val="phClr"/>
+        </a:solidFill>
+        <a:round/>
+      </a:ln>
+    </cs:spPr>
+  </cs:dataPointLine>
+  <cs:dataPointMarker>
+    <cs:lnRef idx="0">
+      <cs:styleClr val="auto"/>
+    </cs:lnRef>
+    <cs:fillRef idx="3">
+      <cs:styleClr val="auto"/>
+    </cs:fillRef>
+    <cs:effectRef idx="3"/>
+    <cs:fontRef idx="minor">
+      <a:schemeClr val="tx1"/>
+    </cs:fontRef>
+    <cs:spPr>
+      <a:ln w="9525">
+        <a:solidFill>
+          <a:schemeClr val="phClr"/>
+        </a:solidFill>
+        <a:round/>
+      </a:ln>
+    </cs:spPr>
+  </cs:dataPointMarker>
+  <cs:dataPointMarkerLayout symbol="circle" size="6"/>
+  <cs:dataPointWireframe>
+    <cs:lnRef idx="0">
+      <cs:styleClr val="auto"/>
+    </cs:lnRef>
+    <cs:fillRef idx="3"/>
+    <cs:effectRef idx="3"/>
+    <cs:fontRef idx="minor">
+      <a:schemeClr val="tx1"/>
+    </cs:fontRef>
+    <cs:spPr>
+      <a:ln w="9525" cap="rnd">
+        <a:solidFill>
+          <a:schemeClr val="phClr"/>
+        </a:solidFill>
+        <a:round/>
+      </a:ln>
+    </cs:spPr>
+  </cs:dataPointWireframe>
+  <cs:dataTable>
+    <cs:lnRef idx="0"/>
+    <cs:fillRef idx="0"/>
+    <cs:effectRef idx="0"/>
+    <cs:fontRef idx="minor">
+      <a:schemeClr val="tx1">
+        <a:lumMod val="65000"/>
+        <a:lumOff val="35000"/>
+      </a:schemeClr>
+    </cs:fontRef>
+    <cs:spPr>
+      <a:noFill/>
+      <a:ln w="9525" cap="flat" cmpd="sng" algn="ctr">
+        <a:solidFill>
+          <a:schemeClr val="tx1">
+            <a:lumMod val="15000"/>
+            <a:lumOff val="85000"/>
+          </a:schemeClr>
+        </a:solidFill>
+        <a:round/>
+      </a:ln>
+    </cs:spPr>
+    <cs:defRPr sz="1197" kern="1200"/>
+  </cs:dataTable>
+  <cs:downBar>
+    <cs:lnRef idx="0"/>
+    <cs:fillRef idx="0"/>
+    <cs:effectRef idx="0"/>
+    <cs:fontRef idx="minor">
+      <a:schemeClr val="dk1"/>
+    </cs:fontRef>
+    <cs:spPr>
+      <a:solidFill>
+        <a:schemeClr val="dk1">
+          <a:lumMod val="65000"/>
+          <a:lumOff val="35000"/>
+        </a:schemeClr>
+      </a:solidFill>
+      <a:ln w="9525">
+        <a:solidFill>
+          <a:schemeClr val="tx1">
+            <a:lumMod val="65000"/>
+            <a:lumOff val="35000"/>
+          </a:schemeClr>
+        </a:solidFill>
+      </a:ln>
+    </cs:spPr>
+  </cs:downBar>
+  <cs:dropLine>
+    <cs:lnRef idx="0"/>
+    <cs:fillRef idx="0"/>
+    <cs:effectRef idx="0"/>
+    <cs:fontRef idx="minor">
+      <a:schemeClr val="tx1"/>
+    </cs:fontRef>
+    <cs:spPr>
+      <a:ln w="9525" cap="flat" cmpd="sng" algn="ctr">
+        <a:solidFill>
+          <a:schemeClr val="tx1">
+            <a:lumMod val="35000"/>
+            <a:lumOff val="65000"/>
+          </a:schemeClr>
+        </a:solidFill>
+        <a:round/>
+      </a:ln>
+    </cs:spPr>
+  </cs:dropLine>
+  <cs:errorBar>
+    <cs:lnRef idx="0"/>
+    <cs:fillRef idx="0"/>
+    <cs:effectRef idx="0"/>
+    <cs:fontRef idx="minor">
+      <a:schemeClr val="tx1"/>
+    </cs:fontRef>
+    <cs:spPr>
+      <a:ln w="9525" cap="flat" cmpd="sng" algn="ctr">
+        <a:solidFill>
+          <a:schemeClr val="tx1">
+            <a:lumMod val="65000"/>
+            <a:lumOff val="35000"/>
+          </a:schemeClr>
+        </a:solidFill>
+        <a:round/>
+      </a:ln>
+    </cs:spPr>
+  </cs:errorBar>
+  <cs:floor>
+    <cs:lnRef idx="0"/>
+    <cs:fillRef idx="0"/>
+    <cs:effectRef idx="0"/>
+    <cs:fontRef idx="minor">
+      <a:schemeClr val="lt1"/>
+    </cs:fontRef>
+  </cs:floor>
+  <cs:gridlineMajor>
+    <cs:lnRef idx="0"/>
+    <cs:fillRef idx="0"/>
+    <cs:effectRef idx="0"/>
+    <cs:fontRef idx="minor">
+      <a:schemeClr val="tx1"/>
+    </cs:fontRef>
+    <cs:spPr>
+      <a:ln w="9525" cap="flat" cmpd="sng" algn="ctr">
+        <a:solidFill>
+          <a:schemeClr val="tx1">
+            <a:lumMod val="15000"/>
+            <a:lumOff val="85000"/>
+          </a:schemeClr>
+        </a:solidFill>
+        <a:round/>
+      </a:ln>
+    </cs:spPr>
+  </cs:gridlineMajor>
+  <cs:gridlineMinor>
+    <cs:lnRef idx="0"/>
+    <cs:fillRef idx="0"/>
+    <cs:effectRef idx="0"/>
+    <cs:fontRef idx="minor">
+      <a:schemeClr val="tx1"/>
+    </cs:fontRef>
+    <cs:spPr>
+      <a:ln w="9525" cap="flat" cmpd="sng" algn="ctr">
+        <a:solidFill>
+          <a:schemeClr val="tx1">
+            <a:lumMod val="5000"/>
+            <a:lumOff val="95000"/>
+          </a:schemeClr>
+        </a:solidFill>
+        <a:round/>
+      </a:ln>
+    </cs:spPr>
+  </cs:gridlineMinor>
+  <cs:hiLoLine>
+    <cs:lnRef idx="0"/>
+    <cs:fillRef idx="0"/>
+    <cs:effectRef idx="0"/>
+    <cs:fontRef idx="minor">
+      <a:schemeClr val="tx1"/>
+    </cs:fontRef>
+    <cs:spPr>
+      <a:ln w="9525" cap="flat" cmpd="sng" algn="ctr">
+        <a:solidFill>
+          <a:schemeClr val="tx1">
+            <a:lumMod val="75000"/>
+            <a:lumOff val="25000"/>
+          </a:schemeClr>
+        </a:solidFill>
+        <a:round/>
+      </a:ln>
+    </cs:spPr>
+  </cs:hiLoLine>
+  <cs:leaderLine>
+    <cs:lnRef idx="0"/>
+    <cs:fillRef idx="0"/>
+    <cs:effectRef idx="0"/>
+    <cs:fontRef idx="minor">
+      <a:schemeClr val="tx1"/>
+    </cs:fontRef>
+    <cs:spPr>
+      <a:ln w="9525" cap="flat" cmpd="sng" algn="ctr">
+        <a:solidFill>
+          <a:schemeClr val="tx1">
+            <a:lumMod val="35000"/>
+            <a:lumOff val="65000"/>
+          </a:schemeClr>
+        </a:solidFill>
+        <a:round/>
+      </a:ln>
+    </cs:spPr>
+  </cs:leaderLine>
+  <cs:legend>
+    <cs:lnRef idx="0"/>
+    <cs:fillRef idx="0"/>
+    <cs:effectRef idx="0"/>
+    <cs:fontRef idx="minor">
+      <a:schemeClr val="tx1">
+        <a:lumMod val="65000"/>
+        <a:lumOff val="35000"/>
+      </a:schemeClr>
+    </cs:fontRef>
+    <cs:defRPr sz="1197" kern="1200"/>
+  </cs:legend>
+  <cs:plotArea>
+    <cs:lnRef idx="0"/>
+    <cs:fillRef idx="0"/>
+    <cs:effectRef idx="0"/>
+    <cs:fontRef idx="minor">
+      <a:schemeClr val="lt1"/>
+    </cs:fontRef>
+  </cs:plotArea>
+  <cs:plotArea3D>
+    <cs:lnRef idx="0"/>
+    <cs:fillRef idx="0"/>
+    <cs:effectRef idx="0"/>
+    <cs:fontRef idx="minor">
+      <a:schemeClr val="lt1"/>
+    </cs:fontRef>
+  </cs:plotArea3D>
+  <cs:seriesAxis>
+    <cs:lnRef idx="0"/>
+    <cs:fillRef idx="0"/>
+    <cs:effectRef idx="0"/>
+    <cs:fontRef idx="minor">
+      <a:schemeClr val="tx1">
+        <a:lumMod val="65000"/>
+        <a:lumOff val="35000"/>
+      </a:schemeClr>
+    </cs:fontRef>
+    <cs:spPr>
+      <a:ln w="12700" cap="flat" cmpd="sng" algn="ctr">
+        <a:solidFill>
+          <a:schemeClr val="tx1">
+            <a:lumMod val="15000"/>
+            <a:lumOff val="85000"/>
+          </a:schemeClr>
+        </a:solidFill>
+        <a:round/>
+      </a:ln>
+    </cs:spPr>
+    <cs:defRPr sz="1197" kern="1200"/>
+  </cs:seriesAxis>
+  <cs:seriesLine>
+    <cs:lnRef idx="0"/>
+    <cs:fillRef idx="0"/>
+    <cs:effectRef idx="0"/>
+    <cs:fontRef idx="minor">
+      <a:schemeClr val="tx1"/>
+    </cs:fontRef>
+    <cs:spPr>
+      <a:ln w="9525" cap="flat" cmpd="sng" algn="ctr">
+        <a:solidFill>
+          <a:schemeClr val="tx1">
+            <a:lumMod val="35000"/>
+            <a:lumOff val="65000"/>
+          </a:schemeClr>
+        </a:solidFill>
+        <a:round/>
+      </a:ln>
+    </cs:spPr>
+  </cs:seriesLine>
+  <cs:title>
+    <cs:lnRef idx="0"/>
+    <cs:fillRef idx="0"/>
+    <cs:effectRef idx="0"/>
+    <cs:fontRef idx="minor">
+      <a:schemeClr val="tx1">
+        <a:lumMod val="65000"/>
+        <a:lumOff val="35000"/>
+      </a:schemeClr>
+    </cs:fontRef>
+    <cs:defRPr sz="2128" b="1" kern="1200" baseline="0"/>
+  </cs:title>
+  <cs:trendline>
+    <cs:lnRef idx="0">
+      <cs:styleClr val="auto"/>
+    </cs:lnRef>
+    <cs:fillRef idx="0"/>
+    <cs:effectRef idx="0"/>
+    <cs:fontRef idx="minor">
+      <a:schemeClr val="lt1"/>
+    </cs:fontRef>
+    <cs:spPr>
+      <a:ln w="19050" cap="rnd">
+        <a:solidFill>
+          <a:schemeClr val="phClr"/>
+        </a:solidFill>
+      </a:ln>
+    </cs:spPr>
+  </cs:trendline>
+  <cs:trendlineLabel>
+    <cs:lnRef idx="0"/>
+    <cs:fillRef idx="0"/>
+    <cs:effectRef idx="0"/>
+    <cs:fontRef idx="minor">
+      <a:schemeClr val="tx1">
+        <a:lumMod val="65000"/>
+        <a:lumOff val="35000"/>
+      </a:schemeClr>
+    </cs:fontRef>
+    <cs:defRPr sz="1197" kern="1200"/>
+  </cs:trendlineLabel>
+  <cs:upBar>
+    <cs:lnRef idx="0"/>
+    <cs:fillRef idx="0"/>
+    <cs:effectRef idx="0"/>
+    <cs:fontRef idx="minor">
+      <a:schemeClr val="dk1"/>
+    </cs:fontRef>
+    <cs:spPr>
+      <a:solidFill>
+        <a:schemeClr val="lt1"/>
+      </a:solidFill>
+      <a:ln w="9525">
+        <a:solidFill>
+          <a:schemeClr val="tx1">
+            <a:lumMod val="15000"/>
+            <a:lumOff val="85000"/>
+          </a:schemeClr>
+        </a:solidFill>
+      </a:ln>
+    </cs:spPr>
+  </cs:upBar>
+  <cs:valueAxis>
+    <cs:lnRef idx="0"/>
+    <cs:fillRef idx="0"/>
+    <cs:effectRef idx="0"/>
+    <cs:fontRef idx="minor">
+      <a:schemeClr val="tx1">
+        <a:lumMod val="65000"/>
+        <a:lumOff val="35000"/>
+      </a:schemeClr>
+    </cs:fontRef>
+    <cs:defRPr sz="1197" kern="1200"/>
+  </cs:valueAxis>
+  <cs:wall>
+    <cs:lnRef idx="0"/>
+    <cs:fillRef idx="0"/>
+    <cs:effectRef idx="0"/>
+    <cs:fontRef idx="minor">
+      <a:schemeClr val="lt1"/>
+    </cs:fontRef>
+  </cs:wall>
+</cs:chartStyle>
+</file>
+
 <file path=ppt/notesMasters/notesMaster1.xml><?xml version="1.0" encoding="utf-8"?>
 <p:notesMaster xmlns:a="http://schemas.openxmlformats.org/drawingml/2006/main" xmlns:r="http://schemas.openxmlformats.org/officeDocument/2006/relationships" xmlns:p="http://schemas.openxmlformats.org/presentationml/2006/main">
   <p:cSld>
@@ -201,7 +1211,7 @@
           <a:p>
             <a:fld id="{94BE676F-555C-AE4D-B3E0-F8BCFFB2C399}" type="datetimeFigureOut">
               <a:rPr lang="en-US" smtClean="0"/>
-              <a:t>10/16/2017</a:t>
+              <a:t>10/16/17</a:t>
             </a:fld>
             <a:endParaRPr lang="en-US"/>
           </a:p>
@@ -359,7 +1369,7 @@
           <a:p>
             <a:fld id="{62DC9C40-1CE6-A340-B000-CBE4CF18F9C7}" type="slidenum">
               <a:rPr lang="en-US" smtClean="0"/>
-              <a:t>‹N°›</a:t>
+              <a:t>‹#›</a:t>
             </a:fld>
             <a:endParaRPr lang="en-US"/>
           </a:p>
@@ -970,7 +1980,7 @@
           <a:p>
             <a:fld id="{8AEB1F6E-BE39-9349-BC16-46503606C6CE}" type="datetimeFigureOut">
               <a:rPr lang="en-US" smtClean="0"/>
-              <a:t>10/16/2017</a:t>
+              <a:t>10/16/17</a:t>
             </a:fld>
             <a:endParaRPr lang="en-US"/>
           </a:p>
@@ -1017,7 +2027,7 @@
           <a:p>
             <a:fld id="{8F1441E5-2681-D342-A4D7-CDD8BDD1E122}" type="slidenum">
               <a:rPr lang="en-US" smtClean="0"/>
-              <a:t>‹N°›</a:t>
+              <a:t>‹#›</a:t>
             </a:fld>
             <a:endParaRPr lang="en-US"/>
           </a:p>
@@ -1261,7 +2271,7 @@
           <a:p>
             <a:fld id="{8AEB1F6E-BE39-9349-BC16-46503606C6CE}" type="datetimeFigureOut">
               <a:rPr lang="en-US" smtClean="0"/>
-              <a:t>10/16/2017</a:t>
+              <a:t>10/16/17</a:t>
             </a:fld>
             <a:endParaRPr lang="en-US"/>
           </a:p>
@@ -1303,7 +2313,7 @@
           <a:p>
             <a:fld id="{8F1441E5-2681-D342-A4D7-CDD8BDD1E122}" type="slidenum">
               <a:rPr lang="en-US" smtClean="0"/>
-              <a:t>‹N°›</a:t>
+              <a:t>‹#›</a:t>
             </a:fld>
             <a:endParaRPr lang="en-US"/>
           </a:p>
@@ -1504,7 +2514,7 @@
           <a:p>
             <a:fld id="{8AEB1F6E-BE39-9349-BC16-46503606C6CE}" type="datetimeFigureOut">
               <a:rPr lang="en-US" smtClean="0"/>
-              <a:t>10/16/2017</a:t>
+              <a:t>10/16/17</a:t>
             </a:fld>
             <a:endParaRPr lang="en-US"/>
           </a:p>
@@ -1546,7 +2556,7 @@
           <a:p>
             <a:fld id="{8F1441E5-2681-D342-A4D7-CDD8BDD1E122}" type="slidenum">
               <a:rPr lang="en-US" smtClean="0"/>
-              <a:t>‹N°›</a:t>
+              <a:t>‹#›</a:t>
             </a:fld>
             <a:endParaRPr lang="en-US"/>
           </a:p>
@@ -2039,7 +3049,7 @@
           <a:p>
             <a:fld id="{8AEB1F6E-BE39-9349-BC16-46503606C6CE}" type="datetimeFigureOut">
               <a:rPr lang="en-US" smtClean="0"/>
-              <a:t>10/16/2017</a:t>
+              <a:t>10/16/17</a:t>
             </a:fld>
             <a:endParaRPr lang="en-US"/>
           </a:p>
@@ -2081,7 +3091,7 @@
           <a:p>
             <a:fld id="{8F1441E5-2681-D342-A4D7-CDD8BDD1E122}" type="slidenum">
               <a:rPr lang="en-US" smtClean="0"/>
-              <a:t>‹N°›</a:t>
+              <a:t>‹#›</a:t>
             </a:fld>
             <a:endParaRPr lang="en-US"/>
           </a:p>
@@ -2282,7 +3292,7 @@
           <a:p>
             <a:fld id="{8AEB1F6E-BE39-9349-BC16-46503606C6CE}" type="datetimeFigureOut">
               <a:rPr lang="en-US" smtClean="0"/>
-              <a:t>10/16/2017</a:t>
+              <a:t>10/16/17</a:t>
             </a:fld>
             <a:endParaRPr lang="en-US"/>
           </a:p>
@@ -2324,7 +3334,7 @@
           <a:p>
             <a:fld id="{8F1441E5-2681-D342-A4D7-CDD8BDD1E122}" type="slidenum">
               <a:rPr lang="en-US" smtClean="0"/>
-              <a:t>‹N°›</a:t>
+              <a:t>‹#›</a:t>
             </a:fld>
             <a:endParaRPr lang="en-US"/>
           </a:p>
@@ -2809,7 +3819,7 @@
           <a:p>
             <a:fld id="{8AEB1F6E-BE39-9349-BC16-46503606C6CE}" type="datetimeFigureOut">
               <a:rPr lang="en-US" smtClean="0"/>
-              <a:t>10/16/2017</a:t>
+              <a:t>10/16/17</a:t>
             </a:fld>
             <a:endParaRPr lang="en-US"/>
           </a:p>
@@ -2851,7 +3861,7 @@
           <a:p>
             <a:fld id="{8F1441E5-2681-D342-A4D7-CDD8BDD1E122}" type="slidenum">
               <a:rPr lang="en-US" smtClean="0"/>
-              <a:t>‹N°›</a:t>
+              <a:t>‹#›</a:t>
             </a:fld>
             <a:endParaRPr lang="en-US"/>
           </a:p>
@@ -3101,7 +4111,7 @@
           <a:p>
             <a:fld id="{8AEB1F6E-BE39-9349-BC16-46503606C6CE}" type="datetimeFigureOut">
               <a:rPr lang="en-US" smtClean="0"/>
-              <a:t>10/16/2017</a:t>
+              <a:t>10/16/17</a:t>
             </a:fld>
             <a:endParaRPr lang="en-US"/>
           </a:p>
@@ -3143,7 +4153,7 @@
           <a:p>
             <a:fld id="{8F1441E5-2681-D342-A4D7-CDD8BDD1E122}" type="slidenum">
               <a:rPr lang="en-US" smtClean="0"/>
-              <a:t>‹N°›</a:t>
+              <a:t>‹#›</a:t>
             </a:fld>
             <a:endParaRPr lang="en-US"/>
           </a:p>
@@ -3270,7 +4280,7 @@
           <a:p>
             <a:fld id="{8AEB1F6E-BE39-9349-BC16-46503606C6CE}" type="datetimeFigureOut">
               <a:rPr lang="en-US" smtClean="0"/>
-              <a:t>10/16/2017</a:t>
+              <a:t>10/16/17</a:t>
             </a:fld>
             <a:endParaRPr lang="en-US"/>
           </a:p>
@@ -3312,7 +4322,7 @@
           <a:p>
             <a:fld id="{8F1441E5-2681-D342-A4D7-CDD8BDD1E122}" type="slidenum">
               <a:rPr lang="en-US" smtClean="0"/>
-              <a:t>‹N°›</a:t>
+              <a:t>‹#›</a:t>
             </a:fld>
             <a:endParaRPr lang="en-US"/>
           </a:p>
@@ -3445,7 +4455,7 @@
           <a:p>
             <a:fld id="{8AEB1F6E-BE39-9349-BC16-46503606C6CE}" type="datetimeFigureOut">
               <a:rPr lang="en-US" smtClean="0"/>
-              <a:t>10/16/2017</a:t>
+              <a:t>10/16/17</a:t>
             </a:fld>
             <a:endParaRPr lang="en-US"/>
           </a:p>
@@ -3487,7 +4497,7 @@
           <a:p>
             <a:fld id="{8F1441E5-2681-D342-A4D7-CDD8BDD1E122}" type="slidenum">
               <a:rPr lang="en-US" smtClean="0"/>
-              <a:t>‹N°›</a:t>
+              <a:t>‹#›</a:t>
             </a:fld>
             <a:endParaRPr lang="en-US"/>
           </a:p>
@@ -3651,7 +4661,7 @@
           <a:p>
             <a:fld id="{8AEB1F6E-BE39-9349-BC16-46503606C6CE}" type="datetimeFigureOut">
               <a:rPr lang="en-US" smtClean="0"/>
-              <a:t>10/16/2017</a:t>
+              <a:t>10/16/17</a:t>
             </a:fld>
             <a:endParaRPr lang="en-US"/>
           </a:p>
@@ -3698,7 +4708,7 @@
           <a:p>
             <a:fld id="{8F1441E5-2681-D342-A4D7-CDD8BDD1E122}" type="slidenum">
               <a:rPr lang="en-US" smtClean="0"/>
-              <a:t>‹N°›</a:t>
+              <a:t>‹#›</a:t>
             </a:fld>
             <a:endParaRPr lang="en-US"/>
           </a:p>
@@ -3897,7 +4907,7 @@
           <a:p>
             <a:fld id="{8AEB1F6E-BE39-9349-BC16-46503606C6CE}" type="datetimeFigureOut">
               <a:rPr lang="en-US" smtClean="0"/>
-              <a:t>10/16/2017</a:t>
+              <a:t>10/16/17</a:t>
             </a:fld>
             <a:endParaRPr lang="en-US"/>
           </a:p>
@@ -3939,7 +4949,7 @@
           <a:p>
             <a:fld id="{8F1441E5-2681-D342-A4D7-CDD8BDD1E122}" type="slidenum">
               <a:rPr lang="en-US" smtClean="0"/>
-              <a:t>‹N°›</a:t>
+              <a:t>‹#›</a:t>
             </a:fld>
             <a:endParaRPr lang="en-US"/>
           </a:p>
@@ -4239,7 +5249,7 @@
           <a:p>
             <a:fld id="{8AEB1F6E-BE39-9349-BC16-46503606C6CE}" type="datetimeFigureOut">
               <a:rPr lang="en-US" smtClean="0"/>
-              <a:t>10/16/2017</a:t>
+              <a:t>10/16/17</a:t>
             </a:fld>
             <a:endParaRPr lang="en-US"/>
           </a:p>
@@ -4281,7 +5291,7 @@
           <a:p>
             <a:fld id="{8F1441E5-2681-D342-A4D7-CDD8BDD1E122}" type="slidenum">
               <a:rPr lang="en-US" smtClean="0"/>
-              <a:t>‹N°›</a:t>
+              <a:t>‹#›</a:t>
             </a:fld>
             <a:endParaRPr lang="en-US"/>
           </a:p>
@@ -4726,7 +5736,7 @@
           <a:p>
             <a:fld id="{8AEB1F6E-BE39-9349-BC16-46503606C6CE}" type="datetimeFigureOut">
               <a:rPr lang="en-US" smtClean="0"/>
-              <a:t>10/16/2017</a:t>
+              <a:t>10/16/17</a:t>
             </a:fld>
             <a:endParaRPr lang="en-US"/>
           </a:p>
@@ -4768,7 +5778,7 @@
           <a:p>
             <a:fld id="{8F1441E5-2681-D342-A4D7-CDD8BDD1E122}" type="slidenum">
               <a:rPr lang="en-US" smtClean="0"/>
-              <a:t>‹N°›</a:t>
+              <a:t>‹#›</a:t>
             </a:fld>
             <a:endParaRPr lang="en-US"/>
           </a:p>
@@ -4839,7 +5849,7 @@
           <a:p>
             <a:fld id="{8AEB1F6E-BE39-9349-BC16-46503606C6CE}" type="datetimeFigureOut">
               <a:rPr lang="en-US" smtClean="0"/>
-              <a:t>10/16/2017</a:t>
+              <a:t>10/16/17</a:t>
             </a:fld>
             <a:endParaRPr lang="en-US"/>
           </a:p>
@@ -4881,7 +5891,7 @@
           <a:p>
             <a:fld id="{8F1441E5-2681-D342-A4D7-CDD8BDD1E122}" type="slidenum">
               <a:rPr lang="en-US" smtClean="0"/>
-              <a:t>‹N°›</a:t>
+              <a:t>‹#›</a:t>
             </a:fld>
             <a:endParaRPr lang="en-US"/>
           </a:p>
@@ -4929,7 +5939,7 @@
           <a:p>
             <a:fld id="{8AEB1F6E-BE39-9349-BC16-46503606C6CE}" type="datetimeFigureOut">
               <a:rPr lang="en-US" smtClean="0"/>
-              <a:t>10/16/2017</a:t>
+              <a:t>10/16/17</a:t>
             </a:fld>
             <a:endParaRPr lang="en-US"/>
           </a:p>
@@ -4971,7 +5981,7 @@
           <a:p>
             <a:fld id="{8F1441E5-2681-D342-A4D7-CDD8BDD1E122}" type="slidenum">
               <a:rPr lang="en-US" smtClean="0"/>
-              <a:t>‹N°›</a:t>
+              <a:t>‹#›</a:t>
             </a:fld>
             <a:endParaRPr lang="en-US"/>
           </a:p>
@@ -5207,7 +6217,7 @@
           <a:p>
             <a:fld id="{8AEB1F6E-BE39-9349-BC16-46503606C6CE}" type="datetimeFigureOut">
               <a:rPr lang="en-US" smtClean="0"/>
-              <a:t>10/16/2017</a:t>
+              <a:t>10/16/17</a:t>
             </a:fld>
             <a:endParaRPr lang="en-US"/>
           </a:p>
@@ -5249,7 +6259,7 @@
           <a:p>
             <a:fld id="{8F1441E5-2681-D342-A4D7-CDD8BDD1E122}" type="slidenum">
               <a:rPr lang="en-US" smtClean="0"/>
-              <a:t>‹N°›</a:t>
+              <a:t>‹#›</a:t>
             </a:fld>
             <a:endParaRPr lang="en-US"/>
           </a:p>
@@ -5493,7 +6503,7 @@
           <a:p>
             <a:fld id="{8AEB1F6E-BE39-9349-BC16-46503606C6CE}" type="datetimeFigureOut">
               <a:rPr lang="en-US" smtClean="0"/>
-              <a:t>10/16/2017</a:t>
+              <a:t>10/16/17</a:t>
             </a:fld>
             <a:endParaRPr lang="en-US"/>
           </a:p>
@@ -5535,7 +6545,7 @@
           <a:p>
             <a:fld id="{8F1441E5-2681-D342-A4D7-CDD8BDD1E122}" type="slidenum">
               <a:rPr lang="en-US" smtClean="0"/>
-              <a:t>‹N°›</a:t>
+              <a:t>‹#›</a:t>
             </a:fld>
             <a:endParaRPr lang="en-US"/>
           </a:p>
@@ -6018,7 +7028,7 @@
           <a:p>
             <a:fld id="{8AEB1F6E-BE39-9349-BC16-46503606C6CE}" type="datetimeFigureOut">
               <a:rPr lang="en-US" smtClean="0"/>
-              <a:t>10/16/2017</a:t>
+              <a:t>10/16/17</a:t>
             </a:fld>
             <a:endParaRPr lang="en-US"/>
           </a:p>
@@ -6096,7 +7106,7 @@
           <a:p>
             <a:fld id="{8F1441E5-2681-D342-A4D7-CDD8BDD1E122}" type="slidenum">
               <a:rPr lang="en-US" smtClean="0"/>
-              <a:t>‹N°›</a:t>
+              <a:t>‹#›</a:t>
             </a:fld>
             <a:endParaRPr lang="en-US"/>
           </a:p>
@@ -6683,6 +7693,244 @@
     <p:extLst>
       <p:ext uri="{BB962C8B-B14F-4D97-AF65-F5344CB8AC3E}">
         <p14:creationId xmlns:p14="http://schemas.microsoft.com/office/powerpoint/2010/main" val="305000610"/>
+      </p:ext>
+    </p:extLst>
+  </p:cSld>
+  <p:clrMapOvr>
+    <a:masterClrMapping/>
+  </p:clrMapOvr>
+</p:sld>
+</file>
+
+<file path=ppt/slides/slide2.xml><?xml version="1.0" encoding="utf-8"?>
+<p:sld xmlns:a="http://schemas.openxmlformats.org/drawingml/2006/main" xmlns:r="http://schemas.openxmlformats.org/officeDocument/2006/relationships" xmlns:p="http://schemas.openxmlformats.org/presentationml/2006/main">
+  <p:cSld>
+    <p:spTree>
+      <p:nvGrpSpPr>
+        <p:cNvPr id="1" name=""/>
+        <p:cNvGrpSpPr/>
+        <p:nvPr/>
+      </p:nvGrpSpPr>
+      <p:grpSpPr>
+        <a:xfrm>
+          <a:off x="0" y="0"/>
+          <a:ext cx="0" cy="0"/>
+          <a:chOff x="0" y="0"/>
+          <a:chExt cx="0" cy="0"/>
+        </a:xfrm>
+      </p:grpSpPr>
+      <p:sp>
+        <p:nvSpPr>
+          <p:cNvPr id="2" name="Title 1"/>
+          <p:cNvSpPr>
+            <a:spLocks noGrp="1"/>
+          </p:cNvSpPr>
+          <p:nvPr>
+            <p:ph type="title"/>
+          </p:nvPr>
+        </p:nvSpPr>
+        <p:spPr/>
+        <p:txBody>
+          <a:bodyPr/>
+          <a:lstStyle/>
+          <a:p>
+            <a:r>
+              <a:rPr lang="en-US" dirty="0" err="1" smtClean="0"/>
+              <a:t>C’est</a:t>
+            </a:r>
+            <a:r>
+              <a:rPr lang="en-US" dirty="0" smtClean="0"/>
+              <a:t> quoi </a:t>
+            </a:r>
+            <a:r>
+              <a:rPr lang="en-US" dirty="0" err="1" smtClean="0"/>
+              <a:t>Git</a:t>
+            </a:r>
+            <a:r>
+              <a:rPr lang="en-US" dirty="0" smtClean="0"/>
+              <a:t> ?</a:t>
+            </a:r>
+            <a:endParaRPr lang="en-US" dirty="0"/>
+          </a:p>
+        </p:txBody>
+      </p:sp>
+      <p:sp>
+        <p:nvSpPr>
+          <p:cNvPr id="3" name="Content Placeholder 2"/>
+          <p:cNvSpPr>
+            <a:spLocks noGrp="1"/>
+          </p:cNvSpPr>
+          <p:nvPr>
+            <p:ph idx="1"/>
+          </p:nvPr>
+        </p:nvSpPr>
+        <p:spPr>
+          <a:xfrm>
+            <a:off x="1484310" y="2996183"/>
+            <a:ext cx="10018713" cy="3124201"/>
+          </a:xfrm>
+        </p:spPr>
+        <p:txBody>
+          <a:bodyPr/>
+          <a:lstStyle/>
+          <a:p>
+            <a:r>
+              <a:rPr lang="fr-CA" dirty="0" smtClean="0"/>
+              <a:t>Fondé en 2005 par Linus </a:t>
+            </a:r>
+            <a:r>
+              <a:rPr lang="fr-CA" dirty="0" err="1" smtClean="0"/>
+              <a:t>Torvalds</a:t>
+            </a:r>
+            <a:r>
+              <a:rPr lang="fr-CA" dirty="0" smtClean="0"/>
+              <a:t> (Fondateur de Linux)</a:t>
+            </a:r>
+          </a:p>
+          <a:p>
+            <a:r>
+              <a:rPr lang="fr-CA" dirty="0" smtClean="0"/>
+              <a:t>VCS (Version Control System)</a:t>
+            </a:r>
+          </a:p>
+          <a:p>
+            <a:r>
+              <a:rPr lang="fr-CA" dirty="0" smtClean="0"/>
+              <a:t>Les fonctionnalités</a:t>
+            </a:r>
+          </a:p>
+          <a:p>
+            <a:r>
+              <a:rPr lang="fr-CA" dirty="0" smtClean="0"/>
+              <a:t>Commencer ou s’ajouter à un projet</a:t>
+            </a:r>
+          </a:p>
+          <a:p>
+            <a:r>
+              <a:rPr lang="fr-CA" dirty="0" smtClean="0"/>
+              <a:t>Les commandes de bases</a:t>
+            </a:r>
+          </a:p>
+          <a:p>
+            <a:endParaRPr lang="en-US" dirty="0" smtClean="0"/>
+          </a:p>
+          <a:p>
+            <a:endParaRPr lang="en-US" dirty="0" smtClean="0"/>
+          </a:p>
+        </p:txBody>
+      </p:sp>
+    </p:spTree>
+    <p:extLst>
+      <p:ext uri="{BB962C8B-B14F-4D97-AF65-F5344CB8AC3E}">
+        <p14:creationId xmlns:p14="http://schemas.microsoft.com/office/powerpoint/2010/main" val="1757987412"/>
+      </p:ext>
+    </p:extLst>
+  </p:cSld>
+  <p:clrMapOvr>
+    <a:masterClrMapping/>
+  </p:clrMapOvr>
+</p:sld>
+</file>
+
+<file path=ppt/slides/slide3.xml><?xml version="1.0" encoding="utf-8"?>
+<p:sld xmlns:a="http://schemas.openxmlformats.org/drawingml/2006/main" xmlns:r="http://schemas.openxmlformats.org/officeDocument/2006/relationships" xmlns:p="http://schemas.openxmlformats.org/presentationml/2006/main">
+  <p:cSld>
+    <p:spTree>
+      <p:nvGrpSpPr>
+        <p:cNvPr id="1" name=""/>
+        <p:cNvGrpSpPr/>
+        <p:nvPr/>
+      </p:nvGrpSpPr>
+      <p:grpSpPr>
+        <a:xfrm>
+          <a:off x="0" y="0"/>
+          <a:ext cx="0" cy="0"/>
+          <a:chOff x="0" y="0"/>
+          <a:chExt cx="0" cy="0"/>
+        </a:xfrm>
+      </p:grpSpPr>
+      <p:sp>
+        <p:nvSpPr>
+          <p:cNvPr id="2" name="Title 1"/>
+          <p:cNvSpPr>
+            <a:spLocks noGrp="1"/>
+          </p:cNvSpPr>
+          <p:nvPr>
+            <p:ph type="title"/>
+          </p:nvPr>
+        </p:nvSpPr>
+        <p:spPr/>
+        <p:txBody>
+          <a:bodyPr/>
+          <a:lstStyle/>
+          <a:p>
+            <a:r>
+              <a:rPr lang="en-US" dirty="0" smtClean="0"/>
+              <a:t>VCS (Version Control System)</a:t>
+            </a:r>
+            <a:endParaRPr lang="en-US" dirty="0"/>
+          </a:p>
+        </p:txBody>
+      </p:sp>
+      <p:graphicFrame>
+        <p:nvGraphicFramePr>
+          <p:cNvPr id="4" name="Content Placeholder 3"/>
+          <p:cNvGraphicFramePr>
+            <a:graphicFrameLocks noGrp="1"/>
+          </p:cNvGraphicFramePr>
+          <p:nvPr>
+            <p:ph idx="1"/>
+            <p:extLst>
+              <p:ext uri="{D42A27DB-BD31-4B8C-83A1-F6EECF244321}">
+                <p14:modId xmlns:p14="http://schemas.microsoft.com/office/powerpoint/2010/main" val="1973821030"/>
+              </p:ext>
+            </p:extLst>
+          </p:nvPr>
+        </p:nvGraphicFramePr>
+        <p:xfrm>
+          <a:off x="4189496" y="2212848"/>
+          <a:ext cx="9895523" cy="3733800"/>
+        </p:xfrm>
+        <a:graphic>
+          <a:graphicData uri="http://schemas.openxmlformats.org/drawingml/2006/chart">
+            <c:chart xmlns:c="http://schemas.openxmlformats.org/drawingml/2006/chart" xmlns:r="http://schemas.openxmlformats.org/officeDocument/2006/relationships" r:id="rId2"/>
+          </a:graphicData>
+        </a:graphic>
+      </p:graphicFrame>
+      <p:pic>
+        <p:nvPicPr>
+          <p:cNvPr id="3" name="Picture 2"/>
+          <p:cNvPicPr>
+            <a:picLocks noChangeAspect="1"/>
+          </p:cNvPicPr>
+          <p:nvPr/>
+        </p:nvPicPr>
+        <p:blipFill>
+          <a:blip r:embed="rId3">
+            <a:extLst>
+              <a:ext uri="{28A0092B-C50C-407E-A947-70E740481C1C}">
+                <a14:useLocalDpi xmlns:a14="http://schemas.microsoft.com/office/drawing/2010/main" val="0"/>
+              </a:ext>
+            </a:extLst>
+          </a:blip>
+          <a:stretch>
+            <a:fillRect/>
+          </a:stretch>
+        </p:blipFill>
+        <p:spPr>
+          <a:xfrm>
+            <a:off x="2794409" y="2437337"/>
+            <a:ext cx="2931162" cy="3510373"/>
+          </a:xfrm>
+          <a:prstGeom prst="rect">
+            <a:avLst/>
+          </a:prstGeom>
+        </p:spPr>
+      </p:pic>
+    </p:spTree>
+    <p:extLst>
+      <p:ext uri="{BB962C8B-B14F-4D97-AF65-F5344CB8AC3E}">
+        <p14:creationId xmlns:p14="http://schemas.microsoft.com/office/powerpoint/2010/main" val="421802706"/>
       </p:ext>
     </p:extLst>
   </p:cSld>

</xml_diff>

<commit_message>
doc word et powerpoint termine
</commit_message>
<xml_diff>
--- a/GitPresentation.pptx
+++ b/GitPresentation.pptx
@@ -5,10 +5,25 @@
     <p:sldMasterId id="2147483876" r:id="rId1"/>
   </p:sldMasterIdLst>
   <p:notesMasterIdLst>
-    <p:notesMasterId r:id="rId3"/>
+    <p:notesMasterId r:id="rId18"/>
   </p:notesMasterIdLst>
   <p:sldIdLst>
     <p:sldId id="256" r:id="rId2"/>
+    <p:sldId id="257" r:id="rId3"/>
+    <p:sldId id="259" r:id="rId4"/>
+    <p:sldId id="258" r:id="rId5"/>
+    <p:sldId id="260" r:id="rId6"/>
+    <p:sldId id="261" r:id="rId7"/>
+    <p:sldId id="262" r:id="rId8"/>
+    <p:sldId id="263" r:id="rId9"/>
+    <p:sldId id="264" r:id="rId10"/>
+    <p:sldId id="266" r:id="rId11"/>
+    <p:sldId id="265" r:id="rId12"/>
+    <p:sldId id="267" r:id="rId13"/>
+    <p:sldId id="268" r:id="rId14"/>
+    <p:sldId id="269" r:id="rId15"/>
+    <p:sldId id="270" r:id="rId16"/>
+    <p:sldId id="271" r:id="rId17"/>
   </p:sldIdLst>
   <p:sldSz cx="12192000" cy="6858000"/>
   <p:notesSz cx="6858000" cy="9144000"/>
@@ -119,6 +134,1047 @@
 <p1510:revInfo xmlns:a="http://schemas.openxmlformats.org/drawingml/2006/main" xmlns:r="http://schemas.openxmlformats.org/officeDocument/2006/relationships" xmlns:p1510="http://schemas.microsoft.com/office/powerpoint/2015/10/main"/>
 </file>
 
+<file path=ppt/charts/chart1.xml><?xml version="1.0" encoding="utf-8"?>
+<c:chartSpace xmlns:c="http://schemas.openxmlformats.org/drawingml/2006/chart" xmlns:a="http://schemas.openxmlformats.org/drawingml/2006/main" xmlns:r="http://schemas.openxmlformats.org/officeDocument/2006/relationships" xmlns:c16r2="http://schemas.microsoft.com/office/drawing/2015/06/chart">
+  <c:date1904 val="0"/>
+  <c:lang val="fr-FR"/>
+  <c:roundedCorners val="0"/>
+  <mc:AlternateContent xmlns:mc="http://schemas.openxmlformats.org/markup-compatibility/2006">
+    <mc:Choice xmlns:c14="http://schemas.microsoft.com/office/drawing/2007/8/2/chart" Requires="c14">
+      <c14:style val="102"/>
+    </mc:Choice>
+    <mc:Fallback>
+      <c:style val="2"/>
+    </mc:Fallback>
+  </mc:AlternateContent>
+  <c:chart>
+    <c:title>
+      <c:overlay val="0"/>
+      <c:spPr>
+        <a:noFill/>
+        <a:ln>
+          <a:noFill/>
+        </a:ln>
+        <a:effectLst/>
+      </c:spPr>
+      <c:txPr>
+        <a:bodyPr rot="0" spcFirstLastPara="1" vertOverflow="ellipsis" vert="horz" wrap="square" anchor="ctr" anchorCtr="1"/>
+        <a:lstStyle/>
+        <a:p>
+          <a:pPr>
+            <a:defRPr sz="2128" b="1" i="0" u="none" strike="noStrike" kern="1200" baseline="0">
+              <a:solidFill>
+                <a:schemeClr val="tx1">
+                  <a:lumMod val="65000"/>
+                  <a:lumOff val="35000"/>
+                </a:schemeClr>
+              </a:solidFill>
+              <a:latin typeface="+mn-lt"/>
+              <a:ea typeface="+mn-ea"/>
+              <a:cs typeface="+mn-cs"/>
+            </a:defRPr>
+          </a:pPr>
+          <a:endParaRPr lang="fr-FR"/>
+        </a:p>
+      </c:txPr>
+    </c:title>
+    <c:autoTitleDeleted val="0"/>
+    <c:plotArea>
+      <c:layout/>
+      <c:pieChart>
+        <c:varyColors val="1"/>
+        <c:ser>
+          <c:idx val="0"/>
+          <c:order val="0"/>
+          <c:tx>
+            <c:strRef>
+              <c:f>Sheet1!$B$1</c:f>
+              <c:strCache>
+                <c:ptCount val="1"/>
+                <c:pt idx="0">
+                  <c:v>VCS</c:v>
+                </c:pt>
+              </c:strCache>
+            </c:strRef>
+          </c:tx>
+          <c:dPt>
+            <c:idx val="0"/>
+            <c:bubble3D val="0"/>
+            <c:spPr>
+              <a:gradFill rotWithShape="1">
+                <a:gsLst>
+                  <a:gs pos="0">
+                    <a:schemeClr val="accent1">
+                      <a:tint val="96000"/>
+                      <a:lumMod val="102000"/>
+                    </a:schemeClr>
+                  </a:gs>
+                  <a:gs pos="100000">
+                    <a:schemeClr val="accent1">
+                      <a:shade val="88000"/>
+                      <a:lumMod val="94000"/>
+                    </a:schemeClr>
+                  </a:gs>
+                </a:gsLst>
+                <a:path path="circle">
+                  <a:fillToRect l="50000" t="100000" r="100000" b="50000"/>
+                </a:path>
+              </a:gradFill>
+              <a:ln>
+                <a:noFill/>
+              </a:ln>
+              <a:effectLst>
+                <a:outerShdw blurRad="38100" dist="25400" dir="5400000" rotWithShape="0">
+                  <a:srgbClr val="000000">
+                    <a:alpha val="64000"/>
+                  </a:srgbClr>
+                </a:outerShdw>
+              </a:effectLst>
+              <a:scene3d>
+                <a:camera prst="orthographicFront">
+                  <a:rot lat="0" lon="0" rev="0"/>
+                </a:camera>
+                <a:lightRig rig="threePt" dir="tl">
+                  <a:rot lat="0" lon="0" rev="1200000"/>
+                </a:lightRig>
+              </a:scene3d>
+              <a:sp3d>
+                <a:bevelT w="25400" h="12700"/>
+              </a:sp3d>
+            </c:spPr>
+            <c:extLst>
+              <c:ext xmlns:c16="http://schemas.microsoft.com/office/drawing/2014/chart" uri="{C3380CC4-5D6E-409C-BE32-E72D297353CC}">
+                <c16:uniqueId val="{00000001-1BEC-4DD0-B596-2DBA211016BA}"/>
+              </c:ext>
+            </c:extLst>
+          </c:dPt>
+          <c:dPt>
+            <c:idx val="1"/>
+            <c:bubble3D val="0"/>
+            <c:spPr>
+              <a:gradFill rotWithShape="1">
+                <a:gsLst>
+                  <a:gs pos="0">
+                    <a:schemeClr val="accent2">
+                      <a:tint val="96000"/>
+                      <a:lumMod val="102000"/>
+                    </a:schemeClr>
+                  </a:gs>
+                  <a:gs pos="100000">
+                    <a:schemeClr val="accent2">
+                      <a:shade val="88000"/>
+                      <a:lumMod val="94000"/>
+                    </a:schemeClr>
+                  </a:gs>
+                </a:gsLst>
+                <a:path path="circle">
+                  <a:fillToRect l="50000" t="100000" r="100000" b="50000"/>
+                </a:path>
+              </a:gradFill>
+              <a:ln>
+                <a:noFill/>
+              </a:ln>
+              <a:effectLst>
+                <a:outerShdw blurRad="38100" dist="25400" dir="5400000" rotWithShape="0">
+                  <a:srgbClr val="000000">
+                    <a:alpha val="64000"/>
+                  </a:srgbClr>
+                </a:outerShdw>
+              </a:effectLst>
+              <a:scene3d>
+                <a:camera prst="orthographicFront">
+                  <a:rot lat="0" lon="0" rev="0"/>
+                </a:camera>
+                <a:lightRig rig="threePt" dir="tl">
+                  <a:rot lat="0" lon="0" rev="1200000"/>
+                </a:lightRig>
+              </a:scene3d>
+              <a:sp3d>
+                <a:bevelT w="25400" h="12700"/>
+              </a:sp3d>
+            </c:spPr>
+            <c:extLst>
+              <c:ext xmlns:c16="http://schemas.microsoft.com/office/drawing/2014/chart" uri="{C3380CC4-5D6E-409C-BE32-E72D297353CC}">
+                <c16:uniqueId val="{00000003-1BEC-4DD0-B596-2DBA211016BA}"/>
+              </c:ext>
+            </c:extLst>
+          </c:dPt>
+          <c:dPt>
+            <c:idx val="2"/>
+            <c:bubble3D val="0"/>
+            <c:spPr>
+              <a:gradFill rotWithShape="1">
+                <a:gsLst>
+                  <a:gs pos="0">
+                    <a:schemeClr val="accent3">
+                      <a:tint val="96000"/>
+                      <a:lumMod val="102000"/>
+                    </a:schemeClr>
+                  </a:gs>
+                  <a:gs pos="100000">
+                    <a:schemeClr val="accent3">
+                      <a:shade val="88000"/>
+                      <a:lumMod val="94000"/>
+                    </a:schemeClr>
+                  </a:gs>
+                </a:gsLst>
+                <a:path path="circle">
+                  <a:fillToRect l="50000" t="100000" r="100000" b="50000"/>
+                </a:path>
+              </a:gradFill>
+              <a:ln>
+                <a:noFill/>
+              </a:ln>
+              <a:effectLst>
+                <a:outerShdw blurRad="38100" dist="25400" dir="5400000" rotWithShape="0">
+                  <a:srgbClr val="000000">
+                    <a:alpha val="64000"/>
+                  </a:srgbClr>
+                </a:outerShdw>
+              </a:effectLst>
+              <a:scene3d>
+                <a:camera prst="orthographicFront">
+                  <a:rot lat="0" lon="0" rev="0"/>
+                </a:camera>
+                <a:lightRig rig="threePt" dir="tl">
+                  <a:rot lat="0" lon="0" rev="1200000"/>
+                </a:lightRig>
+              </a:scene3d>
+              <a:sp3d>
+                <a:bevelT w="25400" h="12700"/>
+              </a:sp3d>
+            </c:spPr>
+            <c:extLst>
+              <c:ext xmlns:c16="http://schemas.microsoft.com/office/drawing/2014/chart" uri="{C3380CC4-5D6E-409C-BE32-E72D297353CC}">
+                <c16:uniqueId val="{00000005-1BEC-4DD0-B596-2DBA211016BA}"/>
+              </c:ext>
+            </c:extLst>
+          </c:dPt>
+          <c:dPt>
+            <c:idx val="3"/>
+            <c:bubble3D val="0"/>
+            <c:spPr>
+              <a:gradFill rotWithShape="1">
+                <a:gsLst>
+                  <a:gs pos="0">
+                    <a:schemeClr val="accent4">
+                      <a:tint val="96000"/>
+                      <a:lumMod val="102000"/>
+                    </a:schemeClr>
+                  </a:gs>
+                  <a:gs pos="100000">
+                    <a:schemeClr val="accent4">
+                      <a:shade val="88000"/>
+                      <a:lumMod val="94000"/>
+                    </a:schemeClr>
+                  </a:gs>
+                </a:gsLst>
+                <a:path path="circle">
+                  <a:fillToRect l="50000" t="100000" r="100000" b="50000"/>
+                </a:path>
+              </a:gradFill>
+              <a:ln>
+                <a:noFill/>
+              </a:ln>
+              <a:effectLst>
+                <a:outerShdw blurRad="38100" dist="25400" dir="5400000" rotWithShape="0">
+                  <a:srgbClr val="000000">
+                    <a:alpha val="64000"/>
+                  </a:srgbClr>
+                </a:outerShdw>
+              </a:effectLst>
+              <a:scene3d>
+                <a:camera prst="orthographicFront">
+                  <a:rot lat="0" lon="0" rev="0"/>
+                </a:camera>
+                <a:lightRig rig="threePt" dir="tl">
+                  <a:rot lat="0" lon="0" rev="1200000"/>
+                </a:lightRig>
+              </a:scene3d>
+              <a:sp3d>
+                <a:bevelT w="25400" h="12700"/>
+              </a:sp3d>
+            </c:spPr>
+            <c:extLst>
+              <c:ext xmlns:c16="http://schemas.microsoft.com/office/drawing/2014/chart" uri="{C3380CC4-5D6E-409C-BE32-E72D297353CC}">
+                <c16:uniqueId val="{00000007-1BEC-4DD0-B596-2DBA211016BA}"/>
+              </c:ext>
+            </c:extLst>
+          </c:dPt>
+          <c:dPt>
+            <c:idx val="4"/>
+            <c:bubble3D val="0"/>
+            <c:spPr>
+              <a:gradFill rotWithShape="1">
+                <a:gsLst>
+                  <a:gs pos="0">
+                    <a:schemeClr val="accent5">
+                      <a:tint val="96000"/>
+                      <a:lumMod val="102000"/>
+                    </a:schemeClr>
+                  </a:gs>
+                  <a:gs pos="100000">
+                    <a:schemeClr val="accent5">
+                      <a:shade val="88000"/>
+                      <a:lumMod val="94000"/>
+                    </a:schemeClr>
+                  </a:gs>
+                </a:gsLst>
+                <a:path path="circle">
+                  <a:fillToRect l="50000" t="100000" r="100000" b="50000"/>
+                </a:path>
+              </a:gradFill>
+              <a:ln>
+                <a:noFill/>
+              </a:ln>
+              <a:effectLst>
+                <a:outerShdw blurRad="38100" dist="25400" dir="5400000" rotWithShape="0">
+                  <a:srgbClr val="000000">
+                    <a:alpha val="64000"/>
+                  </a:srgbClr>
+                </a:outerShdw>
+              </a:effectLst>
+              <a:scene3d>
+                <a:camera prst="orthographicFront">
+                  <a:rot lat="0" lon="0" rev="0"/>
+                </a:camera>
+                <a:lightRig rig="threePt" dir="tl">
+                  <a:rot lat="0" lon="0" rev="1200000"/>
+                </a:lightRig>
+              </a:scene3d>
+              <a:sp3d>
+                <a:bevelT w="25400" h="12700"/>
+              </a:sp3d>
+            </c:spPr>
+            <c:extLst>
+              <c:ext xmlns:c16="http://schemas.microsoft.com/office/drawing/2014/chart" uri="{C3380CC4-5D6E-409C-BE32-E72D297353CC}">
+                <c16:uniqueId val="{00000009-1BEC-4DD0-B596-2DBA211016BA}"/>
+              </c:ext>
+            </c:extLst>
+          </c:dPt>
+          <c:dPt>
+            <c:idx val="5"/>
+            <c:bubble3D val="0"/>
+            <c:spPr>
+              <a:gradFill rotWithShape="1">
+                <a:gsLst>
+                  <a:gs pos="0">
+                    <a:schemeClr val="accent6">
+                      <a:tint val="96000"/>
+                      <a:lumMod val="102000"/>
+                    </a:schemeClr>
+                  </a:gs>
+                  <a:gs pos="100000">
+                    <a:schemeClr val="accent6">
+                      <a:shade val="88000"/>
+                      <a:lumMod val="94000"/>
+                    </a:schemeClr>
+                  </a:gs>
+                </a:gsLst>
+                <a:path path="circle">
+                  <a:fillToRect l="50000" t="100000" r="100000" b="50000"/>
+                </a:path>
+              </a:gradFill>
+              <a:ln>
+                <a:noFill/>
+              </a:ln>
+              <a:effectLst>
+                <a:outerShdw blurRad="38100" dist="25400" dir="5400000" rotWithShape="0">
+                  <a:srgbClr val="000000">
+                    <a:alpha val="64000"/>
+                  </a:srgbClr>
+                </a:outerShdw>
+              </a:effectLst>
+              <a:scene3d>
+                <a:camera prst="orthographicFront">
+                  <a:rot lat="0" lon="0" rev="0"/>
+                </a:camera>
+                <a:lightRig rig="threePt" dir="tl">
+                  <a:rot lat="0" lon="0" rev="1200000"/>
+                </a:lightRig>
+              </a:scene3d>
+              <a:sp3d>
+                <a:bevelT w="25400" h="12700"/>
+              </a:sp3d>
+            </c:spPr>
+            <c:extLst>
+              <c:ext xmlns:c16="http://schemas.microsoft.com/office/drawing/2014/chart" uri="{C3380CC4-5D6E-409C-BE32-E72D297353CC}">
+                <c16:uniqueId val="{0000000B-1BEC-4DD0-B596-2DBA211016BA}"/>
+              </c:ext>
+            </c:extLst>
+          </c:dPt>
+          <c:cat>
+            <c:strRef>
+              <c:f>Sheet1!$A$2:$A$7</c:f>
+              <c:strCache>
+                <c:ptCount val="5"/>
+                <c:pt idx="0">
+                  <c:v>Git</c:v>
+                </c:pt>
+                <c:pt idx="1">
+                  <c:v>Mercurial</c:v>
+                </c:pt>
+                <c:pt idx="2">
+                  <c:v>SVN</c:v>
+                </c:pt>
+                <c:pt idx="3">
+                  <c:v>Perforce</c:v>
+                </c:pt>
+                <c:pt idx="4">
+                  <c:v>CVS</c:v>
+                </c:pt>
+              </c:strCache>
+            </c:strRef>
+          </c:cat>
+          <c:val>
+            <c:numRef>
+              <c:f>Sheet1!$B$2:$B$7</c:f>
+              <c:numCache>
+                <c:formatCode>General</c:formatCode>
+                <c:ptCount val="6"/>
+                <c:pt idx="0">
+                  <c:v>70.7</c:v>
+                </c:pt>
+                <c:pt idx="1">
+                  <c:v>13.5</c:v>
+                </c:pt>
+                <c:pt idx="2">
+                  <c:v>13.5</c:v>
+                </c:pt>
+                <c:pt idx="3">
+                  <c:v>1.5</c:v>
+                </c:pt>
+                <c:pt idx="4">
+                  <c:v>0.8</c:v>
+                </c:pt>
+              </c:numCache>
+            </c:numRef>
+          </c:val>
+          <c:extLst>
+            <c:ext xmlns:c16="http://schemas.microsoft.com/office/drawing/2014/chart" uri="{C3380CC4-5D6E-409C-BE32-E72D297353CC}">
+              <c16:uniqueId val="{0000000C-1BEC-4DD0-B596-2DBA211016BA}"/>
+            </c:ext>
+          </c:extLst>
+        </c:ser>
+        <c:dLbls>
+          <c:showLegendKey val="0"/>
+          <c:showVal val="0"/>
+          <c:showCatName val="0"/>
+          <c:showSerName val="0"/>
+          <c:showPercent val="0"/>
+          <c:showBubbleSize val="0"/>
+          <c:showLeaderLines val="1"/>
+        </c:dLbls>
+        <c:firstSliceAng val="0"/>
+      </c:pieChart>
+      <c:spPr>
+        <a:noFill/>
+        <a:ln>
+          <a:noFill/>
+        </a:ln>
+        <a:effectLst/>
+      </c:spPr>
+    </c:plotArea>
+    <c:legend>
+      <c:legendPos val="b"/>
+      <c:overlay val="0"/>
+      <c:spPr>
+        <a:noFill/>
+        <a:ln>
+          <a:noFill/>
+        </a:ln>
+        <a:effectLst/>
+      </c:spPr>
+      <c:txPr>
+        <a:bodyPr rot="0" spcFirstLastPara="1" vertOverflow="ellipsis" vert="horz" wrap="square" anchor="ctr" anchorCtr="1"/>
+        <a:lstStyle/>
+        <a:p>
+          <a:pPr>
+            <a:defRPr sz="1197" b="0" i="0" u="none" strike="noStrike" kern="1200" baseline="0">
+              <a:solidFill>
+                <a:schemeClr val="tx1">
+                  <a:lumMod val="65000"/>
+                  <a:lumOff val="35000"/>
+                </a:schemeClr>
+              </a:solidFill>
+              <a:latin typeface="+mn-lt"/>
+              <a:ea typeface="+mn-ea"/>
+              <a:cs typeface="+mn-cs"/>
+            </a:defRPr>
+          </a:pPr>
+          <a:endParaRPr lang="fr-FR"/>
+        </a:p>
+      </c:txPr>
+    </c:legend>
+    <c:plotVisOnly val="1"/>
+    <c:dispBlanksAs val="gap"/>
+    <c:showDLblsOverMax val="0"/>
+  </c:chart>
+  <c:spPr>
+    <a:noFill/>
+    <a:ln>
+      <a:noFill/>
+    </a:ln>
+    <a:effectLst/>
+  </c:spPr>
+  <c:txPr>
+    <a:bodyPr/>
+    <a:lstStyle/>
+    <a:p>
+      <a:pPr>
+        <a:defRPr/>
+      </a:pPr>
+      <a:endParaRPr lang="fr-FR"/>
+    </a:p>
+  </c:txPr>
+  <c:externalData r:id="rId3">
+    <c:autoUpdate val="0"/>
+  </c:externalData>
+</c:chartSpace>
+</file>
+
+<file path=ppt/charts/colors1.xml><?xml version="1.0" encoding="utf-8"?>
+<cs:colorStyle xmlns:cs="http://schemas.microsoft.com/office/drawing/2012/chartStyle" xmlns:a="http://schemas.openxmlformats.org/drawingml/2006/main" meth="cycle" id="10">
+  <a:schemeClr val="accent1"/>
+  <a:schemeClr val="accent2"/>
+  <a:schemeClr val="accent3"/>
+  <a:schemeClr val="accent4"/>
+  <a:schemeClr val="accent5"/>
+  <a:schemeClr val="accent6"/>
+  <cs:variation/>
+  <cs:variation>
+    <a:lumMod val="60000"/>
+  </cs:variation>
+  <cs:variation>
+    <a:lumMod val="80000"/>
+    <a:lumOff val="20000"/>
+  </cs:variation>
+  <cs:variation>
+    <a:lumMod val="80000"/>
+  </cs:variation>
+  <cs:variation>
+    <a:lumMod val="60000"/>
+    <a:lumOff val="40000"/>
+  </cs:variation>
+  <cs:variation>
+    <a:lumMod val="50000"/>
+  </cs:variation>
+  <cs:variation>
+    <a:lumMod val="70000"/>
+    <a:lumOff val="30000"/>
+  </cs:variation>
+  <cs:variation>
+    <a:lumMod val="70000"/>
+  </cs:variation>
+  <cs:variation>
+    <a:lumMod val="50000"/>
+    <a:lumOff val="50000"/>
+  </cs:variation>
+</cs:colorStyle>
+</file>
+
+<file path=ppt/charts/style1.xml><?xml version="1.0" encoding="utf-8"?>
+<cs:chartStyle xmlns:cs="http://schemas.microsoft.com/office/drawing/2012/chartStyle" xmlns:a="http://schemas.openxmlformats.org/drawingml/2006/main" id="344">
+  <cs:axisTitle>
+    <cs:lnRef idx="0"/>
+    <cs:fillRef idx="0"/>
+    <cs:effectRef idx="0"/>
+    <cs:fontRef idx="minor">
+      <a:schemeClr val="tx1">
+        <a:lumMod val="65000"/>
+        <a:lumOff val="35000"/>
+      </a:schemeClr>
+    </cs:fontRef>
+    <cs:defRPr sz="1197" kern="1200"/>
+  </cs:axisTitle>
+  <cs:categoryAxis>
+    <cs:lnRef idx="0"/>
+    <cs:fillRef idx="0"/>
+    <cs:effectRef idx="0"/>
+    <cs:fontRef idx="minor">
+      <a:schemeClr val="tx1">
+        <a:lumMod val="65000"/>
+        <a:lumOff val="35000"/>
+      </a:schemeClr>
+    </cs:fontRef>
+    <cs:spPr>
+      <a:ln w="12700" cap="flat" cmpd="sng" algn="ctr">
+        <a:solidFill>
+          <a:schemeClr val="tx1">
+            <a:lumMod val="15000"/>
+            <a:lumOff val="85000"/>
+          </a:schemeClr>
+        </a:solidFill>
+        <a:round/>
+      </a:ln>
+    </cs:spPr>
+    <cs:defRPr sz="1197" kern="1200"/>
+  </cs:categoryAxis>
+  <cs:chartArea mods="allowNoFillOverride allowNoLineOverride">
+    <cs:lnRef idx="0"/>
+    <cs:fillRef idx="0"/>
+    <cs:effectRef idx="0"/>
+    <cs:fontRef idx="minor">
+      <a:schemeClr val="tx2"/>
+    </cs:fontRef>
+    <cs:spPr>
+      <a:solidFill>
+        <a:schemeClr val="bg1"/>
+      </a:solidFill>
+      <a:ln w="9525" cap="flat" cmpd="sng" algn="ctr">
+        <a:solidFill>
+          <a:schemeClr val="tx1">
+            <a:lumMod val="15000"/>
+            <a:lumOff val="85000"/>
+          </a:schemeClr>
+        </a:solidFill>
+        <a:round/>
+      </a:ln>
+    </cs:spPr>
+    <cs:defRPr sz="1197" kern="1200"/>
+  </cs:chartArea>
+  <cs:dataLabel>
+    <cs:lnRef idx="0"/>
+    <cs:fillRef idx="0"/>
+    <cs:effectRef idx="0"/>
+    <cs:fontRef idx="minor">
+      <a:schemeClr val="tx1">
+        <a:lumMod val="75000"/>
+        <a:lumOff val="25000"/>
+      </a:schemeClr>
+    </cs:fontRef>
+    <cs:defRPr sz="1197" kern="1200"/>
+  </cs:dataLabel>
+  <cs:dataLabelCallout>
+    <cs:lnRef idx="0"/>
+    <cs:fillRef idx="0"/>
+    <cs:effectRef idx="0"/>
+    <cs:fontRef idx="minor">
+      <a:schemeClr val="dk1">
+        <a:lumMod val="65000"/>
+        <a:lumOff val="35000"/>
+      </a:schemeClr>
+    </cs:fontRef>
+    <cs:spPr>
+      <a:solidFill>
+        <a:schemeClr val="lt1"/>
+      </a:solidFill>
+      <a:ln>
+        <a:solidFill>
+          <a:schemeClr val="dk1">
+            <a:lumMod val="25000"/>
+            <a:lumOff val="75000"/>
+          </a:schemeClr>
+        </a:solidFill>
+      </a:ln>
+    </cs:spPr>
+    <cs:defRPr sz="1197" kern="1200"/>
+    <cs:bodyPr rot="0" spcFirstLastPara="1" vertOverflow="clip" horzOverflow="clip" vert="horz" wrap="square" lIns="36576" tIns="18288" rIns="36576" bIns="18288" anchor="ctr" anchorCtr="1">
+      <a:spAutoFit/>
+    </cs:bodyPr>
+  </cs:dataLabelCallout>
+  <cs:dataPoint>
+    <cs:lnRef idx="0"/>
+    <cs:fillRef idx="3">
+      <cs:styleClr val="auto"/>
+    </cs:fillRef>
+    <cs:effectRef idx="3"/>
+    <cs:fontRef idx="minor">
+      <a:schemeClr val="tx1"/>
+    </cs:fontRef>
+  </cs:dataPoint>
+  <cs:dataPoint3D>
+    <cs:lnRef idx="0"/>
+    <cs:fillRef idx="3">
+      <cs:styleClr val="auto"/>
+    </cs:fillRef>
+    <cs:effectRef idx="3"/>
+    <cs:fontRef idx="minor">
+      <a:schemeClr val="tx1"/>
+    </cs:fontRef>
+  </cs:dataPoint3D>
+  <cs:dataPointLine>
+    <cs:lnRef idx="0">
+      <cs:styleClr val="auto"/>
+    </cs:lnRef>
+    <cs:fillRef idx="3"/>
+    <cs:effectRef idx="3"/>
+    <cs:fontRef idx="minor">
+      <a:schemeClr val="tx1"/>
+    </cs:fontRef>
+    <cs:spPr>
+      <a:ln w="34925" cap="rnd">
+        <a:solidFill>
+          <a:schemeClr val="phClr"/>
+        </a:solidFill>
+        <a:round/>
+      </a:ln>
+    </cs:spPr>
+  </cs:dataPointLine>
+  <cs:dataPointMarker>
+    <cs:lnRef idx="0">
+      <cs:styleClr val="auto"/>
+    </cs:lnRef>
+    <cs:fillRef idx="3">
+      <cs:styleClr val="auto"/>
+    </cs:fillRef>
+    <cs:effectRef idx="3"/>
+    <cs:fontRef idx="minor">
+      <a:schemeClr val="tx1"/>
+    </cs:fontRef>
+    <cs:spPr>
+      <a:ln w="9525">
+        <a:solidFill>
+          <a:schemeClr val="phClr"/>
+        </a:solidFill>
+        <a:round/>
+      </a:ln>
+    </cs:spPr>
+  </cs:dataPointMarker>
+  <cs:dataPointMarkerLayout symbol="circle" size="6"/>
+  <cs:dataPointWireframe>
+    <cs:lnRef idx="0">
+      <cs:styleClr val="auto"/>
+    </cs:lnRef>
+    <cs:fillRef idx="3"/>
+    <cs:effectRef idx="3"/>
+    <cs:fontRef idx="minor">
+      <a:schemeClr val="tx1"/>
+    </cs:fontRef>
+    <cs:spPr>
+      <a:ln w="9525" cap="rnd">
+        <a:solidFill>
+          <a:schemeClr val="phClr"/>
+        </a:solidFill>
+        <a:round/>
+      </a:ln>
+    </cs:spPr>
+  </cs:dataPointWireframe>
+  <cs:dataTable>
+    <cs:lnRef idx="0"/>
+    <cs:fillRef idx="0"/>
+    <cs:effectRef idx="0"/>
+    <cs:fontRef idx="minor">
+      <a:schemeClr val="tx1">
+        <a:lumMod val="65000"/>
+        <a:lumOff val="35000"/>
+      </a:schemeClr>
+    </cs:fontRef>
+    <cs:spPr>
+      <a:noFill/>
+      <a:ln w="9525" cap="flat" cmpd="sng" algn="ctr">
+        <a:solidFill>
+          <a:schemeClr val="tx1">
+            <a:lumMod val="15000"/>
+            <a:lumOff val="85000"/>
+          </a:schemeClr>
+        </a:solidFill>
+        <a:round/>
+      </a:ln>
+    </cs:spPr>
+    <cs:defRPr sz="1197" kern="1200"/>
+  </cs:dataTable>
+  <cs:downBar>
+    <cs:lnRef idx="0"/>
+    <cs:fillRef idx="0"/>
+    <cs:effectRef idx="0"/>
+    <cs:fontRef idx="minor">
+      <a:schemeClr val="dk1"/>
+    </cs:fontRef>
+    <cs:spPr>
+      <a:solidFill>
+        <a:schemeClr val="dk1">
+          <a:lumMod val="65000"/>
+          <a:lumOff val="35000"/>
+        </a:schemeClr>
+      </a:solidFill>
+      <a:ln w="9525">
+        <a:solidFill>
+          <a:schemeClr val="tx1">
+            <a:lumMod val="65000"/>
+            <a:lumOff val="35000"/>
+          </a:schemeClr>
+        </a:solidFill>
+      </a:ln>
+    </cs:spPr>
+  </cs:downBar>
+  <cs:dropLine>
+    <cs:lnRef idx="0"/>
+    <cs:fillRef idx="0"/>
+    <cs:effectRef idx="0"/>
+    <cs:fontRef idx="minor">
+      <a:schemeClr val="tx1"/>
+    </cs:fontRef>
+    <cs:spPr>
+      <a:ln w="9525" cap="flat" cmpd="sng" algn="ctr">
+        <a:solidFill>
+          <a:schemeClr val="tx1">
+            <a:lumMod val="35000"/>
+            <a:lumOff val="65000"/>
+          </a:schemeClr>
+        </a:solidFill>
+        <a:round/>
+      </a:ln>
+    </cs:spPr>
+  </cs:dropLine>
+  <cs:errorBar>
+    <cs:lnRef idx="0"/>
+    <cs:fillRef idx="0"/>
+    <cs:effectRef idx="0"/>
+    <cs:fontRef idx="minor">
+      <a:schemeClr val="tx1"/>
+    </cs:fontRef>
+    <cs:spPr>
+      <a:ln w="9525" cap="flat" cmpd="sng" algn="ctr">
+        <a:solidFill>
+          <a:schemeClr val="tx1">
+            <a:lumMod val="65000"/>
+            <a:lumOff val="35000"/>
+          </a:schemeClr>
+        </a:solidFill>
+        <a:round/>
+      </a:ln>
+    </cs:spPr>
+  </cs:errorBar>
+  <cs:floor>
+    <cs:lnRef idx="0"/>
+    <cs:fillRef idx="0"/>
+    <cs:effectRef idx="0"/>
+    <cs:fontRef idx="minor">
+      <a:schemeClr val="lt1"/>
+    </cs:fontRef>
+  </cs:floor>
+  <cs:gridlineMajor>
+    <cs:lnRef idx="0"/>
+    <cs:fillRef idx="0"/>
+    <cs:effectRef idx="0"/>
+    <cs:fontRef idx="minor">
+      <a:schemeClr val="tx1"/>
+    </cs:fontRef>
+    <cs:spPr>
+      <a:ln w="9525" cap="flat" cmpd="sng" algn="ctr">
+        <a:solidFill>
+          <a:schemeClr val="tx1">
+            <a:lumMod val="15000"/>
+            <a:lumOff val="85000"/>
+          </a:schemeClr>
+        </a:solidFill>
+        <a:round/>
+      </a:ln>
+    </cs:spPr>
+  </cs:gridlineMajor>
+  <cs:gridlineMinor>
+    <cs:lnRef idx="0"/>
+    <cs:fillRef idx="0"/>
+    <cs:effectRef idx="0"/>
+    <cs:fontRef idx="minor">
+      <a:schemeClr val="tx1"/>
+    </cs:fontRef>
+    <cs:spPr>
+      <a:ln w="9525" cap="flat" cmpd="sng" algn="ctr">
+        <a:solidFill>
+          <a:schemeClr val="tx1">
+            <a:lumMod val="5000"/>
+            <a:lumOff val="95000"/>
+          </a:schemeClr>
+        </a:solidFill>
+        <a:round/>
+      </a:ln>
+    </cs:spPr>
+  </cs:gridlineMinor>
+  <cs:hiLoLine>
+    <cs:lnRef idx="0"/>
+    <cs:fillRef idx="0"/>
+    <cs:effectRef idx="0"/>
+    <cs:fontRef idx="minor">
+      <a:schemeClr val="tx1"/>
+    </cs:fontRef>
+    <cs:spPr>
+      <a:ln w="9525" cap="flat" cmpd="sng" algn="ctr">
+        <a:solidFill>
+          <a:schemeClr val="tx1">
+            <a:lumMod val="75000"/>
+            <a:lumOff val="25000"/>
+          </a:schemeClr>
+        </a:solidFill>
+        <a:round/>
+      </a:ln>
+    </cs:spPr>
+  </cs:hiLoLine>
+  <cs:leaderLine>
+    <cs:lnRef idx="0"/>
+    <cs:fillRef idx="0"/>
+    <cs:effectRef idx="0"/>
+    <cs:fontRef idx="minor">
+      <a:schemeClr val="tx1"/>
+    </cs:fontRef>
+    <cs:spPr>
+      <a:ln w="9525" cap="flat" cmpd="sng" algn="ctr">
+        <a:solidFill>
+          <a:schemeClr val="tx1">
+            <a:lumMod val="35000"/>
+            <a:lumOff val="65000"/>
+          </a:schemeClr>
+        </a:solidFill>
+        <a:round/>
+      </a:ln>
+    </cs:spPr>
+  </cs:leaderLine>
+  <cs:legend>
+    <cs:lnRef idx="0"/>
+    <cs:fillRef idx="0"/>
+    <cs:effectRef idx="0"/>
+    <cs:fontRef idx="minor">
+      <a:schemeClr val="tx1">
+        <a:lumMod val="65000"/>
+        <a:lumOff val="35000"/>
+      </a:schemeClr>
+    </cs:fontRef>
+    <cs:defRPr sz="1197" kern="1200"/>
+  </cs:legend>
+  <cs:plotArea>
+    <cs:lnRef idx="0"/>
+    <cs:fillRef idx="0"/>
+    <cs:effectRef idx="0"/>
+    <cs:fontRef idx="minor">
+      <a:schemeClr val="lt1"/>
+    </cs:fontRef>
+  </cs:plotArea>
+  <cs:plotArea3D>
+    <cs:lnRef idx="0"/>
+    <cs:fillRef idx="0"/>
+    <cs:effectRef idx="0"/>
+    <cs:fontRef idx="minor">
+      <a:schemeClr val="lt1"/>
+    </cs:fontRef>
+  </cs:plotArea3D>
+  <cs:seriesAxis>
+    <cs:lnRef idx="0"/>
+    <cs:fillRef idx="0"/>
+    <cs:effectRef idx="0"/>
+    <cs:fontRef idx="minor">
+      <a:schemeClr val="tx1">
+        <a:lumMod val="65000"/>
+        <a:lumOff val="35000"/>
+      </a:schemeClr>
+    </cs:fontRef>
+    <cs:spPr>
+      <a:ln w="12700" cap="flat" cmpd="sng" algn="ctr">
+        <a:solidFill>
+          <a:schemeClr val="tx1">
+            <a:lumMod val="15000"/>
+            <a:lumOff val="85000"/>
+          </a:schemeClr>
+        </a:solidFill>
+        <a:round/>
+      </a:ln>
+    </cs:spPr>
+    <cs:defRPr sz="1197" kern="1200"/>
+  </cs:seriesAxis>
+  <cs:seriesLine>
+    <cs:lnRef idx="0"/>
+    <cs:fillRef idx="0"/>
+    <cs:effectRef idx="0"/>
+    <cs:fontRef idx="minor">
+      <a:schemeClr val="tx1"/>
+    </cs:fontRef>
+    <cs:spPr>
+      <a:ln w="9525" cap="flat" cmpd="sng" algn="ctr">
+        <a:solidFill>
+          <a:schemeClr val="tx1">
+            <a:lumMod val="35000"/>
+            <a:lumOff val="65000"/>
+          </a:schemeClr>
+        </a:solidFill>
+        <a:round/>
+      </a:ln>
+    </cs:spPr>
+  </cs:seriesLine>
+  <cs:title>
+    <cs:lnRef idx="0"/>
+    <cs:fillRef idx="0"/>
+    <cs:effectRef idx="0"/>
+    <cs:fontRef idx="minor">
+      <a:schemeClr val="tx1">
+        <a:lumMod val="65000"/>
+        <a:lumOff val="35000"/>
+      </a:schemeClr>
+    </cs:fontRef>
+    <cs:defRPr sz="2128" b="1" kern="1200" baseline="0"/>
+  </cs:title>
+  <cs:trendline>
+    <cs:lnRef idx="0">
+      <cs:styleClr val="auto"/>
+    </cs:lnRef>
+    <cs:fillRef idx="0"/>
+    <cs:effectRef idx="0"/>
+    <cs:fontRef idx="minor">
+      <a:schemeClr val="lt1"/>
+    </cs:fontRef>
+    <cs:spPr>
+      <a:ln w="19050" cap="rnd">
+        <a:solidFill>
+          <a:schemeClr val="phClr"/>
+        </a:solidFill>
+      </a:ln>
+    </cs:spPr>
+  </cs:trendline>
+  <cs:trendlineLabel>
+    <cs:lnRef idx="0"/>
+    <cs:fillRef idx="0"/>
+    <cs:effectRef idx="0"/>
+    <cs:fontRef idx="minor">
+      <a:schemeClr val="tx1">
+        <a:lumMod val="65000"/>
+        <a:lumOff val="35000"/>
+      </a:schemeClr>
+    </cs:fontRef>
+    <cs:defRPr sz="1197" kern="1200"/>
+  </cs:trendlineLabel>
+  <cs:upBar>
+    <cs:lnRef idx="0"/>
+    <cs:fillRef idx="0"/>
+    <cs:effectRef idx="0"/>
+    <cs:fontRef idx="minor">
+      <a:schemeClr val="dk1"/>
+    </cs:fontRef>
+    <cs:spPr>
+      <a:solidFill>
+        <a:schemeClr val="lt1"/>
+      </a:solidFill>
+      <a:ln w="9525">
+        <a:solidFill>
+          <a:schemeClr val="tx1">
+            <a:lumMod val="15000"/>
+            <a:lumOff val="85000"/>
+          </a:schemeClr>
+        </a:solidFill>
+      </a:ln>
+    </cs:spPr>
+  </cs:upBar>
+  <cs:valueAxis>
+    <cs:lnRef idx="0"/>
+    <cs:fillRef idx="0"/>
+    <cs:effectRef idx="0"/>
+    <cs:fontRef idx="minor">
+      <a:schemeClr val="tx1">
+        <a:lumMod val="65000"/>
+        <a:lumOff val="35000"/>
+      </a:schemeClr>
+    </cs:fontRef>
+    <cs:defRPr sz="1197" kern="1200"/>
+  </cs:valueAxis>
+  <cs:wall>
+    <cs:lnRef idx="0"/>
+    <cs:fillRef idx="0"/>
+    <cs:effectRef idx="0"/>
+    <cs:fontRef idx="minor">
+      <a:schemeClr val="lt1"/>
+    </cs:fontRef>
+  </cs:wall>
+</cs:chartStyle>
+</file>
+
 <file path=ppt/notesMasters/notesMaster1.xml><?xml version="1.0" encoding="utf-8"?>
 <p:notesMaster xmlns:a="http://schemas.openxmlformats.org/drawingml/2006/main" xmlns:r="http://schemas.openxmlformats.org/officeDocument/2006/relationships" xmlns:p="http://schemas.openxmlformats.org/presentationml/2006/main">
   <p:cSld>
@@ -201,7 +1257,7 @@
           <a:p>
             <a:fld id="{94BE676F-555C-AE4D-B3E0-F8BCFFB2C399}" type="datetimeFigureOut">
               <a:rPr lang="en-US" smtClean="0"/>
-              <a:t>10/16/2017</a:t>
+              <a:t>10/22/2017</a:t>
             </a:fld>
             <a:endParaRPr lang="en-US"/>
           </a:p>
@@ -970,7 +2026,7 @@
           <a:p>
             <a:fld id="{8AEB1F6E-BE39-9349-BC16-46503606C6CE}" type="datetimeFigureOut">
               <a:rPr lang="en-US" smtClean="0"/>
-              <a:t>10/16/2017</a:t>
+              <a:t>10/22/2017</a:t>
             </a:fld>
             <a:endParaRPr lang="en-US"/>
           </a:p>
@@ -1261,7 +2317,7 @@
           <a:p>
             <a:fld id="{8AEB1F6E-BE39-9349-BC16-46503606C6CE}" type="datetimeFigureOut">
               <a:rPr lang="en-US" smtClean="0"/>
-              <a:t>10/16/2017</a:t>
+              <a:t>10/22/2017</a:t>
             </a:fld>
             <a:endParaRPr lang="en-US"/>
           </a:p>
@@ -1504,7 +2560,7 @@
           <a:p>
             <a:fld id="{8AEB1F6E-BE39-9349-BC16-46503606C6CE}" type="datetimeFigureOut">
               <a:rPr lang="en-US" smtClean="0"/>
-              <a:t>10/16/2017</a:t>
+              <a:t>10/22/2017</a:t>
             </a:fld>
             <a:endParaRPr lang="en-US"/>
           </a:p>
@@ -2039,7 +3095,7 @@
           <a:p>
             <a:fld id="{8AEB1F6E-BE39-9349-BC16-46503606C6CE}" type="datetimeFigureOut">
               <a:rPr lang="en-US" smtClean="0"/>
-              <a:t>10/16/2017</a:t>
+              <a:t>10/22/2017</a:t>
             </a:fld>
             <a:endParaRPr lang="en-US"/>
           </a:p>
@@ -2282,7 +3338,7 @@
           <a:p>
             <a:fld id="{8AEB1F6E-BE39-9349-BC16-46503606C6CE}" type="datetimeFigureOut">
               <a:rPr lang="en-US" smtClean="0"/>
-              <a:t>10/16/2017</a:t>
+              <a:t>10/22/2017</a:t>
             </a:fld>
             <a:endParaRPr lang="en-US"/>
           </a:p>
@@ -2809,7 +3865,7 @@
           <a:p>
             <a:fld id="{8AEB1F6E-BE39-9349-BC16-46503606C6CE}" type="datetimeFigureOut">
               <a:rPr lang="en-US" smtClean="0"/>
-              <a:t>10/16/2017</a:t>
+              <a:t>10/22/2017</a:t>
             </a:fld>
             <a:endParaRPr lang="en-US"/>
           </a:p>
@@ -3101,7 +4157,7 @@
           <a:p>
             <a:fld id="{8AEB1F6E-BE39-9349-BC16-46503606C6CE}" type="datetimeFigureOut">
               <a:rPr lang="en-US" smtClean="0"/>
-              <a:t>10/16/2017</a:t>
+              <a:t>10/22/2017</a:t>
             </a:fld>
             <a:endParaRPr lang="en-US"/>
           </a:p>
@@ -3270,7 +4326,7 @@
           <a:p>
             <a:fld id="{8AEB1F6E-BE39-9349-BC16-46503606C6CE}" type="datetimeFigureOut">
               <a:rPr lang="en-US" smtClean="0"/>
-              <a:t>10/16/2017</a:t>
+              <a:t>10/22/2017</a:t>
             </a:fld>
             <a:endParaRPr lang="en-US"/>
           </a:p>
@@ -3445,7 +4501,7 @@
           <a:p>
             <a:fld id="{8AEB1F6E-BE39-9349-BC16-46503606C6CE}" type="datetimeFigureOut">
               <a:rPr lang="en-US" smtClean="0"/>
-              <a:t>10/16/2017</a:t>
+              <a:t>10/22/2017</a:t>
             </a:fld>
             <a:endParaRPr lang="en-US"/>
           </a:p>
@@ -3651,7 +4707,7 @@
           <a:p>
             <a:fld id="{8AEB1F6E-BE39-9349-BC16-46503606C6CE}" type="datetimeFigureOut">
               <a:rPr lang="en-US" smtClean="0"/>
-              <a:t>10/16/2017</a:t>
+              <a:t>10/22/2017</a:t>
             </a:fld>
             <a:endParaRPr lang="en-US"/>
           </a:p>
@@ -3897,7 +4953,7 @@
           <a:p>
             <a:fld id="{8AEB1F6E-BE39-9349-BC16-46503606C6CE}" type="datetimeFigureOut">
               <a:rPr lang="en-US" smtClean="0"/>
-              <a:t>10/16/2017</a:t>
+              <a:t>10/22/2017</a:t>
             </a:fld>
             <a:endParaRPr lang="en-US"/>
           </a:p>
@@ -4239,7 +5295,7 @@
           <a:p>
             <a:fld id="{8AEB1F6E-BE39-9349-BC16-46503606C6CE}" type="datetimeFigureOut">
               <a:rPr lang="en-US" smtClean="0"/>
-              <a:t>10/16/2017</a:t>
+              <a:t>10/22/2017</a:t>
             </a:fld>
             <a:endParaRPr lang="en-US"/>
           </a:p>
@@ -4726,7 +5782,7 @@
           <a:p>
             <a:fld id="{8AEB1F6E-BE39-9349-BC16-46503606C6CE}" type="datetimeFigureOut">
               <a:rPr lang="en-US" smtClean="0"/>
-              <a:t>10/16/2017</a:t>
+              <a:t>10/22/2017</a:t>
             </a:fld>
             <a:endParaRPr lang="en-US"/>
           </a:p>
@@ -4839,7 +5895,7 @@
           <a:p>
             <a:fld id="{8AEB1F6E-BE39-9349-BC16-46503606C6CE}" type="datetimeFigureOut">
               <a:rPr lang="en-US" smtClean="0"/>
-              <a:t>10/16/2017</a:t>
+              <a:t>10/22/2017</a:t>
             </a:fld>
             <a:endParaRPr lang="en-US"/>
           </a:p>
@@ -4929,7 +5985,7 @@
           <a:p>
             <a:fld id="{8AEB1F6E-BE39-9349-BC16-46503606C6CE}" type="datetimeFigureOut">
               <a:rPr lang="en-US" smtClean="0"/>
-              <a:t>10/16/2017</a:t>
+              <a:t>10/22/2017</a:t>
             </a:fld>
             <a:endParaRPr lang="en-US"/>
           </a:p>
@@ -5207,7 +6263,7 @@
           <a:p>
             <a:fld id="{8AEB1F6E-BE39-9349-BC16-46503606C6CE}" type="datetimeFigureOut">
               <a:rPr lang="en-US" smtClean="0"/>
-              <a:t>10/16/2017</a:t>
+              <a:t>10/22/2017</a:t>
             </a:fld>
             <a:endParaRPr lang="en-US"/>
           </a:p>
@@ -5493,7 +6549,7 @@
           <a:p>
             <a:fld id="{8AEB1F6E-BE39-9349-BC16-46503606C6CE}" type="datetimeFigureOut">
               <a:rPr lang="en-US" smtClean="0"/>
-              <a:t>10/16/2017</a:t>
+              <a:t>10/22/2017</a:t>
             </a:fld>
             <a:endParaRPr lang="en-US"/>
           </a:p>
@@ -6018,7 +7074,7 @@
           <a:p>
             <a:fld id="{8AEB1F6E-BE39-9349-BC16-46503606C6CE}" type="datetimeFigureOut">
               <a:rPr lang="en-US" smtClean="0"/>
-              <a:t>10/16/2017</a:t>
+              <a:t>10/22/2017</a:t>
             </a:fld>
             <a:endParaRPr lang="en-US"/>
           </a:p>
@@ -6581,12 +7637,6 @@
               <a:t>Mathieu Renaud</a:t>
             </a:r>
           </a:p>
-          <a:p>
-            <a:r>
-              <a:rPr lang="en-US" dirty="0"/>
-              <a:t>test</a:t>
-            </a:r>
-          </a:p>
         </p:txBody>
       </p:sp>
       <p:pic>
@@ -6683,6 +7733,3267 @@
     <p:extLst>
       <p:ext uri="{BB962C8B-B14F-4D97-AF65-F5344CB8AC3E}">
         <p14:creationId xmlns:p14="http://schemas.microsoft.com/office/powerpoint/2010/main" val="305000610"/>
+      </p:ext>
+    </p:extLst>
+  </p:cSld>
+  <p:clrMapOvr>
+    <a:masterClrMapping/>
+  </p:clrMapOvr>
+</p:sld>
+</file>
+
+<file path=ppt/slides/slide10.xml><?xml version="1.0" encoding="utf-8"?>
+<p:sld xmlns:a="http://schemas.openxmlformats.org/drawingml/2006/main" xmlns:r="http://schemas.openxmlformats.org/officeDocument/2006/relationships" xmlns:p="http://schemas.openxmlformats.org/presentationml/2006/main">
+  <p:cSld>
+    <p:spTree>
+      <p:nvGrpSpPr>
+        <p:cNvPr id="1" name=""/>
+        <p:cNvGrpSpPr/>
+        <p:nvPr/>
+      </p:nvGrpSpPr>
+      <p:grpSpPr>
+        <a:xfrm>
+          <a:off x="0" y="0"/>
+          <a:ext cx="0" cy="0"/>
+          <a:chOff x="0" y="0"/>
+          <a:chExt cx="0" cy="0"/>
+        </a:xfrm>
+      </p:grpSpPr>
+      <p:sp>
+        <p:nvSpPr>
+          <p:cNvPr id="2" name="Title 1"/>
+          <p:cNvSpPr>
+            <a:spLocks noGrp="1"/>
+          </p:cNvSpPr>
+          <p:nvPr>
+            <p:ph type="title"/>
+          </p:nvPr>
+        </p:nvSpPr>
+        <p:spPr/>
+        <p:txBody>
+          <a:bodyPr/>
+          <a:lstStyle/>
+          <a:p>
+            <a:r>
+              <a:rPr lang="en-US" dirty="0" err="1"/>
+              <a:t>Sauvegarder</a:t>
+            </a:r>
+            <a:r>
+              <a:rPr lang="en-US" dirty="0"/>
+              <a:t> </a:t>
+            </a:r>
+            <a:r>
+              <a:rPr lang="en-US" dirty="0" err="1"/>
+              <a:t>une</a:t>
+            </a:r>
+            <a:r>
+              <a:rPr lang="en-US" dirty="0"/>
+              <a:t> version</a:t>
+            </a:r>
+          </a:p>
+        </p:txBody>
+      </p:sp>
+      <p:sp>
+        <p:nvSpPr>
+          <p:cNvPr id="3" name="Content Placeholder 2"/>
+          <p:cNvSpPr>
+            <a:spLocks noGrp="1"/>
+          </p:cNvSpPr>
+          <p:nvPr>
+            <p:ph idx="1"/>
+          </p:nvPr>
+        </p:nvSpPr>
+        <p:spPr>
+          <a:xfrm>
+            <a:off x="1484310" y="1043682"/>
+            <a:ext cx="10018713" cy="3124201"/>
+          </a:xfrm>
+        </p:spPr>
+        <p:txBody>
+          <a:bodyPr/>
+          <a:lstStyle/>
+          <a:p>
+            <a:r>
+              <a:rPr lang="en-US" dirty="0"/>
+              <a:t>Les </a:t>
+            </a:r>
+            <a:r>
+              <a:rPr lang="en-US" dirty="0" err="1"/>
+              <a:t>commandes</a:t>
+            </a:r>
+            <a:r>
+              <a:rPr lang="en-US" dirty="0"/>
+              <a:t> ”</a:t>
+            </a:r>
+            <a:r>
+              <a:rPr lang="en-US" dirty="0" err="1"/>
+              <a:t>git</a:t>
+            </a:r>
+            <a:r>
+              <a:rPr lang="en-US" dirty="0"/>
+              <a:t> add .” et ”</a:t>
+            </a:r>
+            <a:r>
+              <a:rPr lang="en-US" dirty="0" err="1"/>
+              <a:t>git</a:t>
+            </a:r>
+            <a:r>
+              <a:rPr lang="en-US" dirty="0"/>
+              <a:t> commit”</a:t>
+            </a:r>
+          </a:p>
+        </p:txBody>
+      </p:sp>
+      <p:pic>
+        <p:nvPicPr>
+          <p:cNvPr id="4" name="Picture 3"/>
+          <p:cNvPicPr>
+            <a:picLocks noChangeAspect="1"/>
+          </p:cNvPicPr>
+          <p:nvPr/>
+        </p:nvPicPr>
+        <p:blipFill>
+          <a:blip r:embed="rId2">
+            <a:extLst>
+              <a:ext uri="{28A0092B-C50C-407E-A947-70E740481C1C}">
+                <a14:useLocalDpi xmlns:a14="http://schemas.microsoft.com/office/drawing/2010/main" val="0"/>
+              </a:ext>
+            </a:extLst>
+          </a:blip>
+          <a:stretch>
+            <a:fillRect/>
+          </a:stretch>
+        </p:blipFill>
+        <p:spPr>
+          <a:xfrm>
+            <a:off x="2353781" y="3395469"/>
+            <a:ext cx="1981200" cy="215900"/>
+          </a:xfrm>
+          <a:prstGeom prst="rect">
+            <a:avLst/>
+          </a:prstGeom>
+          <a:ln>
+            <a:noFill/>
+          </a:ln>
+          <a:effectLst>
+            <a:outerShdw blurRad="292100" dist="139700" dir="2700000" algn="tl" rotWithShape="0">
+              <a:srgbClr val="333333">
+                <a:alpha val="65000"/>
+              </a:srgbClr>
+            </a:outerShdw>
+          </a:effectLst>
+        </p:spPr>
+      </p:pic>
+      <p:pic>
+        <p:nvPicPr>
+          <p:cNvPr id="5" name="Picture 4"/>
+          <p:cNvPicPr>
+            <a:picLocks noChangeAspect="1"/>
+          </p:cNvPicPr>
+          <p:nvPr/>
+        </p:nvPicPr>
+        <p:blipFill>
+          <a:blip r:embed="rId3">
+            <a:extLst>
+              <a:ext uri="{28A0092B-C50C-407E-A947-70E740481C1C}">
+                <a14:useLocalDpi xmlns:a14="http://schemas.microsoft.com/office/drawing/2010/main" val="0"/>
+              </a:ext>
+            </a:extLst>
+          </a:blip>
+          <a:stretch>
+            <a:fillRect/>
+          </a:stretch>
+        </p:blipFill>
+        <p:spPr>
+          <a:xfrm>
+            <a:off x="2353781" y="3719604"/>
+            <a:ext cx="3683000" cy="876300"/>
+          </a:xfrm>
+          <a:prstGeom prst="rect">
+            <a:avLst/>
+          </a:prstGeom>
+          <a:ln>
+            <a:noFill/>
+          </a:ln>
+          <a:effectLst>
+            <a:outerShdw blurRad="292100" dist="139700" dir="2700000" algn="tl" rotWithShape="0">
+              <a:srgbClr val="333333">
+                <a:alpha val="65000"/>
+              </a:srgbClr>
+            </a:outerShdw>
+          </a:effectLst>
+        </p:spPr>
+      </p:pic>
+      <p:pic>
+        <p:nvPicPr>
+          <p:cNvPr id="6" name="Picture 5"/>
+          <p:cNvPicPr/>
+          <p:nvPr/>
+        </p:nvPicPr>
+        <p:blipFill>
+          <a:blip r:embed="rId4">
+            <a:extLst>
+              <a:ext uri="{28A0092B-C50C-407E-A947-70E740481C1C}">
+                <a14:useLocalDpi xmlns:a14="http://schemas.microsoft.com/office/drawing/2010/main" val="0"/>
+              </a:ext>
+            </a:extLst>
+          </a:blip>
+          <a:stretch>
+            <a:fillRect/>
+          </a:stretch>
+        </p:blipFill>
+        <p:spPr>
+          <a:xfrm>
+            <a:off x="6906252" y="3006141"/>
+            <a:ext cx="4177548" cy="2303225"/>
+          </a:xfrm>
+          <a:prstGeom prst="rect">
+            <a:avLst/>
+          </a:prstGeom>
+        </p:spPr>
+      </p:pic>
+    </p:spTree>
+    <p:extLst>
+      <p:ext uri="{BB962C8B-B14F-4D97-AF65-F5344CB8AC3E}">
+        <p14:creationId xmlns:p14="http://schemas.microsoft.com/office/powerpoint/2010/main" val="632227306"/>
+      </p:ext>
+    </p:extLst>
+  </p:cSld>
+  <p:clrMapOvr>
+    <a:masterClrMapping/>
+  </p:clrMapOvr>
+</p:sld>
+</file>
+
+<file path=ppt/slides/slide11.xml><?xml version="1.0" encoding="utf-8"?>
+<p:sld xmlns:a="http://schemas.openxmlformats.org/drawingml/2006/main" xmlns:r="http://schemas.openxmlformats.org/officeDocument/2006/relationships" xmlns:p="http://schemas.openxmlformats.org/presentationml/2006/main">
+  <p:cSld>
+    <p:spTree>
+      <p:nvGrpSpPr>
+        <p:cNvPr id="1" name=""/>
+        <p:cNvGrpSpPr/>
+        <p:nvPr/>
+      </p:nvGrpSpPr>
+      <p:grpSpPr>
+        <a:xfrm>
+          <a:off x="0" y="0"/>
+          <a:ext cx="0" cy="0"/>
+          <a:chOff x="0" y="0"/>
+          <a:chExt cx="0" cy="0"/>
+        </a:xfrm>
+      </p:grpSpPr>
+      <p:sp>
+        <p:nvSpPr>
+          <p:cNvPr id="2" name="Title 1"/>
+          <p:cNvSpPr>
+            <a:spLocks noGrp="1"/>
+          </p:cNvSpPr>
+          <p:nvPr>
+            <p:ph type="title"/>
+          </p:nvPr>
+        </p:nvSpPr>
+        <p:spPr/>
+        <p:txBody>
+          <a:bodyPr/>
+          <a:lstStyle/>
+          <a:p>
+            <a:r>
+              <a:rPr lang="en-US" dirty="0"/>
+              <a:t>Le </a:t>
+            </a:r>
+            <a:r>
+              <a:rPr lang="en-US" dirty="0" err="1"/>
+              <a:t>génie</a:t>
+            </a:r>
+            <a:r>
+              <a:rPr lang="en-US" dirty="0"/>
+              <a:t> de </a:t>
+            </a:r>
+            <a:r>
+              <a:rPr lang="en-US" dirty="0" err="1"/>
+              <a:t>Git</a:t>
+            </a:r>
+            <a:endParaRPr lang="en-US" dirty="0"/>
+          </a:p>
+        </p:txBody>
+      </p:sp>
+      <p:sp>
+        <p:nvSpPr>
+          <p:cNvPr id="3" name="Content Placeholder 2"/>
+          <p:cNvSpPr>
+            <a:spLocks noGrp="1"/>
+          </p:cNvSpPr>
+          <p:nvPr>
+            <p:ph idx="1"/>
+          </p:nvPr>
+        </p:nvSpPr>
+        <p:spPr>
+          <a:xfrm>
+            <a:off x="1484311" y="876298"/>
+            <a:ext cx="10018713" cy="3124201"/>
+          </a:xfrm>
+        </p:spPr>
+        <p:txBody>
+          <a:bodyPr/>
+          <a:lstStyle/>
+          <a:p>
+            <a:r>
+              <a:rPr lang="en-US" dirty="0"/>
+              <a:t>Je </a:t>
+            </a:r>
+            <a:r>
+              <a:rPr lang="en-US" dirty="0" err="1"/>
+              <a:t>retourne</a:t>
+            </a:r>
+            <a:r>
+              <a:rPr lang="en-US" dirty="0"/>
+              <a:t> sur la </a:t>
+            </a:r>
+            <a:r>
+              <a:rPr lang="en-US" dirty="0" err="1"/>
+              <a:t>branche</a:t>
+            </a:r>
+            <a:r>
+              <a:rPr lang="en-US" dirty="0"/>
+              <a:t> master</a:t>
+            </a:r>
+          </a:p>
+        </p:txBody>
+      </p:sp>
+      <p:pic>
+        <p:nvPicPr>
+          <p:cNvPr id="4" name="Picture 3"/>
+          <p:cNvPicPr>
+            <a:picLocks noChangeAspect="1"/>
+          </p:cNvPicPr>
+          <p:nvPr/>
+        </p:nvPicPr>
+        <p:blipFill>
+          <a:blip r:embed="rId2">
+            <a:extLst>
+              <a:ext uri="{28A0092B-C50C-407E-A947-70E740481C1C}">
+                <a14:useLocalDpi xmlns:a14="http://schemas.microsoft.com/office/drawing/2010/main" val="0"/>
+              </a:ext>
+            </a:extLst>
+          </a:blip>
+          <a:stretch>
+            <a:fillRect/>
+          </a:stretch>
+        </p:blipFill>
+        <p:spPr>
+          <a:xfrm>
+            <a:off x="1484311" y="3124199"/>
+            <a:ext cx="5533669" cy="1752599"/>
+          </a:xfrm>
+          <a:prstGeom prst="rect">
+            <a:avLst/>
+          </a:prstGeom>
+        </p:spPr>
+      </p:pic>
+      <p:pic>
+        <p:nvPicPr>
+          <p:cNvPr id="5" name="Picture 4"/>
+          <p:cNvPicPr>
+            <a:picLocks noChangeAspect="1"/>
+          </p:cNvPicPr>
+          <p:nvPr/>
+        </p:nvPicPr>
+        <p:blipFill>
+          <a:blip r:embed="rId3">
+            <a:extLst>
+              <a:ext uri="{28A0092B-C50C-407E-A947-70E740481C1C}">
+                <a14:useLocalDpi xmlns:a14="http://schemas.microsoft.com/office/drawing/2010/main" val="0"/>
+              </a:ext>
+            </a:extLst>
+          </a:blip>
+          <a:stretch>
+            <a:fillRect/>
+          </a:stretch>
+        </p:blipFill>
+        <p:spPr>
+          <a:xfrm>
+            <a:off x="7238360" y="2438398"/>
+            <a:ext cx="4264664" cy="2952459"/>
+          </a:xfrm>
+          <a:prstGeom prst="rect">
+            <a:avLst/>
+          </a:prstGeom>
+          <a:ln>
+            <a:noFill/>
+          </a:ln>
+          <a:effectLst>
+            <a:outerShdw blurRad="292100" dist="139700" dir="2700000" algn="tl" rotWithShape="0">
+              <a:srgbClr val="333333">
+                <a:alpha val="65000"/>
+              </a:srgbClr>
+            </a:outerShdw>
+          </a:effectLst>
+        </p:spPr>
+      </p:pic>
+    </p:spTree>
+    <p:extLst>
+      <p:ext uri="{BB962C8B-B14F-4D97-AF65-F5344CB8AC3E}">
+        <p14:creationId xmlns:p14="http://schemas.microsoft.com/office/powerpoint/2010/main" val="1259623558"/>
+      </p:ext>
+    </p:extLst>
+  </p:cSld>
+  <p:clrMapOvr>
+    <a:masterClrMapping/>
+  </p:clrMapOvr>
+</p:sld>
+</file>
+
+<file path=ppt/slides/slide12.xml><?xml version="1.0" encoding="utf-8"?>
+<p:sld xmlns:a="http://schemas.openxmlformats.org/drawingml/2006/main" xmlns:r="http://schemas.openxmlformats.org/officeDocument/2006/relationships" xmlns:p="http://schemas.openxmlformats.org/presentationml/2006/main">
+  <p:cSld>
+    <p:spTree>
+      <p:nvGrpSpPr>
+        <p:cNvPr id="1" name=""/>
+        <p:cNvGrpSpPr/>
+        <p:nvPr/>
+      </p:nvGrpSpPr>
+      <p:grpSpPr>
+        <a:xfrm>
+          <a:off x="0" y="0"/>
+          <a:ext cx="0" cy="0"/>
+          <a:chOff x="0" y="0"/>
+          <a:chExt cx="0" cy="0"/>
+        </a:xfrm>
+      </p:grpSpPr>
+      <p:sp>
+        <p:nvSpPr>
+          <p:cNvPr id="2" name="Title 1"/>
+          <p:cNvSpPr>
+            <a:spLocks noGrp="1"/>
+          </p:cNvSpPr>
+          <p:nvPr>
+            <p:ph type="title"/>
+          </p:nvPr>
+        </p:nvSpPr>
+        <p:spPr/>
+        <p:txBody>
+          <a:bodyPr/>
+          <a:lstStyle/>
+          <a:p>
+            <a:r>
+              <a:rPr lang="en-US" dirty="0" err="1"/>
+              <a:t>Fusionner</a:t>
+            </a:r>
+            <a:r>
+              <a:rPr lang="en-US" dirty="0"/>
+              <a:t> les branches</a:t>
+            </a:r>
+          </a:p>
+        </p:txBody>
+      </p:sp>
+      <p:sp>
+        <p:nvSpPr>
+          <p:cNvPr id="3" name="Content Placeholder 2"/>
+          <p:cNvSpPr>
+            <a:spLocks noGrp="1"/>
+          </p:cNvSpPr>
+          <p:nvPr>
+            <p:ph idx="1"/>
+          </p:nvPr>
+        </p:nvSpPr>
+        <p:spPr>
+          <a:xfrm>
+            <a:off x="1484311" y="1228617"/>
+            <a:ext cx="10018713" cy="3124201"/>
+          </a:xfrm>
+        </p:spPr>
+        <p:txBody>
+          <a:bodyPr/>
+          <a:lstStyle/>
+          <a:p>
+            <a:r>
+              <a:rPr lang="en-US" dirty="0" err="1"/>
+              <a:t>Lorsque</a:t>
+            </a:r>
+            <a:r>
+              <a:rPr lang="en-US" dirty="0"/>
+              <a:t> la version de la </a:t>
+            </a:r>
+            <a:r>
+              <a:rPr lang="en-US" dirty="0" err="1"/>
+              <a:t>branche</a:t>
+            </a:r>
+            <a:r>
+              <a:rPr lang="en-US" dirty="0"/>
+              <a:t> </a:t>
+            </a:r>
+            <a:r>
+              <a:rPr lang="en-US" dirty="0" err="1"/>
+              <a:t>est</a:t>
+            </a:r>
+            <a:r>
+              <a:rPr lang="en-US" dirty="0"/>
+              <a:t> stable</a:t>
+            </a:r>
+          </a:p>
+          <a:p>
+            <a:r>
+              <a:rPr lang="en-US" dirty="0"/>
+              <a:t>On </a:t>
+            </a:r>
+            <a:r>
+              <a:rPr lang="en-US" dirty="0" err="1"/>
+              <a:t>veut</a:t>
+            </a:r>
+            <a:r>
+              <a:rPr lang="en-US" dirty="0"/>
+              <a:t> que </a:t>
+            </a:r>
+            <a:r>
+              <a:rPr lang="en-US" dirty="0" err="1"/>
+              <a:t>notre</a:t>
+            </a:r>
+            <a:r>
+              <a:rPr lang="en-US" dirty="0"/>
+              <a:t> travail </a:t>
+            </a:r>
+            <a:r>
+              <a:rPr lang="en-US" dirty="0" err="1"/>
+              <a:t>soit</a:t>
+            </a:r>
+            <a:r>
+              <a:rPr lang="en-US" dirty="0"/>
+              <a:t> sur le </a:t>
+            </a:r>
+            <a:r>
+              <a:rPr lang="en-US" dirty="0" err="1"/>
+              <a:t>produit</a:t>
+            </a:r>
+            <a:r>
+              <a:rPr lang="en-US" dirty="0"/>
+              <a:t> final</a:t>
+            </a:r>
+          </a:p>
+        </p:txBody>
+      </p:sp>
+      <p:pic>
+        <p:nvPicPr>
+          <p:cNvPr id="4" name="Picture 3"/>
+          <p:cNvPicPr>
+            <a:picLocks noChangeAspect="1"/>
+          </p:cNvPicPr>
+          <p:nvPr/>
+        </p:nvPicPr>
+        <p:blipFill>
+          <a:blip r:embed="rId2">
+            <a:extLst>
+              <a:ext uri="{28A0092B-C50C-407E-A947-70E740481C1C}">
+                <a14:useLocalDpi xmlns:a14="http://schemas.microsoft.com/office/drawing/2010/main" val="0"/>
+              </a:ext>
+            </a:extLst>
+          </a:blip>
+          <a:stretch>
+            <a:fillRect/>
+          </a:stretch>
+        </p:blipFill>
+        <p:spPr>
+          <a:xfrm>
+            <a:off x="1864454" y="3546012"/>
+            <a:ext cx="4341483" cy="2053404"/>
+          </a:xfrm>
+          <a:prstGeom prst="rect">
+            <a:avLst/>
+          </a:prstGeom>
+          <a:ln>
+            <a:noFill/>
+          </a:ln>
+          <a:effectLst>
+            <a:outerShdw blurRad="292100" dist="139700" dir="2700000" algn="tl" rotWithShape="0">
+              <a:srgbClr val="333333">
+                <a:alpha val="65000"/>
+              </a:srgbClr>
+            </a:outerShdw>
+          </a:effectLst>
+        </p:spPr>
+      </p:pic>
+      <p:pic>
+        <p:nvPicPr>
+          <p:cNvPr id="5" name="Picture 4"/>
+          <p:cNvPicPr>
+            <a:picLocks noChangeAspect="1"/>
+          </p:cNvPicPr>
+          <p:nvPr/>
+        </p:nvPicPr>
+        <p:blipFill>
+          <a:blip r:embed="rId3">
+            <a:extLst>
+              <a:ext uri="{28A0092B-C50C-407E-A947-70E740481C1C}">
+                <a14:useLocalDpi xmlns:a14="http://schemas.microsoft.com/office/drawing/2010/main" val="0"/>
+              </a:ext>
+            </a:extLst>
+          </a:blip>
+          <a:stretch>
+            <a:fillRect/>
+          </a:stretch>
+        </p:blipFill>
+        <p:spPr>
+          <a:xfrm>
+            <a:off x="6852841" y="3546012"/>
+            <a:ext cx="4142623" cy="2053404"/>
+          </a:xfrm>
+          <a:prstGeom prst="rect">
+            <a:avLst/>
+          </a:prstGeom>
+          <a:ln>
+            <a:noFill/>
+          </a:ln>
+          <a:effectLst>
+            <a:outerShdw blurRad="292100" dist="139700" dir="2700000" algn="tl" rotWithShape="0">
+              <a:srgbClr val="333333">
+                <a:alpha val="65000"/>
+              </a:srgbClr>
+            </a:outerShdw>
+          </a:effectLst>
+        </p:spPr>
+      </p:pic>
+    </p:spTree>
+    <p:extLst>
+      <p:ext uri="{BB962C8B-B14F-4D97-AF65-F5344CB8AC3E}">
+        <p14:creationId xmlns:p14="http://schemas.microsoft.com/office/powerpoint/2010/main" val="290860016"/>
+      </p:ext>
+    </p:extLst>
+  </p:cSld>
+  <p:clrMapOvr>
+    <a:masterClrMapping/>
+  </p:clrMapOvr>
+</p:sld>
+</file>
+
+<file path=ppt/slides/slide13.xml><?xml version="1.0" encoding="utf-8"?>
+<p:sld xmlns:a="http://schemas.openxmlformats.org/drawingml/2006/main" xmlns:r="http://schemas.openxmlformats.org/officeDocument/2006/relationships" xmlns:p="http://schemas.openxmlformats.org/presentationml/2006/main">
+  <p:cSld>
+    <p:spTree>
+      <p:nvGrpSpPr>
+        <p:cNvPr id="1" name=""/>
+        <p:cNvGrpSpPr/>
+        <p:nvPr/>
+      </p:nvGrpSpPr>
+      <p:grpSpPr>
+        <a:xfrm>
+          <a:off x="0" y="0"/>
+          <a:ext cx="0" cy="0"/>
+          <a:chOff x="0" y="0"/>
+          <a:chExt cx="0" cy="0"/>
+        </a:xfrm>
+      </p:grpSpPr>
+      <p:sp>
+        <p:nvSpPr>
+          <p:cNvPr id="2" name="Title 1"/>
+          <p:cNvSpPr>
+            <a:spLocks noGrp="1"/>
+          </p:cNvSpPr>
+          <p:nvPr>
+            <p:ph type="title"/>
+          </p:nvPr>
+        </p:nvSpPr>
+        <p:spPr/>
+        <p:txBody>
+          <a:bodyPr/>
+          <a:lstStyle/>
+          <a:p>
+            <a:r>
+              <a:rPr lang="en-US" dirty="0" err="1"/>
+              <a:t>Recevoir</a:t>
+            </a:r>
+            <a:r>
+              <a:rPr lang="en-US" dirty="0"/>
+              <a:t>/</a:t>
+            </a:r>
+            <a:r>
+              <a:rPr lang="en-US" dirty="0" err="1"/>
+              <a:t>Envoyer</a:t>
+            </a:r>
+            <a:r>
+              <a:rPr lang="en-US" dirty="0"/>
+              <a:t> </a:t>
+            </a:r>
+            <a:r>
+              <a:rPr lang="en-US" dirty="0" err="1"/>
+              <a:t>notre</a:t>
+            </a:r>
+            <a:r>
+              <a:rPr lang="en-US" dirty="0"/>
+              <a:t> version </a:t>
+            </a:r>
+            <a:r>
+              <a:rPr lang="en-US" dirty="0" err="1"/>
+              <a:t>vers</a:t>
+            </a:r>
+            <a:r>
+              <a:rPr lang="en-US" dirty="0"/>
+              <a:t> GitHub</a:t>
+            </a:r>
+          </a:p>
+        </p:txBody>
+      </p:sp>
+      <p:sp>
+        <p:nvSpPr>
+          <p:cNvPr id="3" name="Content Placeholder 2"/>
+          <p:cNvSpPr>
+            <a:spLocks noGrp="1"/>
+          </p:cNvSpPr>
+          <p:nvPr>
+            <p:ph idx="1"/>
+          </p:nvPr>
+        </p:nvSpPr>
+        <p:spPr>
+          <a:xfrm>
+            <a:off x="1484311" y="1331359"/>
+            <a:ext cx="10018713" cy="3124201"/>
+          </a:xfrm>
+        </p:spPr>
+        <p:txBody>
+          <a:bodyPr/>
+          <a:lstStyle/>
+          <a:p>
+            <a:r>
+              <a:rPr lang="en-US" dirty="0"/>
+              <a:t>Pour que </a:t>
+            </a:r>
+            <a:r>
+              <a:rPr lang="en-US" dirty="0" err="1"/>
+              <a:t>l’équipe</a:t>
+            </a:r>
+            <a:r>
+              <a:rPr lang="en-US" dirty="0"/>
+              <a:t> </a:t>
+            </a:r>
+            <a:r>
+              <a:rPr lang="en-US" dirty="0" err="1"/>
+              <a:t>soit</a:t>
+            </a:r>
+            <a:r>
+              <a:rPr lang="en-US" dirty="0"/>
+              <a:t> </a:t>
+            </a:r>
+            <a:r>
+              <a:rPr lang="en-US" dirty="0" err="1"/>
+              <a:t>en</a:t>
+            </a:r>
+            <a:r>
+              <a:rPr lang="en-US" dirty="0"/>
+              <a:t> </a:t>
+            </a:r>
+            <a:r>
+              <a:rPr lang="en-US" dirty="0" err="1"/>
+              <a:t>mesure</a:t>
+            </a:r>
+            <a:r>
+              <a:rPr lang="en-US" dirty="0"/>
+              <a:t> de </a:t>
+            </a:r>
+            <a:r>
+              <a:rPr lang="en-US" dirty="0" err="1"/>
+              <a:t>voir</a:t>
+            </a:r>
+            <a:r>
+              <a:rPr lang="en-US" dirty="0"/>
+              <a:t> le travail </a:t>
+            </a:r>
+            <a:r>
+              <a:rPr lang="en-US" dirty="0" err="1"/>
+              <a:t>avancé</a:t>
+            </a:r>
+            <a:endParaRPr lang="en-US" dirty="0"/>
+          </a:p>
+          <a:p>
+            <a:r>
+              <a:rPr lang="en-US" dirty="0" err="1"/>
+              <a:t>Afin</a:t>
+            </a:r>
+            <a:r>
+              <a:rPr lang="en-US" dirty="0"/>
+              <a:t> que </a:t>
+            </a:r>
+            <a:r>
+              <a:rPr lang="en-US" dirty="0" err="1"/>
+              <a:t>vos</a:t>
+            </a:r>
+            <a:r>
+              <a:rPr lang="en-US" dirty="0"/>
+              <a:t> </a:t>
+            </a:r>
+            <a:r>
+              <a:rPr lang="en-US" dirty="0" err="1"/>
+              <a:t>collègues</a:t>
+            </a:r>
+            <a:r>
+              <a:rPr lang="en-US" dirty="0"/>
+              <a:t> </a:t>
+            </a:r>
+            <a:r>
+              <a:rPr lang="en-US" dirty="0" err="1"/>
+              <a:t>puissent</a:t>
+            </a:r>
+            <a:r>
+              <a:rPr lang="en-US" dirty="0"/>
+              <a:t> </a:t>
+            </a:r>
+            <a:r>
+              <a:rPr lang="en-US" dirty="0" err="1"/>
+              <a:t>prendre</a:t>
+            </a:r>
+            <a:r>
+              <a:rPr lang="en-US" dirty="0"/>
+              <a:t> </a:t>
+            </a:r>
+            <a:r>
+              <a:rPr lang="en-US" dirty="0" err="1"/>
+              <a:t>une</a:t>
+            </a:r>
+            <a:r>
+              <a:rPr lang="en-US" dirty="0"/>
+              <a:t> </a:t>
+            </a:r>
+            <a:r>
+              <a:rPr lang="en-US" dirty="0" err="1"/>
+              <a:t>copie</a:t>
+            </a:r>
+            <a:r>
+              <a:rPr lang="en-US" dirty="0"/>
+              <a:t> de </a:t>
+            </a:r>
+            <a:r>
+              <a:rPr lang="en-US" dirty="0" err="1"/>
+              <a:t>votre</a:t>
+            </a:r>
+            <a:r>
+              <a:rPr lang="en-US" dirty="0"/>
+              <a:t> travail et continuer à </a:t>
+            </a:r>
+            <a:r>
+              <a:rPr lang="en-US" dirty="0" err="1"/>
+              <a:t>avancer</a:t>
+            </a:r>
+            <a:r>
+              <a:rPr lang="en-US" dirty="0"/>
+              <a:t> de </a:t>
+            </a:r>
+            <a:r>
+              <a:rPr lang="en-US" dirty="0" err="1"/>
+              <a:t>leur</a:t>
+            </a:r>
+            <a:r>
+              <a:rPr lang="en-US" dirty="0"/>
+              <a:t> </a:t>
+            </a:r>
+            <a:r>
+              <a:rPr lang="en-US" dirty="0" err="1"/>
+              <a:t>côté</a:t>
+            </a:r>
+            <a:r>
+              <a:rPr lang="en-US" dirty="0"/>
+              <a:t>.</a:t>
+            </a:r>
+          </a:p>
+        </p:txBody>
+      </p:sp>
+      <p:pic>
+        <p:nvPicPr>
+          <p:cNvPr id="4" name="Picture 3"/>
+          <p:cNvPicPr>
+            <a:picLocks noChangeAspect="1"/>
+          </p:cNvPicPr>
+          <p:nvPr/>
+        </p:nvPicPr>
+        <p:blipFill>
+          <a:blip r:embed="rId2">
+            <a:extLst>
+              <a:ext uri="{28A0092B-C50C-407E-A947-70E740481C1C}">
+                <a14:useLocalDpi xmlns:a14="http://schemas.microsoft.com/office/drawing/2010/main" val="0"/>
+              </a:ext>
+            </a:extLst>
+          </a:blip>
+          <a:stretch>
+            <a:fillRect/>
+          </a:stretch>
+        </p:blipFill>
+        <p:spPr>
+          <a:xfrm>
+            <a:off x="3432967" y="3788510"/>
+            <a:ext cx="6121400" cy="2184400"/>
+          </a:xfrm>
+          <a:prstGeom prst="rect">
+            <a:avLst/>
+          </a:prstGeom>
+          <a:ln>
+            <a:noFill/>
+          </a:ln>
+          <a:effectLst>
+            <a:outerShdw blurRad="292100" dist="139700" dir="2700000" algn="tl" rotWithShape="0">
+              <a:srgbClr val="333333">
+                <a:alpha val="65000"/>
+              </a:srgbClr>
+            </a:outerShdw>
+          </a:effectLst>
+        </p:spPr>
+      </p:pic>
+      <p:sp>
+        <p:nvSpPr>
+          <p:cNvPr id="6" name="TextBox 5"/>
+          <p:cNvSpPr txBox="1"/>
+          <p:nvPr/>
+        </p:nvSpPr>
+        <p:spPr>
+          <a:xfrm>
+            <a:off x="3443241" y="5558320"/>
+            <a:ext cx="5865145" cy="369332"/>
+          </a:xfrm>
+          <a:prstGeom prst="rect">
+            <a:avLst/>
+          </a:prstGeom>
+          <a:noFill/>
+        </p:spPr>
+        <p:style>
+          <a:lnRef idx="2">
+            <a:schemeClr val="accent2"/>
+          </a:lnRef>
+          <a:fillRef idx="1">
+            <a:schemeClr val="lt1"/>
+          </a:fillRef>
+          <a:effectRef idx="0">
+            <a:schemeClr val="accent2"/>
+          </a:effectRef>
+          <a:fontRef idx="minor">
+            <a:schemeClr val="dk1"/>
+          </a:fontRef>
+        </p:style>
+        <p:txBody>
+          <a:bodyPr wrap="square" rtlCol="0">
+            <a:spAutoFit/>
+          </a:bodyPr>
+          <a:lstStyle/>
+          <a:p>
+            <a:endParaRPr lang="en-US"/>
+          </a:p>
+        </p:txBody>
+      </p:sp>
+    </p:spTree>
+    <p:extLst>
+      <p:ext uri="{BB962C8B-B14F-4D97-AF65-F5344CB8AC3E}">
+        <p14:creationId xmlns:p14="http://schemas.microsoft.com/office/powerpoint/2010/main" val="774876149"/>
+      </p:ext>
+    </p:extLst>
+  </p:cSld>
+  <p:clrMapOvr>
+    <a:masterClrMapping/>
+  </p:clrMapOvr>
+</p:sld>
+</file>
+
+<file path=ppt/slides/slide14.xml><?xml version="1.0" encoding="utf-8"?>
+<p:sld xmlns:a="http://schemas.openxmlformats.org/drawingml/2006/main" xmlns:r="http://schemas.openxmlformats.org/officeDocument/2006/relationships" xmlns:p="http://schemas.openxmlformats.org/presentationml/2006/main">
+  <p:cSld>
+    <p:spTree>
+      <p:nvGrpSpPr>
+        <p:cNvPr id="1" name=""/>
+        <p:cNvGrpSpPr/>
+        <p:nvPr/>
+      </p:nvGrpSpPr>
+      <p:grpSpPr>
+        <a:xfrm>
+          <a:off x="0" y="0"/>
+          <a:ext cx="0" cy="0"/>
+          <a:chOff x="0" y="0"/>
+          <a:chExt cx="0" cy="0"/>
+        </a:xfrm>
+      </p:grpSpPr>
+      <p:sp>
+        <p:nvSpPr>
+          <p:cNvPr id="2" name="Title 1"/>
+          <p:cNvSpPr>
+            <a:spLocks noGrp="1"/>
+          </p:cNvSpPr>
+          <p:nvPr>
+            <p:ph type="title"/>
+          </p:nvPr>
+        </p:nvSpPr>
+        <p:spPr/>
+        <p:txBody>
+          <a:bodyPr/>
+          <a:lstStyle/>
+          <a:p>
+            <a:r>
+              <a:rPr lang="en-US" dirty="0" err="1"/>
+              <a:t>Gérer</a:t>
+            </a:r>
+            <a:r>
+              <a:rPr lang="en-US" dirty="0"/>
+              <a:t> les </a:t>
+            </a:r>
+            <a:r>
+              <a:rPr lang="en-US" dirty="0" err="1"/>
+              <a:t>conflits</a:t>
+            </a:r>
+            <a:r>
+              <a:rPr lang="en-US" dirty="0"/>
+              <a:t> de code</a:t>
+            </a:r>
+          </a:p>
+        </p:txBody>
+      </p:sp>
+      <p:sp>
+        <p:nvSpPr>
+          <p:cNvPr id="3" name="Content Placeholder 2"/>
+          <p:cNvSpPr>
+            <a:spLocks noGrp="1"/>
+          </p:cNvSpPr>
+          <p:nvPr>
+            <p:ph idx="1"/>
+          </p:nvPr>
+        </p:nvSpPr>
+        <p:spPr>
+          <a:xfrm>
+            <a:off x="1484310" y="1423825"/>
+            <a:ext cx="10018713" cy="3124201"/>
+          </a:xfrm>
+        </p:spPr>
+        <p:txBody>
+          <a:bodyPr/>
+          <a:lstStyle/>
+          <a:p>
+            <a:r>
+              <a:rPr lang="en-US" dirty="0"/>
+              <a:t>On </a:t>
+            </a:r>
+            <a:r>
+              <a:rPr lang="en-US" dirty="0" err="1"/>
+              <a:t>comprend</a:t>
+            </a:r>
+            <a:r>
+              <a:rPr lang="en-US" dirty="0"/>
+              <a:t> que </a:t>
+            </a:r>
+            <a:r>
+              <a:rPr lang="en-US" dirty="0" err="1"/>
+              <a:t>quelqu’un</a:t>
+            </a:r>
+            <a:r>
+              <a:rPr lang="en-US" dirty="0"/>
+              <a:t> </a:t>
+            </a:r>
+            <a:r>
+              <a:rPr lang="en-US" dirty="0" err="1"/>
+              <a:t>avait</a:t>
+            </a:r>
+            <a:r>
+              <a:rPr lang="en-US" dirty="0"/>
+              <a:t> déjà fait un “</a:t>
+            </a:r>
+            <a:r>
+              <a:rPr lang="en-US" dirty="0" err="1"/>
+              <a:t>machineacafe.js</a:t>
+            </a:r>
+            <a:r>
+              <a:rPr lang="en-US" dirty="0"/>
+              <a:t>”</a:t>
+            </a:r>
+          </a:p>
+          <a:p>
+            <a:r>
+              <a:rPr lang="en-US" dirty="0" err="1"/>
+              <a:t>Certaines</a:t>
+            </a:r>
+            <a:r>
+              <a:rPr lang="en-US" dirty="0"/>
+              <a:t> </a:t>
+            </a:r>
+            <a:r>
+              <a:rPr lang="en-US" dirty="0" err="1"/>
+              <a:t>lignes</a:t>
+            </a:r>
+            <a:r>
+              <a:rPr lang="en-US" dirty="0"/>
+              <a:t> de code </a:t>
+            </a:r>
+            <a:r>
+              <a:rPr lang="en-US" dirty="0" err="1"/>
+              <a:t>sont</a:t>
+            </a:r>
+            <a:r>
+              <a:rPr lang="en-US" dirty="0"/>
+              <a:t> </a:t>
+            </a:r>
+            <a:r>
+              <a:rPr lang="en-US" dirty="0" err="1"/>
+              <a:t>en</a:t>
+            </a:r>
+            <a:r>
+              <a:rPr lang="en-US" dirty="0"/>
+              <a:t> </a:t>
+            </a:r>
+            <a:r>
+              <a:rPr lang="en-US" dirty="0" err="1"/>
+              <a:t>conflits</a:t>
+            </a:r>
+            <a:endParaRPr lang="en-US" dirty="0"/>
+          </a:p>
+          <a:p>
+            <a:r>
+              <a:rPr lang="en-US" dirty="0" err="1"/>
+              <a:t>Git</a:t>
+            </a:r>
+            <a:r>
+              <a:rPr lang="en-US" dirty="0"/>
+              <a:t> par </a:t>
+            </a:r>
+            <a:r>
+              <a:rPr lang="en-US" dirty="0" err="1"/>
+              <a:t>contre</a:t>
+            </a:r>
+            <a:r>
+              <a:rPr lang="en-US" dirty="0"/>
+              <a:t>, </a:t>
+            </a:r>
+            <a:r>
+              <a:rPr lang="en-US" dirty="0" err="1"/>
+              <a:t>en</a:t>
+            </a:r>
+            <a:r>
+              <a:rPr lang="en-US" dirty="0"/>
+              <a:t> fait la </a:t>
+            </a:r>
+            <a:r>
+              <a:rPr lang="en-US" dirty="0" err="1"/>
+              <a:t>gestion</a:t>
+            </a:r>
+            <a:endParaRPr lang="en-US" dirty="0"/>
+          </a:p>
+        </p:txBody>
+      </p:sp>
+      <p:pic>
+        <p:nvPicPr>
+          <p:cNvPr id="4" name="Picture 3"/>
+          <p:cNvPicPr>
+            <a:picLocks noChangeAspect="1"/>
+          </p:cNvPicPr>
+          <p:nvPr/>
+        </p:nvPicPr>
+        <p:blipFill>
+          <a:blip r:embed="rId2">
+            <a:extLst>
+              <a:ext uri="{28A0092B-C50C-407E-A947-70E740481C1C}">
+                <a14:useLocalDpi xmlns:a14="http://schemas.microsoft.com/office/drawing/2010/main" val="0"/>
+              </a:ext>
+            </a:extLst>
+          </a:blip>
+          <a:stretch>
+            <a:fillRect/>
+          </a:stretch>
+        </p:blipFill>
+        <p:spPr>
+          <a:xfrm>
+            <a:off x="2686229" y="3752044"/>
+            <a:ext cx="7635793" cy="2797037"/>
+          </a:xfrm>
+          <a:prstGeom prst="rect">
+            <a:avLst/>
+          </a:prstGeom>
+          <a:ln>
+            <a:noFill/>
+          </a:ln>
+          <a:effectLst>
+            <a:outerShdw blurRad="292100" dist="139700" dir="2700000" algn="tl" rotWithShape="0">
+              <a:srgbClr val="333333">
+                <a:alpha val="65000"/>
+              </a:srgbClr>
+            </a:outerShdw>
+          </a:effectLst>
+        </p:spPr>
+      </p:pic>
+    </p:spTree>
+    <p:extLst>
+      <p:ext uri="{BB962C8B-B14F-4D97-AF65-F5344CB8AC3E}">
+        <p14:creationId xmlns:p14="http://schemas.microsoft.com/office/powerpoint/2010/main" val="180163672"/>
+      </p:ext>
+    </p:extLst>
+  </p:cSld>
+  <p:clrMapOvr>
+    <a:masterClrMapping/>
+  </p:clrMapOvr>
+</p:sld>
+</file>
+
+<file path=ppt/slides/slide15.xml><?xml version="1.0" encoding="utf-8"?>
+<p:sld xmlns:a="http://schemas.openxmlformats.org/drawingml/2006/main" xmlns:r="http://schemas.openxmlformats.org/officeDocument/2006/relationships" xmlns:p="http://schemas.openxmlformats.org/presentationml/2006/main">
+  <p:cSld>
+    <p:spTree>
+      <p:nvGrpSpPr>
+        <p:cNvPr id="1" name=""/>
+        <p:cNvGrpSpPr/>
+        <p:nvPr/>
+      </p:nvGrpSpPr>
+      <p:grpSpPr>
+        <a:xfrm>
+          <a:off x="0" y="0"/>
+          <a:ext cx="0" cy="0"/>
+          <a:chOff x="0" y="0"/>
+          <a:chExt cx="0" cy="0"/>
+        </a:xfrm>
+      </p:grpSpPr>
+      <p:sp>
+        <p:nvSpPr>
+          <p:cNvPr id="2" name="Title 1"/>
+          <p:cNvSpPr>
+            <a:spLocks noGrp="1"/>
+          </p:cNvSpPr>
+          <p:nvPr>
+            <p:ph type="title"/>
+          </p:nvPr>
+        </p:nvSpPr>
+        <p:spPr/>
+        <p:txBody>
+          <a:bodyPr/>
+          <a:lstStyle/>
+          <a:p>
+            <a:r>
+              <a:rPr lang="en-US" dirty="0" err="1"/>
+              <a:t>Envoyer</a:t>
+            </a:r>
+            <a:r>
+              <a:rPr lang="en-US" dirty="0"/>
+              <a:t> la bonne version</a:t>
+            </a:r>
+          </a:p>
+        </p:txBody>
+      </p:sp>
+      <p:pic>
+        <p:nvPicPr>
+          <p:cNvPr id="4" name="Picture 3"/>
+          <p:cNvPicPr>
+            <a:picLocks noChangeAspect="1"/>
+          </p:cNvPicPr>
+          <p:nvPr/>
+        </p:nvPicPr>
+        <p:blipFill>
+          <a:blip r:embed="rId2">
+            <a:extLst>
+              <a:ext uri="{28A0092B-C50C-407E-A947-70E740481C1C}">
+                <a14:useLocalDpi xmlns:a14="http://schemas.microsoft.com/office/drawing/2010/main" val="0"/>
+              </a:ext>
+            </a:extLst>
+          </a:blip>
+          <a:stretch>
+            <a:fillRect/>
+          </a:stretch>
+        </p:blipFill>
+        <p:spPr>
+          <a:xfrm>
+            <a:off x="2332338" y="2438399"/>
+            <a:ext cx="8759108" cy="3511035"/>
+          </a:xfrm>
+          <a:prstGeom prst="rect">
+            <a:avLst/>
+          </a:prstGeom>
+          <a:ln>
+            <a:noFill/>
+          </a:ln>
+          <a:effectLst>
+            <a:outerShdw blurRad="292100" dist="139700" dir="2700000" algn="tl" rotWithShape="0">
+              <a:srgbClr val="333333">
+                <a:alpha val="65000"/>
+              </a:srgbClr>
+            </a:outerShdw>
+          </a:effectLst>
+        </p:spPr>
+      </p:pic>
+    </p:spTree>
+    <p:extLst>
+      <p:ext uri="{BB962C8B-B14F-4D97-AF65-F5344CB8AC3E}">
+        <p14:creationId xmlns:p14="http://schemas.microsoft.com/office/powerpoint/2010/main" val="1953495484"/>
+      </p:ext>
+    </p:extLst>
+  </p:cSld>
+  <p:clrMapOvr>
+    <a:masterClrMapping/>
+  </p:clrMapOvr>
+</p:sld>
+</file>
+
+<file path=ppt/slides/slide16.xml><?xml version="1.0" encoding="utf-8"?>
+<p:sld xmlns:a="http://schemas.openxmlformats.org/drawingml/2006/main" xmlns:r="http://schemas.openxmlformats.org/officeDocument/2006/relationships" xmlns:p="http://schemas.openxmlformats.org/presentationml/2006/main">
+  <p:cSld>
+    <p:spTree>
+      <p:nvGrpSpPr>
+        <p:cNvPr id="1" name=""/>
+        <p:cNvGrpSpPr/>
+        <p:nvPr/>
+      </p:nvGrpSpPr>
+      <p:grpSpPr>
+        <a:xfrm>
+          <a:off x="0" y="0"/>
+          <a:ext cx="0" cy="0"/>
+          <a:chOff x="0" y="0"/>
+          <a:chExt cx="0" cy="0"/>
+        </a:xfrm>
+      </p:grpSpPr>
+      <p:sp>
+        <p:nvSpPr>
+          <p:cNvPr id="2" name="Title 1"/>
+          <p:cNvSpPr>
+            <a:spLocks noGrp="1"/>
+          </p:cNvSpPr>
+          <p:nvPr>
+            <p:ph type="title"/>
+          </p:nvPr>
+        </p:nvSpPr>
+        <p:spPr/>
+        <p:txBody>
+          <a:bodyPr/>
+          <a:lstStyle/>
+          <a:p>
+            <a:r>
+              <a:rPr lang="en-US" dirty="0" err="1"/>
+              <a:t>C’est</a:t>
+            </a:r>
+            <a:r>
+              <a:rPr lang="en-US" dirty="0"/>
+              <a:t> tout !</a:t>
+            </a:r>
+          </a:p>
+        </p:txBody>
+      </p:sp>
+      <p:pic>
+        <p:nvPicPr>
+          <p:cNvPr id="4" name="Picture 3"/>
+          <p:cNvPicPr>
+            <a:picLocks noChangeAspect="1"/>
+          </p:cNvPicPr>
+          <p:nvPr/>
+        </p:nvPicPr>
+        <p:blipFill>
+          <a:blip r:embed="rId2">
+            <a:extLst>
+              <a:ext uri="{28A0092B-C50C-407E-A947-70E740481C1C}">
+                <a14:useLocalDpi xmlns:a14="http://schemas.microsoft.com/office/drawing/2010/main" val="0"/>
+              </a:ext>
+            </a:extLst>
+          </a:blip>
+          <a:stretch>
+            <a:fillRect/>
+          </a:stretch>
+        </p:blipFill>
+        <p:spPr>
+          <a:xfrm>
+            <a:off x="4481787" y="2178907"/>
+            <a:ext cx="4023760" cy="4023760"/>
+          </a:xfrm>
+          <a:prstGeom prst="rect">
+            <a:avLst/>
+          </a:prstGeom>
+          <a:ln>
+            <a:noFill/>
+          </a:ln>
+          <a:effectLst>
+            <a:outerShdw blurRad="292100" dist="139700" dir="2700000" algn="tl" rotWithShape="0">
+              <a:srgbClr val="333333">
+                <a:alpha val="65000"/>
+              </a:srgbClr>
+            </a:outerShdw>
+          </a:effectLst>
+        </p:spPr>
+      </p:pic>
+    </p:spTree>
+    <p:extLst>
+      <p:ext uri="{BB962C8B-B14F-4D97-AF65-F5344CB8AC3E}">
+        <p14:creationId xmlns:p14="http://schemas.microsoft.com/office/powerpoint/2010/main" val="2051483936"/>
+      </p:ext>
+    </p:extLst>
+  </p:cSld>
+  <p:clrMapOvr>
+    <a:masterClrMapping/>
+  </p:clrMapOvr>
+</p:sld>
+</file>
+
+<file path=ppt/slides/slide2.xml><?xml version="1.0" encoding="utf-8"?>
+<p:sld xmlns:a="http://schemas.openxmlformats.org/drawingml/2006/main" xmlns:r="http://schemas.openxmlformats.org/officeDocument/2006/relationships" xmlns:p="http://schemas.openxmlformats.org/presentationml/2006/main">
+  <p:cSld>
+    <p:bg>
+      <p:bgPr>
+        <a:blipFill rotWithShape="1">
+          <a:blip r:embed="rId2">
+            <a:duotone>
+              <a:schemeClr val="bg2">
+                <a:shade val="76000"/>
+                <a:satMod val="180000"/>
+              </a:schemeClr>
+              <a:schemeClr val="bg2">
+                <a:tint val="80000"/>
+                <a:satMod val="120000"/>
+                <a:lumMod val="180000"/>
+              </a:schemeClr>
+            </a:duotone>
+          </a:blip>
+          <a:stretch/>
+        </a:blipFill>
+        <a:effectLst/>
+      </p:bgPr>
+    </p:bg>
+    <p:spTree>
+      <p:nvGrpSpPr>
+        <p:cNvPr id="1" name=""/>
+        <p:cNvGrpSpPr/>
+        <p:nvPr/>
+      </p:nvGrpSpPr>
+      <p:grpSpPr>
+        <a:xfrm>
+          <a:off x="0" y="0"/>
+          <a:ext cx="0" cy="0"/>
+          <a:chOff x="0" y="0"/>
+          <a:chExt cx="0" cy="0"/>
+        </a:xfrm>
+      </p:grpSpPr>
+      <p:pic>
+        <p:nvPicPr>
+          <p:cNvPr id="4" name="Picture 3"/>
+          <p:cNvPicPr>
+            <a:picLocks noChangeAspect="1"/>
+          </p:cNvPicPr>
+          <p:nvPr/>
+        </p:nvPicPr>
+        <p:blipFill rotWithShape="1">
+          <a:blip r:embed="rId3">
+            <a:duotone>
+              <a:schemeClr val="bg2">
+                <a:shade val="45000"/>
+                <a:satMod val="135000"/>
+              </a:schemeClr>
+              <a:prstClr val="white"/>
+            </a:duotone>
+            <a:alphaModFix amt="21000"/>
+            <a:extLst>
+              <a:ext uri="{28A0092B-C50C-407E-A947-70E740481C1C}">
+                <a14:useLocalDpi xmlns:a14="http://schemas.microsoft.com/office/drawing/2010/main" val="0"/>
+              </a:ext>
+            </a:extLst>
+          </a:blip>
+          <a:srcRect l="942" r="24819" b="-2"/>
+          <a:stretch/>
+        </p:blipFill>
+        <p:spPr>
+          <a:xfrm>
+            <a:off x="5322034" y="10"/>
+            <a:ext cx="12191980" cy="6857990"/>
+          </a:xfrm>
+          <a:prstGeom prst="rect">
+            <a:avLst/>
+          </a:prstGeom>
+        </p:spPr>
+      </p:pic>
+      <p:grpSp>
+        <p:nvGrpSpPr>
+          <p:cNvPr id="9" name="Group 8">
+            <a:extLst>
+              <a:ext uri="{FF2B5EF4-FFF2-40B4-BE49-F238E27FC236}">
+                <a16:creationId xmlns:a16="http://schemas.microsoft.com/office/drawing/2014/main" id="{2DAE90E3-8F91-4218-8153-F632799FB076}"/>
+              </a:ext>
+            </a:extLst>
+          </p:cNvPr>
+          <p:cNvGrpSpPr>
+            <a:grpSpLocks noGrp="1" noUngrp="1" noRot="1" noChangeAspect="1" noMove="1" noResize="1"/>
+          </p:cNvGrpSpPr>
+          <p:nvPr>
+            <p:extLst>
+              <p:ext uri="{386F3935-93C4-4BCD-93E2-E3B085C9AB24}">
+                <p16:designElem xmlns:p16="http://schemas.microsoft.com/office/powerpoint/2015/main" val="1"/>
+              </p:ext>
+            </p:extLst>
+          </p:nvPr>
+        </p:nvGrpSpPr>
+        <p:grpSpPr>
+          <a:xfrm>
+            <a:off x="150812" y="0"/>
+            <a:ext cx="2436813" cy="6858001"/>
+            <a:chOff x="1320800" y="0"/>
+            <a:chExt cx="2436813" cy="6858001"/>
+          </a:xfrm>
+        </p:grpSpPr>
+        <p:sp>
+          <p:nvSpPr>
+            <p:cNvPr id="10" name="Freeform 6">
+              <a:extLst>
+                <a:ext uri="{FF2B5EF4-FFF2-40B4-BE49-F238E27FC236}">
+                  <a16:creationId xmlns:a16="http://schemas.microsoft.com/office/drawing/2014/main" id="{C1DC6993-96FE-4235-985E-52489B4237A3}"/>
+                </a:ext>
+              </a:extLst>
+            </p:cNvPr>
+            <p:cNvSpPr/>
+            <p:nvPr>
+              <p:extLst>
+                <p:ext uri="{386F3935-93C4-4BCD-93E2-E3B085C9AB24}">
+                  <p16:designElem xmlns:p16="http://schemas.microsoft.com/office/powerpoint/2015/main" val="1"/>
+                </p:ext>
+              </p:extLst>
+            </p:nvPr>
+          </p:nvSpPr>
+          <p:spPr bwMode="auto">
+            <a:xfrm>
+              <a:off x="1627188" y="0"/>
+              <a:ext cx="1122363" cy="5329238"/>
+            </a:xfrm>
+            <a:custGeom>
+              <a:avLst/>
+              <a:gdLst/>
+              <a:ahLst/>
+              <a:cxnLst/>
+              <a:rect l="0" t="0" r="r" b="b"/>
+              <a:pathLst>
+                <a:path w="707" h="3357">
+                  <a:moveTo>
+                    <a:pt x="0" y="3330"/>
+                  </a:moveTo>
+                  <a:lnTo>
+                    <a:pt x="156" y="3357"/>
+                  </a:lnTo>
+                  <a:lnTo>
+                    <a:pt x="707" y="0"/>
+                  </a:lnTo>
+                  <a:lnTo>
+                    <a:pt x="547" y="0"/>
+                  </a:lnTo>
+                  <a:lnTo>
+                    <a:pt x="0" y="3330"/>
+                  </a:lnTo>
+                  <a:close/>
+                </a:path>
+              </a:pathLst>
+            </a:custGeom>
+            <a:solidFill>
+              <a:schemeClr val="accent1"/>
+            </a:solidFill>
+            <a:ln>
+              <a:noFill/>
+            </a:ln>
+          </p:spPr>
+        </p:sp>
+        <p:sp>
+          <p:nvSpPr>
+            <p:cNvPr id="11" name="Freeform 7">
+              <a:extLst>
+                <a:ext uri="{FF2B5EF4-FFF2-40B4-BE49-F238E27FC236}">
+                  <a16:creationId xmlns:a16="http://schemas.microsoft.com/office/drawing/2014/main" id="{76D3DE8D-3DEC-4FF8-B4FC-1DAB2036441A}"/>
+                </a:ext>
+              </a:extLst>
+            </p:cNvPr>
+            <p:cNvSpPr/>
+            <p:nvPr>
+              <p:extLst>
+                <p:ext uri="{386F3935-93C4-4BCD-93E2-E3B085C9AB24}">
+                  <p16:designElem xmlns:p16="http://schemas.microsoft.com/office/powerpoint/2015/main" val="1"/>
+                </p:ext>
+              </p:extLst>
+            </p:nvPr>
+          </p:nvSpPr>
+          <p:spPr bwMode="auto">
+            <a:xfrm>
+              <a:off x="1320800" y="0"/>
+              <a:ext cx="1117600" cy="5276850"/>
+            </a:xfrm>
+            <a:custGeom>
+              <a:avLst/>
+              <a:gdLst/>
+              <a:ahLst/>
+              <a:cxnLst/>
+              <a:rect l="0" t="0" r="r" b="b"/>
+              <a:pathLst>
+                <a:path w="704" h="3324">
+                  <a:moveTo>
+                    <a:pt x="704" y="0"/>
+                  </a:moveTo>
+                  <a:lnTo>
+                    <a:pt x="545" y="0"/>
+                  </a:lnTo>
+                  <a:lnTo>
+                    <a:pt x="0" y="3300"/>
+                  </a:lnTo>
+                  <a:lnTo>
+                    <a:pt x="157" y="3324"/>
+                  </a:lnTo>
+                  <a:lnTo>
+                    <a:pt x="704" y="0"/>
+                  </a:lnTo>
+                  <a:close/>
+                </a:path>
+              </a:pathLst>
+            </a:custGeom>
+            <a:solidFill>
+              <a:schemeClr val="tx1">
+                <a:lumMod val="65000"/>
+                <a:lumOff val="35000"/>
+              </a:schemeClr>
+            </a:solidFill>
+            <a:ln>
+              <a:noFill/>
+            </a:ln>
+          </p:spPr>
+        </p:sp>
+        <p:sp>
+          <p:nvSpPr>
+            <p:cNvPr id="12" name="Freeform 8">
+              <a:extLst>
+                <a:ext uri="{FF2B5EF4-FFF2-40B4-BE49-F238E27FC236}">
+                  <a16:creationId xmlns:a16="http://schemas.microsoft.com/office/drawing/2014/main" id="{679297AF-1418-41DB-A81A-D77E0CAF4956}"/>
+                </a:ext>
+              </a:extLst>
+            </p:cNvPr>
+            <p:cNvSpPr/>
+            <p:nvPr>
+              <p:extLst>
+                <p:ext uri="{386F3935-93C4-4BCD-93E2-E3B085C9AB24}">
+                  <p16:designElem xmlns:p16="http://schemas.microsoft.com/office/powerpoint/2015/main" val="1"/>
+                </p:ext>
+              </p:extLst>
+            </p:nvPr>
+          </p:nvSpPr>
+          <p:spPr bwMode="auto">
+            <a:xfrm>
+              <a:off x="1320800" y="5238750"/>
+              <a:ext cx="1228725" cy="1619250"/>
+            </a:xfrm>
+            <a:custGeom>
+              <a:avLst/>
+              <a:gdLst/>
+              <a:ahLst/>
+              <a:cxnLst/>
+              <a:rect l="0" t="0" r="r" b="b"/>
+              <a:pathLst>
+                <a:path w="774" h="1020">
+                  <a:moveTo>
+                    <a:pt x="0" y="0"/>
+                  </a:moveTo>
+                  <a:lnTo>
+                    <a:pt x="740" y="1020"/>
+                  </a:lnTo>
+                  <a:lnTo>
+                    <a:pt x="774" y="1020"/>
+                  </a:lnTo>
+                  <a:lnTo>
+                    <a:pt x="0" y="0"/>
+                  </a:lnTo>
+                  <a:close/>
+                </a:path>
+              </a:pathLst>
+            </a:custGeom>
+            <a:solidFill>
+              <a:schemeClr val="tx1">
+                <a:lumMod val="85000"/>
+                <a:lumOff val="15000"/>
+              </a:schemeClr>
+            </a:solidFill>
+            <a:ln>
+              <a:noFill/>
+            </a:ln>
+          </p:spPr>
+        </p:sp>
+        <p:sp>
+          <p:nvSpPr>
+            <p:cNvPr id="13" name="Freeform 9">
+              <a:extLst>
+                <a:ext uri="{FF2B5EF4-FFF2-40B4-BE49-F238E27FC236}">
+                  <a16:creationId xmlns:a16="http://schemas.microsoft.com/office/drawing/2014/main" id="{F6AD388B-2E71-431B-90AB-B2F71F9F9DDC}"/>
+                </a:ext>
+              </a:extLst>
+            </p:cNvPr>
+            <p:cNvSpPr/>
+            <p:nvPr>
+              <p:extLst>
+                <p:ext uri="{386F3935-93C4-4BCD-93E2-E3B085C9AB24}">
+                  <p16:designElem xmlns:p16="http://schemas.microsoft.com/office/powerpoint/2015/main" val="1"/>
+                </p:ext>
+              </p:extLst>
+            </p:nvPr>
+          </p:nvSpPr>
+          <p:spPr bwMode="auto">
+            <a:xfrm>
+              <a:off x="1627188" y="5291138"/>
+              <a:ext cx="1495425" cy="1566863"/>
+            </a:xfrm>
+            <a:custGeom>
+              <a:avLst/>
+              <a:gdLst/>
+              <a:ahLst/>
+              <a:cxnLst/>
+              <a:rect l="0" t="0" r="r" b="b"/>
+              <a:pathLst>
+                <a:path w="942" h="987">
+                  <a:moveTo>
+                    <a:pt x="0" y="0"/>
+                  </a:moveTo>
+                  <a:lnTo>
+                    <a:pt x="909" y="987"/>
+                  </a:lnTo>
+                  <a:lnTo>
+                    <a:pt x="942" y="987"/>
+                  </a:lnTo>
+                  <a:lnTo>
+                    <a:pt x="0" y="0"/>
+                  </a:lnTo>
+                  <a:close/>
+                </a:path>
+              </a:pathLst>
+            </a:custGeom>
+            <a:solidFill>
+              <a:schemeClr val="accent1">
+                <a:lumMod val="50000"/>
+              </a:schemeClr>
+            </a:solidFill>
+            <a:ln>
+              <a:noFill/>
+            </a:ln>
+          </p:spPr>
+        </p:sp>
+        <p:sp>
+          <p:nvSpPr>
+            <p:cNvPr id="14" name="Freeform 10">
+              <a:extLst>
+                <a:ext uri="{FF2B5EF4-FFF2-40B4-BE49-F238E27FC236}">
+                  <a16:creationId xmlns:a16="http://schemas.microsoft.com/office/drawing/2014/main" id="{FA9972D4-1E8B-4A06-BD7C-B5140A3895FC}"/>
+                </a:ext>
+              </a:extLst>
+            </p:cNvPr>
+            <p:cNvSpPr/>
+            <p:nvPr>
+              <p:extLst>
+                <p:ext uri="{386F3935-93C4-4BCD-93E2-E3B085C9AB24}">
+                  <p16:designElem xmlns:p16="http://schemas.microsoft.com/office/powerpoint/2015/main" val="1"/>
+                </p:ext>
+              </p:extLst>
+            </p:nvPr>
+          </p:nvSpPr>
+          <p:spPr bwMode="auto">
+            <a:xfrm>
+              <a:off x="1627188" y="5286375"/>
+              <a:ext cx="2130425" cy="1571625"/>
+            </a:xfrm>
+            <a:custGeom>
+              <a:avLst/>
+              <a:gdLst/>
+              <a:ahLst/>
+              <a:cxnLst/>
+              <a:rect l="0" t="0" r="r" b="b"/>
+              <a:pathLst>
+                <a:path w="1342" h="990">
+                  <a:moveTo>
+                    <a:pt x="0" y="3"/>
+                  </a:moveTo>
+                  <a:lnTo>
+                    <a:pt x="942" y="990"/>
+                  </a:lnTo>
+                  <a:lnTo>
+                    <a:pt x="1342" y="990"/>
+                  </a:lnTo>
+                  <a:lnTo>
+                    <a:pt x="156" y="27"/>
+                  </a:lnTo>
+                  <a:lnTo>
+                    <a:pt x="0" y="0"/>
+                  </a:lnTo>
+                  <a:lnTo>
+                    <a:pt x="0" y="3"/>
+                  </a:lnTo>
+                  <a:close/>
+                </a:path>
+              </a:pathLst>
+            </a:custGeom>
+            <a:solidFill>
+              <a:schemeClr val="accent1">
+                <a:lumMod val="75000"/>
+              </a:schemeClr>
+            </a:solidFill>
+            <a:ln>
+              <a:noFill/>
+            </a:ln>
+          </p:spPr>
+        </p:sp>
+        <p:sp>
+          <p:nvSpPr>
+            <p:cNvPr id="15" name="Freeform 11">
+              <a:extLst>
+                <a:ext uri="{FF2B5EF4-FFF2-40B4-BE49-F238E27FC236}">
+                  <a16:creationId xmlns:a16="http://schemas.microsoft.com/office/drawing/2014/main" id="{528281FC-5068-4A18-832D-B47A0F1AC6E6}"/>
+                </a:ext>
+              </a:extLst>
+            </p:cNvPr>
+            <p:cNvSpPr/>
+            <p:nvPr>
+              <p:extLst>
+                <p:ext uri="{386F3935-93C4-4BCD-93E2-E3B085C9AB24}">
+                  <p16:designElem xmlns:p16="http://schemas.microsoft.com/office/powerpoint/2015/main" val="1"/>
+                </p:ext>
+              </p:extLst>
+            </p:nvPr>
+          </p:nvSpPr>
+          <p:spPr bwMode="auto">
+            <a:xfrm>
+              <a:off x="1320800" y="5238750"/>
+              <a:ext cx="1695450" cy="1619250"/>
+            </a:xfrm>
+            <a:custGeom>
+              <a:avLst/>
+              <a:gdLst/>
+              <a:ahLst/>
+              <a:cxnLst/>
+              <a:rect l="0" t="0" r="r" b="b"/>
+              <a:pathLst>
+                <a:path w="1068" h="1020">
+                  <a:moveTo>
+                    <a:pt x="1068" y="1020"/>
+                  </a:moveTo>
+                  <a:lnTo>
+                    <a:pt x="184" y="60"/>
+                  </a:lnTo>
+                  <a:lnTo>
+                    <a:pt x="154" y="27"/>
+                  </a:lnTo>
+                  <a:lnTo>
+                    <a:pt x="157" y="27"/>
+                  </a:lnTo>
+                  <a:lnTo>
+                    <a:pt x="157" y="24"/>
+                  </a:lnTo>
+                  <a:lnTo>
+                    <a:pt x="154" y="24"/>
+                  </a:lnTo>
+                  <a:lnTo>
+                    <a:pt x="0" y="0"/>
+                  </a:lnTo>
+                  <a:lnTo>
+                    <a:pt x="0" y="0"/>
+                  </a:lnTo>
+                  <a:lnTo>
+                    <a:pt x="774" y="1020"/>
+                  </a:lnTo>
+                  <a:lnTo>
+                    <a:pt x="1068" y="1020"/>
+                  </a:lnTo>
+                  <a:close/>
+                </a:path>
+              </a:pathLst>
+            </a:custGeom>
+            <a:solidFill>
+              <a:schemeClr val="tx1">
+                <a:lumMod val="75000"/>
+                <a:lumOff val="25000"/>
+              </a:schemeClr>
+            </a:solidFill>
+            <a:ln>
+              <a:noFill/>
+            </a:ln>
+          </p:spPr>
+        </p:sp>
+      </p:grpSp>
+      <p:sp>
+        <p:nvSpPr>
+          <p:cNvPr id="2" name="Title 1"/>
+          <p:cNvSpPr>
+            <a:spLocks noGrp="1"/>
+          </p:cNvSpPr>
+          <p:nvPr>
+            <p:ph type="title"/>
+          </p:nvPr>
+        </p:nvSpPr>
+        <p:spPr>
+          <a:xfrm>
+            <a:off x="1484311" y="685800"/>
+            <a:ext cx="10018713" cy="1185333"/>
+          </a:xfrm>
+        </p:spPr>
+        <p:txBody>
+          <a:bodyPr>
+            <a:normAutofit/>
+          </a:bodyPr>
+          <a:lstStyle/>
+          <a:p>
+            <a:r>
+              <a:rPr lang="en-US" dirty="0" err="1"/>
+              <a:t>Partie</a:t>
+            </a:r>
+            <a:r>
+              <a:rPr lang="en-US" dirty="0"/>
+              <a:t> 1 - </a:t>
+            </a:r>
+            <a:r>
+              <a:rPr lang="en-US" dirty="0" err="1"/>
+              <a:t>Git</a:t>
+            </a:r>
+            <a:endParaRPr lang="en-US" dirty="0"/>
+          </a:p>
+        </p:txBody>
+      </p:sp>
+      <p:sp>
+        <p:nvSpPr>
+          <p:cNvPr id="3" name="Content Placeholder 2"/>
+          <p:cNvSpPr>
+            <a:spLocks noGrp="1"/>
+          </p:cNvSpPr>
+          <p:nvPr>
+            <p:ph idx="1"/>
+          </p:nvPr>
+        </p:nvSpPr>
+        <p:spPr>
+          <a:xfrm>
+            <a:off x="1484310" y="1998133"/>
+            <a:ext cx="10018713" cy="3793067"/>
+          </a:xfrm>
+        </p:spPr>
+        <p:txBody>
+          <a:bodyPr>
+            <a:normAutofit/>
+          </a:bodyPr>
+          <a:lstStyle/>
+          <a:p>
+            <a:r>
+              <a:rPr lang="fr-CA" dirty="0"/>
+              <a:t>Fondé en 2005 par Linus </a:t>
+            </a:r>
+            <a:r>
+              <a:rPr lang="fr-CA" dirty="0" err="1"/>
+              <a:t>Torvalds</a:t>
+            </a:r>
+            <a:r>
+              <a:rPr lang="fr-CA" dirty="0"/>
+              <a:t> (Fondateur de Linux)</a:t>
+            </a:r>
+          </a:p>
+          <a:p>
+            <a:r>
+              <a:rPr lang="fr-CA" dirty="0"/>
+              <a:t>Version Control System (VCS)</a:t>
+            </a:r>
+          </a:p>
+          <a:p>
+            <a:r>
+              <a:rPr lang="fr-CA" dirty="0"/>
+              <a:t>Les fonctionnalités</a:t>
+            </a:r>
+          </a:p>
+          <a:p>
+            <a:r>
+              <a:rPr lang="fr-CA" dirty="0"/>
+              <a:t>Commencer ou s’ajouter à un projet</a:t>
+            </a:r>
+          </a:p>
+          <a:p>
+            <a:r>
+              <a:rPr lang="fr-CA" dirty="0"/>
+              <a:t>Les commandes de bases</a:t>
+            </a:r>
+          </a:p>
+          <a:p>
+            <a:endParaRPr lang="en-US" dirty="0"/>
+          </a:p>
+          <a:p>
+            <a:endParaRPr lang="en-US" dirty="0"/>
+          </a:p>
+        </p:txBody>
+      </p:sp>
+    </p:spTree>
+    <p:extLst>
+      <p:ext uri="{BB962C8B-B14F-4D97-AF65-F5344CB8AC3E}">
+        <p14:creationId xmlns:p14="http://schemas.microsoft.com/office/powerpoint/2010/main" val="3414453629"/>
+      </p:ext>
+    </p:extLst>
+  </p:cSld>
+  <p:clrMapOvr>
+    <a:masterClrMapping/>
+  </p:clrMapOvr>
+</p:sld>
+</file>
+
+<file path=ppt/slides/slide3.xml><?xml version="1.0" encoding="utf-8"?>
+<p:sld xmlns:a="http://schemas.openxmlformats.org/drawingml/2006/main" xmlns:r="http://schemas.openxmlformats.org/officeDocument/2006/relationships" xmlns:p="http://schemas.openxmlformats.org/presentationml/2006/main">
+  <p:cSld>
+    <p:spTree>
+      <p:nvGrpSpPr>
+        <p:cNvPr id="1" name=""/>
+        <p:cNvGrpSpPr/>
+        <p:nvPr/>
+      </p:nvGrpSpPr>
+      <p:grpSpPr>
+        <a:xfrm>
+          <a:off x="0" y="0"/>
+          <a:ext cx="0" cy="0"/>
+          <a:chOff x="0" y="0"/>
+          <a:chExt cx="0" cy="0"/>
+        </a:xfrm>
+      </p:grpSpPr>
+      <p:sp>
+        <p:nvSpPr>
+          <p:cNvPr id="2" name="Title 1"/>
+          <p:cNvSpPr>
+            <a:spLocks noGrp="1"/>
+          </p:cNvSpPr>
+          <p:nvPr>
+            <p:ph type="title"/>
+          </p:nvPr>
+        </p:nvSpPr>
+        <p:spPr/>
+        <p:txBody>
+          <a:bodyPr/>
+          <a:lstStyle/>
+          <a:p>
+            <a:r>
+              <a:rPr lang="en-US" dirty="0" err="1"/>
+              <a:t>Pourquoi</a:t>
+            </a:r>
+            <a:r>
+              <a:rPr lang="en-US" dirty="0"/>
+              <a:t> </a:t>
+            </a:r>
+            <a:r>
+              <a:rPr lang="en-US" dirty="0" err="1"/>
+              <a:t>utiliser</a:t>
+            </a:r>
+            <a:r>
+              <a:rPr lang="en-US" dirty="0"/>
+              <a:t> </a:t>
+            </a:r>
+            <a:r>
+              <a:rPr lang="en-US" dirty="0" err="1"/>
+              <a:t>Git</a:t>
+            </a:r>
+            <a:r>
+              <a:rPr lang="en-US" dirty="0"/>
+              <a:t> ?</a:t>
+            </a:r>
+          </a:p>
+        </p:txBody>
+      </p:sp>
+      <p:sp>
+        <p:nvSpPr>
+          <p:cNvPr id="3" name="Content Placeholder 2"/>
+          <p:cNvSpPr>
+            <a:spLocks noGrp="1"/>
+          </p:cNvSpPr>
+          <p:nvPr>
+            <p:ph idx="1"/>
+          </p:nvPr>
+        </p:nvSpPr>
+        <p:spPr/>
+        <p:txBody>
+          <a:bodyPr/>
+          <a:lstStyle/>
+          <a:p>
+            <a:r>
+              <a:rPr lang="en-US" b="1" dirty="0"/>
+              <a:t>70%</a:t>
+            </a:r>
+            <a:r>
+              <a:rPr lang="en-US" dirty="0"/>
+              <a:t> des </a:t>
+            </a:r>
+            <a:r>
+              <a:rPr lang="en-US" dirty="0" err="1"/>
+              <a:t>utilisateurs</a:t>
+            </a:r>
+            <a:r>
+              <a:rPr lang="en-US" dirty="0"/>
+              <a:t> de VCS </a:t>
+            </a:r>
+            <a:r>
+              <a:rPr lang="en-US" dirty="0" err="1"/>
+              <a:t>fonctionnent</a:t>
+            </a:r>
+            <a:r>
+              <a:rPr lang="en-US" dirty="0"/>
+              <a:t> avec </a:t>
+            </a:r>
+            <a:r>
+              <a:rPr lang="en-US" dirty="0" err="1"/>
+              <a:t>Git</a:t>
+            </a:r>
+            <a:endParaRPr lang="en-US" dirty="0"/>
+          </a:p>
+          <a:p>
+            <a:r>
+              <a:rPr lang="fr-CA" dirty="0"/>
+              <a:t>Une gestion de versions </a:t>
+            </a:r>
+            <a:r>
+              <a:rPr lang="fr-CA" b="1" dirty="0"/>
+              <a:t>décentralisée</a:t>
+            </a:r>
+            <a:r>
+              <a:rPr lang="fr-CA" dirty="0"/>
+              <a:t>.</a:t>
+            </a:r>
+          </a:p>
+          <a:p>
+            <a:r>
+              <a:rPr lang="fr-CA" dirty="0"/>
+              <a:t>La gestion des branches se fait d’une façon très facile et rapide.</a:t>
+            </a:r>
+            <a:r>
+              <a:rPr lang="en-US" dirty="0"/>
+              <a:t> </a:t>
+            </a:r>
+          </a:p>
+          <a:p>
+            <a:pPr lvl="0"/>
+            <a:r>
+              <a:rPr lang="fr-CA" dirty="0"/>
+              <a:t>Beaucoup de services associés comme </a:t>
+            </a:r>
+            <a:r>
+              <a:rPr lang="fr-CA" dirty="0" err="1"/>
+              <a:t>Github</a:t>
+            </a:r>
+            <a:r>
+              <a:rPr lang="fr-CA" dirty="0"/>
+              <a:t> ou </a:t>
+            </a:r>
+            <a:r>
+              <a:rPr lang="fr-CA" dirty="0" err="1"/>
+              <a:t>BitBucket</a:t>
+            </a:r>
+            <a:r>
+              <a:rPr lang="fr-CA" dirty="0"/>
+              <a:t>.</a:t>
+            </a:r>
+          </a:p>
+          <a:p>
+            <a:pPr lvl="0"/>
+            <a:r>
+              <a:rPr lang="fr-CA" dirty="0"/>
+              <a:t>Et</a:t>
+            </a:r>
+            <a:r>
+              <a:rPr lang="mr-IN" dirty="0"/>
+              <a:t>…</a:t>
+            </a:r>
+            <a:r>
+              <a:rPr lang="fr-CA" dirty="0"/>
+              <a:t> parce que ça va compter dans vos entrevues.</a:t>
+            </a:r>
+            <a:endParaRPr lang="en-US" dirty="0"/>
+          </a:p>
+        </p:txBody>
+      </p:sp>
+    </p:spTree>
+    <p:extLst>
+      <p:ext uri="{BB962C8B-B14F-4D97-AF65-F5344CB8AC3E}">
+        <p14:creationId xmlns:p14="http://schemas.microsoft.com/office/powerpoint/2010/main" val="994882287"/>
+      </p:ext>
+    </p:extLst>
+  </p:cSld>
+  <p:clrMapOvr>
+    <a:masterClrMapping/>
+  </p:clrMapOvr>
+</p:sld>
+</file>
+
+<file path=ppt/slides/slide4.xml><?xml version="1.0" encoding="utf-8"?>
+<p:sld xmlns:a="http://schemas.openxmlformats.org/drawingml/2006/main" xmlns:r="http://schemas.openxmlformats.org/officeDocument/2006/relationships" xmlns:p="http://schemas.openxmlformats.org/presentationml/2006/main">
+  <p:cSld>
+    <p:spTree>
+      <p:nvGrpSpPr>
+        <p:cNvPr id="1" name=""/>
+        <p:cNvGrpSpPr/>
+        <p:nvPr/>
+      </p:nvGrpSpPr>
+      <p:grpSpPr>
+        <a:xfrm>
+          <a:off x="0" y="0"/>
+          <a:ext cx="0" cy="0"/>
+          <a:chOff x="0" y="0"/>
+          <a:chExt cx="0" cy="0"/>
+        </a:xfrm>
+      </p:grpSpPr>
+      <p:sp>
+        <p:nvSpPr>
+          <p:cNvPr id="2" name="Title 1"/>
+          <p:cNvSpPr>
+            <a:spLocks noGrp="1"/>
+          </p:cNvSpPr>
+          <p:nvPr>
+            <p:ph type="title"/>
+          </p:nvPr>
+        </p:nvSpPr>
+        <p:spPr/>
+        <p:txBody>
+          <a:bodyPr/>
+          <a:lstStyle/>
+          <a:p>
+            <a:r>
+              <a:rPr lang="en-US" dirty="0"/>
+              <a:t>VCS (Version Control System)</a:t>
+            </a:r>
+          </a:p>
+        </p:txBody>
+      </p:sp>
+      <p:graphicFrame>
+        <p:nvGraphicFramePr>
+          <p:cNvPr id="4" name="Content Placeholder 3"/>
+          <p:cNvGraphicFramePr>
+            <a:graphicFrameLocks noGrp="1"/>
+          </p:cNvGraphicFramePr>
+          <p:nvPr>
+            <p:ph idx="1"/>
+            <p:extLst>
+              <p:ext uri="{D42A27DB-BD31-4B8C-83A1-F6EECF244321}">
+                <p14:modId xmlns:p14="http://schemas.microsoft.com/office/powerpoint/2010/main" val="1973821030"/>
+              </p:ext>
+            </p:extLst>
+          </p:nvPr>
+        </p:nvGraphicFramePr>
+        <p:xfrm>
+          <a:off x="4189496" y="2212848"/>
+          <a:ext cx="9895523" cy="3733800"/>
+        </p:xfrm>
+        <a:graphic>
+          <a:graphicData uri="http://schemas.openxmlformats.org/drawingml/2006/chart">
+            <c:chart xmlns:c="http://schemas.openxmlformats.org/drawingml/2006/chart" xmlns:r="http://schemas.openxmlformats.org/officeDocument/2006/relationships" r:id="rId2"/>
+          </a:graphicData>
+        </a:graphic>
+      </p:graphicFrame>
+      <p:pic>
+        <p:nvPicPr>
+          <p:cNvPr id="3" name="Picture 2"/>
+          <p:cNvPicPr>
+            <a:picLocks noChangeAspect="1"/>
+          </p:cNvPicPr>
+          <p:nvPr/>
+        </p:nvPicPr>
+        <p:blipFill>
+          <a:blip r:embed="rId3">
+            <a:extLst>
+              <a:ext uri="{28A0092B-C50C-407E-A947-70E740481C1C}">
+                <a14:useLocalDpi xmlns:a14="http://schemas.microsoft.com/office/drawing/2010/main" val="0"/>
+              </a:ext>
+            </a:extLst>
+          </a:blip>
+          <a:stretch>
+            <a:fillRect/>
+          </a:stretch>
+        </p:blipFill>
+        <p:spPr>
+          <a:xfrm>
+            <a:off x="2794409" y="2437337"/>
+            <a:ext cx="2931162" cy="3510373"/>
+          </a:xfrm>
+          <a:prstGeom prst="rect">
+            <a:avLst/>
+          </a:prstGeom>
+        </p:spPr>
+      </p:pic>
+    </p:spTree>
+    <p:extLst>
+      <p:ext uri="{BB962C8B-B14F-4D97-AF65-F5344CB8AC3E}">
+        <p14:creationId xmlns:p14="http://schemas.microsoft.com/office/powerpoint/2010/main" val="421802706"/>
+      </p:ext>
+    </p:extLst>
+  </p:cSld>
+  <p:clrMapOvr>
+    <a:masterClrMapping/>
+  </p:clrMapOvr>
+</p:sld>
+</file>
+
+<file path=ppt/slides/slide5.xml><?xml version="1.0" encoding="utf-8"?>
+<p:sld xmlns:a="http://schemas.openxmlformats.org/drawingml/2006/main" xmlns:r="http://schemas.openxmlformats.org/officeDocument/2006/relationships" xmlns:p="http://schemas.openxmlformats.org/presentationml/2006/main">
+  <p:cSld>
+    <p:spTree>
+      <p:nvGrpSpPr>
+        <p:cNvPr id="1" name=""/>
+        <p:cNvGrpSpPr/>
+        <p:nvPr/>
+      </p:nvGrpSpPr>
+      <p:grpSpPr>
+        <a:xfrm>
+          <a:off x="0" y="0"/>
+          <a:ext cx="0" cy="0"/>
+          <a:chOff x="0" y="0"/>
+          <a:chExt cx="0" cy="0"/>
+        </a:xfrm>
+      </p:grpSpPr>
+      <p:sp>
+        <p:nvSpPr>
+          <p:cNvPr id="2" name="Title 1"/>
+          <p:cNvSpPr>
+            <a:spLocks noGrp="1"/>
+          </p:cNvSpPr>
+          <p:nvPr>
+            <p:ph type="title"/>
+          </p:nvPr>
+        </p:nvSpPr>
+        <p:spPr/>
+        <p:txBody>
+          <a:bodyPr/>
+          <a:lstStyle/>
+          <a:p>
+            <a:r>
+              <a:rPr lang="en-US" dirty="0"/>
+              <a:t>Comment </a:t>
+            </a:r>
+            <a:r>
+              <a:rPr lang="en-US" dirty="0" err="1"/>
+              <a:t>ça</a:t>
+            </a:r>
+            <a:r>
+              <a:rPr lang="en-US" dirty="0"/>
+              <a:t> </a:t>
+            </a:r>
+            <a:r>
+              <a:rPr lang="en-US" dirty="0" err="1"/>
+              <a:t>fonctionne</a:t>
+            </a:r>
+            <a:r>
+              <a:rPr lang="en-US" dirty="0"/>
+              <a:t> ?</a:t>
+            </a:r>
+          </a:p>
+        </p:txBody>
+      </p:sp>
+      <p:pic>
+        <p:nvPicPr>
+          <p:cNvPr id="4" name="Picture 3"/>
+          <p:cNvPicPr/>
+          <p:nvPr/>
+        </p:nvPicPr>
+        <p:blipFill>
+          <a:blip r:embed="rId2">
+            <a:extLst>
+              <a:ext uri="{28A0092B-C50C-407E-A947-70E740481C1C}">
+                <a14:useLocalDpi xmlns:a14="http://schemas.microsoft.com/office/drawing/2010/main" val="0"/>
+              </a:ext>
+            </a:extLst>
+          </a:blip>
+          <a:stretch>
+            <a:fillRect/>
+          </a:stretch>
+        </p:blipFill>
+        <p:spPr>
+          <a:xfrm>
+            <a:off x="1234393" y="2438399"/>
+            <a:ext cx="5435969" cy="2832976"/>
+          </a:xfrm>
+          <a:prstGeom prst="rect">
+            <a:avLst/>
+          </a:prstGeom>
+        </p:spPr>
+      </p:pic>
+      <p:pic>
+        <p:nvPicPr>
+          <p:cNvPr id="5" name="Picture 4"/>
+          <p:cNvPicPr/>
+          <p:nvPr/>
+        </p:nvPicPr>
+        <p:blipFill>
+          <a:blip r:embed="rId3">
+            <a:extLst>
+              <a:ext uri="{28A0092B-C50C-407E-A947-70E740481C1C}">
+                <a14:useLocalDpi xmlns:a14="http://schemas.microsoft.com/office/drawing/2010/main" val="0"/>
+              </a:ext>
+            </a:extLst>
+          </a:blip>
+          <a:stretch>
+            <a:fillRect/>
+          </a:stretch>
+        </p:blipFill>
+        <p:spPr>
+          <a:xfrm>
+            <a:off x="6657066" y="2438399"/>
+            <a:ext cx="5164455" cy="2847340"/>
+          </a:xfrm>
+          <a:prstGeom prst="rect">
+            <a:avLst/>
+          </a:prstGeom>
+        </p:spPr>
+      </p:pic>
+    </p:spTree>
+    <p:extLst>
+      <p:ext uri="{BB962C8B-B14F-4D97-AF65-F5344CB8AC3E}">
+        <p14:creationId xmlns:p14="http://schemas.microsoft.com/office/powerpoint/2010/main" val="1326853798"/>
+      </p:ext>
+    </p:extLst>
+  </p:cSld>
+  <p:clrMapOvr>
+    <a:masterClrMapping/>
+  </p:clrMapOvr>
+</p:sld>
+</file>
+
+<file path=ppt/slides/slide6.xml><?xml version="1.0" encoding="utf-8"?>
+<p:sld xmlns:a="http://schemas.openxmlformats.org/drawingml/2006/main" xmlns:r="http://schemas.openxmlformats.org/officeDocument/2006/relationships" xmlns:p="http://schemas.openxmlformats.org/presentationml/2006/main">
+  <p:cSld>
+    <p:spTree>
+      <p:nvGrpSpPr>
+        <p:cNvPr id="1" name=""/>
+        <p:cNvGrpSpPr/>
+        <p:nvPr/>
+      </p:nvGrpSpPr>
+      <p:grpSpPr>
+        <a:xfrm>
+          <a:off x="0" y="0"/>
+          <a:ext cx="0" cy="0"/>
+          <a:chOff x="0" y="0"/>
+          <a:chExt cx="0" cy="0"/>
+        </a:xfrm>
+      </p:grpSpPr>
+      <p:sp>
+        <p:nvSpPr>
+          <p:cNvPr id="2" name="Title 1"/>
+          <p:cNvSpPr>
+            <a:spLocks noGrp="1"/>
+          </p:cNvSpPr>
+          <p:nvPr>
+            <p:ph type="title"/>
+          </p:nvPr>
+        </p:nvSpPr>
+        <p:spPr/>
+        <p:txBody>
+          <a:bodyPr/>
+          <a:lstStyle/>
+          <a:p>
+            <a:r>
+              <a:rPr lang="en-US" dirty="0"/>
+              <a:t>1. </a:t>
+            </a:r>
+            <a:r>
+              <a:rPr lang="en-US" dirty="0" err="1"/>
+              <a:t>Préparer</a:t>
+            </a:r>
+            <a:r>
+              <a:rPr lang="en-US" dirty="0"/>
+              <a:t> le </a:t>
+            </a:r>
+            <a:r>
+              <a:rPr lang="en-US" dirty="0" err="1"/>
+              <a:t>répertoire</a:t>
+            </a:r>
+            <a:r>
+              <a:rPr lang="en-US" dirty="0"/>
+              <a:t> </a:t>
+            </a:r>
+            <a:r>
+              <a:rPr lang="en-US" dirty="0" err="1"/>
+              <a:t>Git</a:t>
+            </a:r>
+            <a:endParaRPr lang="en-US" dirty="0"/>
+          </a:p>
+        </p:txBody>
+      </p:sp>
+      <p:sp>
+        <p:nvSpPr>
+          <p:cNvPr id="3" name="Content Placeholder 2"/>
+          <p:cNvSpPr>
+            <a:spLocks noGrp="1"/>
+          </p:cNvSpPr>
+          <p:nvPr>
+            <p:ph idx="1"/>
+          </p:nvPr>
+        </p:nvSpPr>
+        <p:spPr>
+          <a:xfrm>
+            <a:off x="2491179" y="1891157"/>
+            <a:ext cx="10018713" cy="3124201"/>
+          </a:xfrm>
+        </p:spPr>
+        <p:txBody>
+          <a:bodyPr/>
+          <a:lstStyle/>
+          <a:p>
+            <a:r>
+              <a:rPr lang="en-US" dirty="0"/>
+              <a:t>Installer </a:t>
+            </a:r>
+            <a:r>
+              <a:rPr lang="en-US" dirty="0" err="1"/>
+              <a:t>Git</a:t>
+            </a:r>
+            <a:br>
+              <a:rPr lang="en-US" dirty="0"/>
+            </a:br>
+            <a:br>
+              <a:rPr lang="en-US" dirty="0"/>
+            </a:br>
+            <a:br>
+              <a:rPr lang="en-US" dirty="0"/>
+            </a:br>
+            <a:endParaRPr lang="en-US" dirty="0"/>
+          </a:p>
+          <a:p>
+            <a:r>
+              <a:rPr lang="en-US" dirty="0"/>
+              <a:t>Cloner le </a:t>
+            </a:r>
+            <a:r>
+              <a:rPr lang="en-US" dirty="0" err="1"/>
+              <a:t>répertoire</a:t>
+            </a:r>
+            <a:r>
+              <a:rPr lang="en-US" dirty="0"/>
+              <a:t> principal </a:t>
+            </a:r>
+          </a:p>
+        </p:txBody>
+      </p:sp>
+      <p:pic>
+        <p:nvPicPr>
+          <p:cNvPr id="5" name="Picture 4"/>
+          <p:cNvPicPr>
+            <a:picLocks noChangeAspect="1"/>
+          </p:cNvPicPr>
+          <p:nvPr/>
+        </p:nvPicPr>
+        <p:blipFill>
+          <a:blip r:embed="rId2">
+            <a:extLst>
+              <a:ext uri="{28A0092B-C50C-407E-A947-70E740481C1C}">
+                <a14:useLocalDpi xmlns:a14="http://schemas.microsoft.com/office/drawing/2010/main" val="0"/>
+              </a:ext>
+            </a:extLst>
+          </a:blip>
+          <a:stretch>
+            <a:fillRect/>
+          </a:stretch>
+        </p:blipFill>
+        <p:spPr>
+          <a:xfrm>
+            <a:off x="2491179" y="2825180"/>
+            <a:ext cx="3162300" cy="673100"/>
+          </a:xfrm>
+          <a:prstGeom prst="rect">
+            <a:avLst/>
+          </a:prstGeom>
+          <a:ln>
+            <a:noFill/>
+          </a:ln>
+          <a:effectLst>
+            <a:outerShdw blurRad="292100" dist="139700" dir="2700000" algn="tl" rotWithShape="0">
+              <a:srgbClr val="333333">
+                <a:alpha val="65000"/>
+              </a:srgbClr>
+            </a:outerShdw>
+          </a:effectLst>
+        </p:spPr>
+      </p:pic>
+      <p:pic>
+        <p:nvPicPr>
+          <p:cNvPr id="7" name="Picture 6"/>
+          <p:cNvPicPr>
+            <a:picLocks noChangeAspect="1"/>
+          </p:cNvPicPr>
+          <p:nvPr/>
+        </p:nvPicPr>
+        <p:blipFill>
+          <a:blip r:embed="rId3">
+            <a:extLst>
+              <a:ext uri="{28A0092B-C50C-407E-A947-70E740481C1C}">
+                <a14:useLocalDpi xmlns:a14="http://schemas.microsoft.com/office/drawing/2010/main" val="0"/>
+              </a:ext>
+            </a:extLst>
+          </a:blip>
+          <a:stretch>
+            <a:fillRect/>
+          </a:stretch>
+        </p:blipFill>
+        <p:spPr>
+          <a:xfrm>
+            <a:off x="2491179" y="4500439"/>
+            <a:ext cx="5537200" cy="901700"/>
+          </a:xfrm>
+          <a:prstGeom prst="rect">
+            <a:avLst/>
+          </a:prstGeom>
+          <a:ln>
+            <a:noFill/>
+          </a:ln>
+          <a:effectLst>
+            <a:outerShdw blurRad="292100" dist="139700" dir="2700000" algn="tl" rotWithShape="0">
+              <a:srgbClr val="333333">
+                <a:alpha val="65000"/>
+              </a:srgbClr>
+            </a:outerShdw>
+          </a:effectLst>
+        </p:spPr>
+      </p:pic>
+    </p:spTree>
+    <p:extLst>
+      <p:ext uri="{BB962C8B-B14F-4D97-AF65-F5344CB8AC3E}">
+        <p14:creationId xmlns:p14="http://schemas.microsoft.com/office/powerpoint/2010/main" val="1283557247"/>
+      </p:ext>
+    </p:extLst>
+  </p:cSld>
+  <p:clrMapOvr>
+    <a:masterClrMapping/>
+  </p:clrMapOvr>
+</p:sld>
+</file>
+
+<file path=ppt/slides/slide7.xml><?xml version="1.0" encoding="utf-8"?>
+<p:sld xmlns:a="http://schemas.openxmlformats.org/drawingml/2006/main" xmlns:r="http://schemas.openxmlformats.org/officeDocument/2006/relationships" xmlns:p="http://schemas.openxmlformats.org/presentationml/2006/main">
+  <p:cSld>
+    <p:spTree>
+      <p:nvGrpSpPr>
+        <p:cNvPr id="1" name=""/>
+        <p:cNvGrpSpPr/>
+        <p:nvPr/>
+      </p:nvGrpSpPr>
+      <p:grpSpPr>
+        <a:xfrm>
+          <a:off x="0" y="0"/>
+          <a:ext cx="0" cy="0"/>
+          <a:chOff x="0" y="0"/>
+          <a:chExt cx="0" cy="0"/>
+        </a:xfrm>
+      </p:grpSpPr>
+      <p:sp>
+        <p:nvSpPr>
+          <p:cNvPr id="2" name="Title 1"/>
+          <p:cNvSpPr>
+            <a:spLocks noGrp="1"/>
+          </p:cNvSpPr>
+          <p:nvPr>
+            <p:ph type="title"/>
+          </p:nvPr>
+        </p:nvSpPr>
+        <p:spPr/>
+        <p:txBody>
+          <a:bodyPr/>
+          <a:lstStyle/>
+          <a:p>
+            <a:r>
+              <a:rPr lang="en-US" dirty="0"/>
+              <a:t>Il se </a:t>
+            </a:r>
+            <a:r>
+              <a:rPr lang="en-US" dirty="0" err="1"/>
+              <a:t>passe</a:t>
+            </a:r>
+            <a:r>
+              <a:rPr lang="en-US" dirty="0"/>
+              <a:t> pas grand chose</a:t>
+            </a:r>
+          </a:p>
+        </p:txBody>
+      </p:sp>
+      <p:pic>
+        <p:nvPicPr>
+          <p:cNvPr id="6" name="Picture 5"/>
+          <p:cNvPicPr>
+            <a:picLocks noChangeAspect="1"/>
+          </p:cNvPicPr>
+          <p:nvPr/>
+        </p:nvPicPr>
+        <p:blipFill>
+          <a:blip r:embed="rId2">
+            <a:extLst>
+              <a:ext uri="{28A0092B-C50C-407E-A947-70E740481C1C}">
+                <a14:useLocalDpi xmlns:a14="http://schemas.microsoft.com/office/drawing/2010/main" val="0"/>
+              </a:ext>
+            </a:extLst>
+          </a:blip>
+          <a:stretch>
+            <a:fillRect/>
+          </a:stretch>
+        </p:blipFill>
+        <p:spPr>
+          <a:xfrm>
+            <a:off x="1587312" y="2475430"/>
+            <a:ext cx="4264664" cy="2952459"/>
+          </a:xfrm>
+          <a:prstGeom prst="rect">
+            <a:avLst/>
+          </a:prstGeom>
+          <a:ln>
+            <a:noFill/>
+          </a:ln>
+          <a:effectLst>
+            <a:outerShdw blurRad="292100" dist="139700" dir="2700000" algn="tl" rotWithShape="0">
+              <a:srgbClr val="333333">
+                <a:alpha val="65000"/>
+              </a:srgbClr>
+            </a:outerShdw>
+          </a:effectLst>
+        </p:spPr>
+      </p:pic>
+      <p:pic>
+        <p:nvPicPr>
+          <p:cNvPr id="7" name="Picture 6"/>
+          <p:cNvPicPr>
+            <a:picLocks noChangeAspect="1"/>
+          </p:cNvPicPr>
+          <p:nvPr/>
+        </p:nvPicPr>
+        <p:blipFill>
+          <a:blip r:embed="rId3">
+            <a:extLst>
+              <a:ext uri="{28A0092B-C50C-407E-A947-70E740481C1C}">
+                <a14:useLocalDpi xmlns:a14="http://schemas.microsoft.com/office/drawing/2010/main" val="0"/>
+              </a:ext>
+            </a:extLst>
+          </a:blip>
+          <a:stretch>
+            <a:fillRect/>
+          </a:stretch>
+        </p:blipFill>
+        <p:spPr>
+          <a:xfrm>
+            <a:off x="5990262" y="2894357"/>
+            <a:ext cx="5867400" cy="642620"/>
+          </a:xfrm>
+          <a:prstGeom prst="rect">
+            <a:avLst/>
+          </a:prstGeom>
+          <a:ln>
+            <a:noFill/>
+          </a:ln>
+          <a:effectLst>
+            <a:outerShdw blurRad="292100" dist="139700" dir="2700000" algn="tl" rotWithShape="0">
+              <a:srgbClr val="333333">
+                <a:alpha val="65000"/>
+              </a:srgbClr>
+            </a:outerShdw>
+          </a:effectLst>
+        </p:spPr>
+      </p:pic>
+      <p:sp>
+        <p:nvSpPr>
+          <p:cNvPr id="8" name="Frame 7"/>
+          <p:cNvSpPr/>
+          <p:nvPr/>
+        </p:nvSpPr>
+        <p:spPr>
+          <a:xfrm>
+            <a:off x="8920365" y="2970715"/>
+            <a:ext cx="870221" cy="439285"/>
+          </a:xfrm>
+          <a:prstGeom prst="frame">
+            <a:avLst/>
+          </a:prstGeom>
+          <a:ln w="12700"/>
+        </p:spPr>
+        <p:style>
+          <a:lnRef idx="2">
+            <a:schemeClr val="accent2">
+              <a:shade val="50000"/>
+            </a:schemeClr>
+          </a:lnRef>
+          <a:fillRef idx="1">
+            <a:schemeClr val="accent2"/>
+          </a:fillRef>
+          <a:effectRef idx="0">
+            <a:schemeClr val="accent2"/>
+          </a:effectRef>
+          <a:fontRef idx="minor">
+            <a:schemeClr val="lt1"/>
+          </a:fontRef>
+        </p:style>
+        <p:txBody>
+          <a:bodyPr rtlCol="0" anchor="ctr"/>
+          <a:lstStyle/>
+          <a:p>
+            <a:pPr algn="ctr"/>
+            <a:endParaRPr lang="en-US">
+              <a:solidFill>
+                <a:schemeClr val="tx1"/>
+              </a:solidFill>
+            </a:endParaRPr>
+          </a:p>
+        </p:txBody>
+      </p:sp>
+      <p:pic>
+        <p:nvPicPr>
+          <p:cNvPr id="9" name="Picture 8"/>
+          <p:cNvPicPr>
+            <a:picLocks noChangeAspect="1"/>
+          </p:cNvPicPr>
+          <p:nvPr/>
+        </p:nvPicPr>
+        <p:blipFill>
+          <a:blip r:embed="rId4">
+            <a:extLst>
+              <a:ext uri="{28A0092B-C50C-407E-A947-70E740481C1C}">
+                <a14:useLocalDpi xmlns:a14="http://schemas.microsoft.com/office/drawing/2010/main" val="0"/>
+              </a:ext>
+            </a:extLst>
+          </a:blip>
+          <a:stretch>
+            <a:fillRect/>
+          </a:stretch>
+        </p:blipFill>
+        <p:spPr>
+          <a:xfrm>
+            <a:off x="5998790" y="3812433"/>
+            <a:ext cx="5679784" cy="1282532"/>
+          </a:xfrm>
+          <a:prstGeom prst="rect">
+            <a:avLst/>
+          </a:prstGeom>
+          <a:ln>
+            <a:noFill/>
+          </a:ln>
+          <a:effectLst>
+            <a:outerShdw blurRad="292100" dist="139700" dir="2700000" algn="tl" rotWithShape="0">
+              <a:srgbClr val="333333">
+                <a:alpha val="65000"/>
+              </a:srgbClr>
+            </a:outerShdw>
+          </a:effectLst>
+        </p:spPr>
+      </p:pic>
+    </p:spTree>
+    <p:extLst>
+      <p:ext uri="{BB962C8B-B14F-4D97-AF65-F5344CB8AC3E}">
+        <p14:creationId xmlns:p14="http://schemas.microsoft.com/office/powerpoint/2010/main" val="401450953"/>
+      </p:ext>
+    </p:extLst>
+  </p:cSld>
+  <p:clrMapOvr>
+    <a:masterClrMapping/>
+  </p:clrMapOvr>
+</p:sld>
+</file>
+
+<file path=ppt/slides/slide8.xml><?xml version="1.0" encoding="utf-8"?>
+<p:sld xmlns:a="http://schemas.openxmlformats.org/drawingml/2006/main" xmlns:r="http://schemas.openxmlformats.org/officeDocument/2006/relationships" xmlns:p="http://schemas.openxmlformats.org/presentationml/2006/main">
+  <p:cSld>
+    <p:spTree>
+      <p:nvGrpSpPr>
+        <p:cNvPr id="1" name=""/>
+        <p:cNvGrpSpPr/>
+        <p:nvPr/>
+      </p:nvGrpSpPr>
+      <p:grpSpPr>
+        <a:xfrm>
+          <a:off x="0" y="0"/>
+          <a:ext cx="0" cy="0"/>
+          <a:chOff x="0" y="0"/>
+          <a:chExt cx="0" cy="0"/>
+        </a:xfrm>
+      </p:grpSpPr>
+      <p:sp>
+        <p:nvSpPr>
+          <p:cNvPr id="2" name="Title 1"/>
+          <p:cNvSpPr>
+            <a:spLocks noGrp="1"/>
+          </p:cNvSpPr>
+          <p:nvPr>
+            <p:ph type="title"/>
+          </p:nvPr>
+        </p:nvSpPr>
+        <p:spPr/>
+        <p:txBody>
+          <a:bodyPr/>
+          <a:lstStyle/>
+          <a:p>
+            <a:r>
+              <a:rPr lang="en-US" dirty="0"/>
+              <a:t>2. La </a:t>
+            </a:r>
+            <a:r>
+              <a:rPr lang="en-US" dirty="0" err="1"/>
+              <a:t>gestion</a:t>
+            </a:r>
+            <a:r>
+              <a:rPr lang="en-US" dirty="0"/>
+              <a:t> des branches</a:t>
+            </a:r>
+          </a:p>
+        </p:txBody>
+      </p:sp>
+      <p:sp>
+        <p:nvSpPr>
+          <p:cNvPr id="3" name="Content Placeholder 2"/>
+          <p:cNvSpPr>
+            <a:spLocks noGrp="1"/>
+          </p:cNvSpPr>
+          <p:nvPr>
+            <p:ph idx="1"/>
+          </p:nvPr>
+        </p:nvSpPr>
+        <p:spPr>
+          <a:xfrm>
+            <a:off x="1484311" y="1562099"/>
+            <a:ext cx="10018713" cy="3124201"/>
+          </a:xfrm>
+        </p:spPr>
+        <p:txBody>
+          <a:bodyPr/>
+          <a:lstStyle/>
+          <a:p>
+            <a:r>
+              <a:rPr lang="en-US" dirty="0"/>
+              <a:t>Les </a:t>
+            </a:r>
+            <a:r>
+              <a:rPr lang="en-US" dirty="0" err="1"/>
+              <a:t>avantages</a:t>
+            </a:r>
+            <a:r>
+              <a:rPr lang="en-US" dirty="0"/>
+              <a:t> de changer de branches.</a:t>
+            </a:r>
+          </a:p>
+          <a:p>
+            <a:pPr lvl="1"/>
+            <a:r>
+              <a:rPr lang="en-US" dirty="0" err="1"/>
+              <a:t>Moins</a:t>
+            </a:r>
+            <a:r>
+              <a:rPr lang="en-US" dirty="0"/>
+              <a:t> de versions </a:t>
+            </a:r>
+            <a:r>
+              <a:rPr lang="en-US" dirty="0" err="1"/>
+              <a:t>à</a:t>
+            </a:r>
+            <a:r>
+              <a:rPr lang="en-US" dirty="0"/>
+              <a:t> </a:t>
+            </a:r>
+            <a:r>
+              <a:rPr lang="en-US" dirty="0" err="1"/>
+              <a:t>gérer</a:t>
+            </a:r>
+            <a:endParaRPr lang="en-US" dirty="0"/>
+          </a:p>
+          <a:p>
+            <a:pPr lvl="1"/>
+            <a:r>
+              <a:rPr lang="en-US" dirty="0"/>
+              <a:t>Plus </a:t>
+            </a:r>
+            <a:r>
+              <a:rPr lang="en-US" dirty="0" err="1"/>
+              <a:t>sécuritaire</a:t>
+            </a:r>
+            <a:endParaRPr lang="en-US" dirty="0"/>
+          </a:p>
+          <a:p>
+            <a:pPr lvl="1"/>
+            <a:r>
+              <a:rPr lang="en-US" dirty="0" err="1"/>
+              <a:t>Meilleure</a:t>
+            </a:r>
+            <a:r>
+              <a:rPr lang="en-US" dirty="0"/>
+              <a:t> structure du </a:t>
+            </a:r>
+            <a:r>
+              <a:rPr lang="en-US" dirty="0" err="1"/>
+              <a:t>projet</a:t>
+            </a:r>
+            <a:endParaRPr lang="en-US" dirty="0"/>
+          </a:p>
+          <a:p>
+            <a:pPr lvl="1"/>
+            <a:endParaRPr lang="en-US" dirty="0"/>
+          </a:p>
+        </p:txBody>
+      </p:sp>
+      <p:pic>
+        <p:nvPicPr>
+          <p:cNvPr id="4" name="Picture 3"/>
+          <p:cNvPicPr>
+            <a:picLocks noChangeAspect="1"/>
+          </p:cNvPicPr>
+          <p:nvPr/>
+        </p:nvPicPr>
+        <p:blipFill>
+          <a:blip r:embed="rId2">
+            <a:extLst>
+              <a:ext uri="{28A0092B-C50C-407E-A947-70E740481C1C}">
+                <a14:useLocalDpi xmlns:a14="http://schemas.microsoft.com/office/drawing/2010/main" val="0"/>
+              </a:ext>
+            </a:extLst>
+          </a:blip>
+          <a:stretch>
+            <a:fillRect/>
+          </a:stretch>
+        </p:blipFill>
+        <p:spPr>
+          <a:xfrm>
+            <a:off x="6039397" y="2722948"/>
+            <a:ext cx="5463627" cy="3471474"/>
+          </a:xfrm>
+          <a:prstGeom prst="rect">
+            <a:avLst/>
+          </a:prstGeom>
+          <a:ln>
+            <a:noFill/>
+          </a:ln>
+          <a:effectLst>
+            <a:outerShdw blurRad="292100" dist="139700" dir="2700000" algn="tl" rotWithShape="0">
+              <a:srgbClr val="333333">
+                <a:alpha val="65000"/>
+              </a:srgbClr>
+            </a:outerShdw>
+          </a:effectLst>
+        </p:spPr>
+      </p:pic>
+      <p:pic>
+        <p:nvPicPr>
+          <p:cNvPr id="5" name="Picture 4"/>
+          <p:cNvPicPr/>
+          <p:nvPr/>
+        </p:nvPicPr>
+        <p:blipFill>
+          <a:blip r:embed="rId3">
+            <a:extLst>
+              <a:ext uri="{28A0092B-C50C-407E-A947-70E740481C1C}">
+                <a14:useLocalDpi xmlns:a14="http://schemas.microsoft.com/office/drawing/2010/main" val="0"/>
+              </a:ext>
+            </a:extLst>
+          </a:blip>
+          <a:stretch>
+            <a:fillRect/>
+          </a:stretch>
+        </p:blipFill>
+        <p:spPr>
+          <a:xfrm>
+            <a:off x="1841522" y="3986489"/>
+            <a:ext cx="3840665" cy="2001577"/>
+          </a:xfrm>
+          <a:prstGeom prst="rect">
+            <a:avLst/>
+          </a:prstGeom>
+        </p:spPr>
+      </p:pic>
+      <p:sp>
+        <p:nvSpPr>
+          <p:cNvPr id="7" name="TextBox 6"/>
+          <p:cNvSpPr txBox="1"/>
+          <p:nvPr/>
+        </p:nvSpPr>
+        <p:spPr>
+          <a:xfrm>
+            <a:off x="2794571" y="4966729"/>
+            <a:ext cx="380143" cy="369332"/>
+          </a:xfrm>
+          <a:prstGeom prst="rect">
+            <a:avLst/>
+          </a:prstGeom>
+          <a:noFill/>
+        </p:spPr>
+        <p:style>
+          <a:lnRef idx="2">
+            <a:schemeClr val="accent2"/>
+          </a:lnRef>
+          <a:fillRef idx="1">
+            <a:schemeClr val="lt1"/>
+          </a:fillRef>
+          <a:effectRef idx="0">
+            <a:schemeClr val="accent2"/>
+          </a:effectRef>
+          <a:fontRef idx="minor">
+            <a:schemeClr val="dk1"/>
+          </a:fontRef>
+        </p:style>
+        <p:txBody>
+          <a:bodyPr wrap="square" rtlCol="0">
+            <a:spAutoFit/>
+          </a:bodyPr>
+          <a:lstStyle/>
+          <a:p>
+            <a:endParaRPr lang="en-US" dirty="0"/>
+          </a:p>
+        </p:txBody>
+      </p:sp>
+    </p:spTree>
+    <p:extLst>
+      <p:ext uri="{BB962C8B-B14F-4D97-AF65-F5344CB8AC3E}">
+        <p14:creationId xmlns:p14="http://schemas.microsoft.com/office/powerpoint/2010/main" val="1600369068"/>
+      </p:ext>
+    </p:extLst>
+  </p:cSld>
+  <p:clrMapOvr>
+    <a:masterClrMapping/>
+  </p:clrMapOvr>
+</p:sld>
+</file>
+
+<file path=ppt/slides/slide9.xml><?xml version="1.0" encoding="utf-8"?>
+<p:sld xmlns:a="http://schemas.openxmlformats.org/drawingml/2006/main" xmlns:r="http://schemas.openxmlformats.org/officeDocument/2006/relationships" xmlns:p="http://schemas.openxmlformats.org/presentationml/2006/main">
+  <p:cSld>
+    <p:spTree>
+      <p:nvGrpSpPr>
+        <p:cNvPr id="1" name=""/>
+        <p:cNvGrpSpPr/>
+        <p:nvPr/>
+      </p:nvGrpSpPr>
+      <p:grpSpPr>
+        <a:xfrm>
+          <a:off x="0" y="0"/>
+          <a:ext cx="0" cy="0"/>
+          <a:chOff x="0" y="0"/>
+          <a:chExt cx="0" cy="0"/>
+        </a:xfrm>
+      </p:grpSpPr>
+      <p:sp>
+        <p:nvSpPr>
+          <p:cNvPr id="2" name="Title 1"/>
+          <p:cNvSpPr>
+            <a:spLocks noGrp="1"/>
+          </p:cNvSpPr>
+          <p:nvPr>
+            <p:ph type="title"/>
+          </p:nvPr>
+        </p:nvSpPr>
+        <p:spPr/>
+        <p:txBody>
+          <a:bodyPr/>
+          <a:lstStyle/>
+          <a:p>
+            <a:r>
+              <a:rPr lang="en-US" dirty="0"/>
+              <a:t>Faire </a:t>
+            </a:r>
+            <a:r>
+              <a:rPr lang="en-US" dirty="0" err="1"/>
+              <a:t>ses</a:t>
+            </a:r>
+            <a:r>
+              <a:rPr lang="en-US" dirty="0"/>
+              <a:t> </a:t>
+            </a:r>
+            <a:r>
+              <a:rPr lang="en-US" dirty="0" err="1"/>
+              <a:t>changements</a:t>
+            </a:r>
+            <a:endParaRPr lang="en-US" dirty="0"/>
+          </a:p>
+        </p:txBody>
+      </p:sp>
+      <p:sp>
+        <p:nvSpPr>
+          <p:cNvPr id="3" name="Content Placeholder 2"/>
+          <p:cNvSpPr>
+            <a:spLocks noGrp="1"/>
+          </p:cNvSpPr>
+          <p:nvPr>
+            <p:ph idx="1"/>
+          </p:nvPr>
+        </p:nvSpPr>
+        <p:spPr>
+          <a:xfrm>
+            <a:off x="1484310" y="876298"/>
+            <a:ext cx="10018713" cy="3124201"/>
+          </a:xfrm>
+        </p:spPr>
+        <p:txBody>
+          <a:bodyPr/>
+          <a:lstStyle/>
+          <a:p>
+            <a:r>
+              <a:rPr lang="en-US" dirty="0" err="1"/>
+              <a:t>Je</a:t>
+            </a:r>
+            <a:r>
+              <a:rPr lang="en-US" dirty="0"/>
+              <a:t> </a:t>
+            </a:r>
+            <a:r>
+              <a:rPr lang="en-US" dirty="0" err="1"/>
+              <a:t>crée</a:t>
+            </a:r>
+            <a:r>
+              <a:rPr lang="en-US" dirty="0"/>
+              <a:t> un </a:t>
+            </a:r>
+            <a:r>
+              <a:rPr lang="en-US" dirty="0" err="1"/>
+              <a:t>fichier</a:t>
+            </a:r>
+            <a:r>
+              <a:rPr lang="en-US" dirty="0"/>
+              <a:t> : machineacafe.js</a:t>
+            </a:r>
+          </a:p>
+        </p:txBody>
+      </p:sp>
+      <p:pic>
+        <p:nvPicPr>
+          <p:cNvPr id="4" name="Picture 3"/>
+          <p:cNvPicPr>
+            <a:picLocks noChangeAspect="1"/>
+          </p:cNvPicPr>
+          <p:nvPr/>
+        </p:nvPicPr>
+        <p:blipFill>
+          <a:blip r:embed="rId2">
+            <a:extLst>
+              <a:ext uri="{28A0092B-C50C-407E-A947-70E740481C1C}">
+                <a14:useLocalDpi xmlns:a14="http://schemas.microsoft.com/office/drawing/2010/main" val="0"/>
+              </a:ext>
+            </a:extLst>
+          </a:blip>
+          <a:stretch>
+            <a:fillRect/>
+          </a:stretch>
+        </p:blipFill>
+        <p:spPr>
+          <a:xfrm>
+            <a:off x="1484309" y="2809103"/>
+            <a:ext cx="6908800" cy="1054100"/>
+          </a:xfrm>
+          <a:prstGeom prst="rect">
+            <a:avLst/>
+          </a:prstGeom>
+          <a:ln>
+            <a:noFill/>
+          </a:ln>
+          <a:effectLst>
+            <a:outerShdw blurRad="292100" dist="139700" dir="2700000" algn="tl" rotWithShape="0">
+              <a:srgbClr val="333333">
+                <a:alpha val="65000"/>
+              </a:srgbClr>
+            </a:outerShdw>
+          </a:effectLst>
+        </p:spPr>
+      </p:pic>
+      <p:pic>
+        <p:nvPicPr>
+          <p:cNvPr id="5" name="Picture 4"/>
+          <p:cNvPicPr>
+            <a:picLocks noChangeAspect="1"/>
+          </p:cNvPicPr>
+          <p:nvPr/>
+        </p:nvPicPr>
+        <p:blipFill>
+          <a:blip r:embed="rId3">
+            <a:extLst>
+              <a:ext uri="{28A0092B-C50C-407E-A947-70E740481C1C}">
+                <a14:useLocalDpi xmlns:a14="http://schemas.microsoft.com/office/drawing/2010/main" val="0"/>
+              </a:ext>
+            </a:extLst>
+          </a:blip>
+          <a:stretch>
+            <a:fillRect/>
+          </a:stretch>
+        </p:blipFill>
+        <p:spPr>
+          <a:xfrm>
+            <a:off x="3013523" y="4233907"/>
+            <a:ext cx="4406900" cy="2184400"/>
+          </a:xfrm>
+          <a:prstGeom prst="rect">
+            <a:avLst/>
+          </a:prstGeom>
+          <a:ln>
+            <a:noFill/>
+          </a:ln>
+          <a:effectLst>
+            <a:outerShdw blurRad="292100" dist="139700" dir="2700000" algn="tl" rotWithShape="0">
+              <a:srgbClr val="333333">
+                <a:alpha val="65000"/>
+              </a:srgbClr>
+            </a:outerShdw>
+          </a:effectLst>
+        </p:spPr>
+      </p:pic>
+    </p:spTree>
+    <p:extLst>
+      <p:ext uri="{BB962C8B-B14F-4D97-AF65-F5344CB8AC3E}">
+        <p14:creationId xmlns:p14="http://schemas.microsoft.com/office/powerpoint/2010/main" val="859708424"/>
       </p:ext>
     </p:extLst>
   </p:cSld>

</xml_diff>